<commit_message>
First version of an extended model: TFModelCOVID.py This is still scalar meaning only one population. The next version will contain age states.
</commit_message>
<xml_diff>
--- a/research/CORONA_Model.pptx
+++ b/research/CORONA_Model.pptx
@@ -11,7 +11,7 @@
     <p:sldId id="257" r:id="rId5"/>
   </p:sldIdLst>
   <p:sldSz cx="12192000" cy="6858000"/>
-  <p:notesSz cx="6858000" cy="9144000"/>
+  <p:notesSz cx="7104063" cy="10234613"/>
   <p:defaultTextStyle>
     <a:defPPr>
       <a:defRPr lang="en-US"/>
@@ -3031,6 +3031,13 @@
   <p:clrMapOvr>
     <a:masterClrMapping/>
   </p:clrMapOvr>
+  <p:timing>
+    <p:tnLst>
+      <p:par>
+        <p:cTn id="1" dur="indefinite" restart="never" nodeType="tmRoot"/>
+      </p:par>
+    </p:tnLst>
+  </p:timing>
 </p:sld>
 </file>
 
@@ -6134,11 +6141,11 @@
           <a:p>
             <a:r>
               <a:rPr lang="de-DE" sz="1400" dirty="0" smtClean="0"/>
-              <a:t>a </a:t>
+              <a:t>ii </a:t>
             </a:r>
             <a:r>
               <a:rPr lang="de-DE" sz="1400" dirty="0" err="1" smtClean="0"/>
-              <a:t>I+b</a:t>
+              <a:t>I+iq</a:t>
             </a:r>
             <a:r>
               <a:rPr lang="de-DE" sz="1400" dirty="0" smtClean="0"/>
@@ -6146,7 +6153,7 @@
             </a:r>
             <a:r>
               <a:rPr lang="de-DE" sz="1400" dirty="0" err="1" smtClean="0"/>
-              <a:t>Q+h</a:t>
+              <a:t>Q+ih</a:t>
             </a:r>
             <a:r>
               <a:rPr lang="de-DE" sz="1400" dirty="0" smtClean="0"/>
@@ -9419,13 +9426,15 @@
       <p:cxnSp>
         <p:nvCxnSpPr>
           <p:cNvPr id="289" name="Gerade Verbindung mit Pfeil 288"/>
-          <p:cNvCxnSpPr/>
+          <p:cNvCxnSpPr>
+            <a:endCxn id="463" idx="1"/>
+          </p:cNvCxnSpPr>
           <p:nvPr/>
         </p:nvCxnSpPr>
         <p:spPr>
-          <a:xfrm>
-            <a:off x="1060637" y="2353764"/>
-            <a:ext cx="10778" cy="1269470"/>
+          <a:xfrm flipH="1">
+            <a:off x="652696" y="2353764"/>
+            <a:ext cx="407941" cy="2749282"/>
           </a:xfrm>
           <a:prstGeom prst="straightConnector1">
             <a:avLst/>
@@ -9495,117 +9504,6 @@
           <a:p>
             <a:pPr algn="ctr"/>
             <a:endParaRPr lang="en-US"/>
-          </a:p>
-        </p:txBody>
-      </p:sp>
-      <p:cxnSp>
-        <p:nvCxnSpPr>
-          <p:cNvPr id="297" name="Gerade Verbindung mit Pfeil 296"/>
-          <p:cNvCxnSpPr>
-            <a:stCxn id="373" idx="0"/>
-            <a:endCxn id="150" idx="1"/>
-          </p:cNvCxnSpPr>
-          <p:nvPr/>
-        </p:nvCxnSpPr>
-        <p:spPr>
-          <a:xfrm flipV="1">
-            <a:off x="7550506" y="3092028"/>
-            <a:ext cx="2585938" cy="2898452"/>
-          </a:xfrm>
-          <a:prstGeom prst="straightConnector1">
-            <a:avLst/>
-          </a:prstGeom>
-          <a:ln w="38100">
-            <a:solidFill>
-              <a:srgbClr val="00B050"/>
-            </a:solidFill>
-            <a:tailEnd type="triangle"/>
-          </a:ln>
-        </p:spPr>
-        <p:style>
-          <a:lnRef idx="1">
-            <a:schemeClr val="accent1"/>
-          </a:lnRef>
-          <a:fillRef idx="0">
-            <a:schemeClr val="accent1"/>
-          </a:fillRef>
-          <a:effectRef idx="0">
-            <a:schemeClr val="accent1"/>
-          </a:effectRef>
-          <a:fontRef idx="minor">
-            <a:schemeClr val="tx1"/>
-          </a:fontRef>
-        </p:style>
-      </p:cxnSp>
-      <p:cxnSp>
-        <p:nvCxnSpPr>
-          <p:cNvPr id="304" name="Gerade Verbindung mit Pfeil 303"/>
-          <p:cNvCxnSpPr/>
-          <p:nvPr/>
-        </p:nvCxnSpPr>
-        <p:spPr>
-          <a:xfrm flipV="1">
-            <a:off x="1952171" y="2887696"/>
-            <a:ext cx="1903951" cy="810707"/>
-          </a:xfrm>
-          <a:prstGeom prst="straightConnector1">
-            <a:avLst/>
-          </a:prstGeom>
-          <a:ln w="38100">
-            <a:solidFill>
-              <a:srgbClr val="00B050"/>
-            </a:solidFill>
-            <a:tailEnd type="triangle"/>
-          </a:ln>
-        </p:spPr>
-        <p:style>
-          <a:lnRef idx="1">
-            <a:schemeClr val="accent1"/>
-          </a:lnRef>
-          <a:fillRef idx="0">
-            <a:schemeClr val="accent1"/>
-          </a:fillRef>
-          <a:effectRef idx="0">
-            <a:schemeClr val="accent1"/>
-          </a:effectRef>
-          <a:fontRef idx="minor">
-            <a:schemeClr val="tx1"/>
-          </a:fontRef>
-        </p:style>
-      </p:cxnSp>
-      <p:sp>
-        <p:nvSpPr>
-          <p:cNvPr id="307" name="Textfeld 306"/>
-          <p:cNvSpPr txBox="1"/>
-          <p:nvPr/>
-        </p:nvSpPr>
-        <p:spPr>
-          <a:xfrm rot="20105920">
-            <a:off x="2002734" y="3076564"/>
-            <a:ext cx="1083951" cy="307777"/>
-          </a:xfrm>
-          <a:prstGeom prst="rect">
-            <a:avLst/>
-          </a:prstGeom>
-          <a:noFill/>
-        </p:spPr>
-        <p:txBody>
-          <a:bodyPr wrap="none" rtlCol="0">
-            <a:spAutoFit/>
-          </a:bodyPr>
-          <a:lstStyle/>
-          <a:p>
-            <a:r>
-              <a:rPr lang="de-DE" sz="1400" dirty="0" smtClean="0">
-                <a:latin typeface="Symbol" panose="05050102010706020507" pitchFamily="18" charset="2"/>
-              </a:rPr>
-              <a:t>a</a:t>
-            </a:r>
-            <a:r>
-              <a:rPr lang="de-DE" sz="1400" dirty="0" smtClean="0"/>
-              <a:t> (a I + d Q )</a:t>
-            </a:r>
-            <a:endParaRPr lang="en-US" sz="1400" dirty="0"/>
           </a:p>
         </p:txBody>
       </p:sp>
@@ -9688,16 +9586,13 @@
       <p:cxnSp>
         <p:nvCxnSpPr>
           <p:cNvPr id="326" name="Gerade Verbindung mit Pfeil 325"/>
-          <p:cNvCxnSpPr>
-            <a:stCxn id="293" idx="3"/>
-            <a:endCxn id="376" idx="1"/>
-          </p:cNvCxnSpPr>
+          <p:cNvCxnSpPr/>
           <p:nvPr/>
         </p:nvCxnSpPr>
         <p:spPr>
           <a:xfrm>
-            <a:off x="5268769" y="6079353"/>
-            <a:ext cx="1288115" cy="29481"/>
+            <a:off x="5288464" y="6199137"/>
+            <a:ext cx="1295560" cy="25538"/>
           </a:xfrm>
           <a:prstGeom prst="straightConnector1">
             <a:avLst/>
@@ -9747,8 +9642,8 @@
           <a:lstStyle/>
           <a:p>
             <a:r>
-              <a:rPr lang="de-DE" sz="1400" dirty="0"/>
-              <a:t>f</a:t>
+              <a:rPr lang="de-DE" sz="1400" dirty="0" smtClean="0"/>
+              <a:t>h</a:t>
             </a:r>
             <a:endParaRPr lang="en-US" sz="1400" dirty="0"/>
           </a:p>
@@ -9762,7 +9657,7 @@
         </p:nvSpPr>
         <p:spPr>
           <a:xfrm>
-            <a:off x="5766583" y="5700103"/>
+            <a:off x="5752991" y="5925463"/>
             <a:ext cx="299066" cy="307777"/>
           </a:xfrm>
           <a:prstGeom prst="rect">
@@ -9777,8 +9672,8 @@
           <a:lstStyle/>
           <a:p>
             <a:r>
-              <a:rPr lang="de-DE" sz="1400" dirty="0"/>
-              <a:t>f</a:t>
+              <a:rPr lang="de-DE" sz="1400" dirty="0" smtClean="0"/>
+              <a:t>h</a:t>
             </a:r>
             <a:endParaRPr lang="en-US" sz="1400" dirty="0"/>
           </a:p>
@@ -9808,7 +9703,7 @@
           <a:p>
             <a:r>
               <a:rPr lang="de-DE" sz="1400" dirty="0" smtClean="0"/>
-              <a:t>e</a:t>
+              <a:t>d</a:t>
             </a:r>
             <a:endParaRPr lang="en-US" sz="1400" dirty="0"/>
           </a:p>
@@ -11230,36 +11125,6 @@
               <a:t>r</a:t>
             </a:r>
             <a:endParaRPr lang="en-US" sz="1400" dirty="0"/>
-          </a:p>
-        </p:txBody>
-      </p:sp>
-      <p:sp>
-        <p:nvSpPr>
-          <p:cNvPr id="378" name="Textfeld 377"/>
-          <p:cNvSpPr txBox="1"/>
-          <p:nvPr/>
-        </p:nvSpPr>
-        <p:spPr>
-          <a:xfrm>
-            <a:off x="9073010" y="4288853"/>
-            <a:ext cx="293066" cy="307777"/>
-          </a:xfrm>
-          <a:prstGeom prst="rect">
-            <a:avLst/>
-          </a:prstGeom>
-          <a:noFill/>
-        </p:spPr>
-        <p:txBody>
-          <a:bodyPr wrap="square" rtlCol="0">
-            <a:spAutoFit/>
-          </a:bodyPr>
-          <a:lstStyle/>
-          <a:p>
-            <a:r>
-              <a:rPr lang="de-DE" sz="1400" dirty="0"/>
-              <a:t>c</a:t>
-            </a:r>
-            <a:endParaRPr lang="de-DE" sz="1400" dirty="0" smtClean="0"/>
           </a:p>
         </p:txBody>
       </p:sp>
@@ -11969,7 +11834,7 @@
         </p:nvSpPr>
         <p:spPr>
           <a:xfrm>
-            <a:off x="53418" y="-85862"/>
+            <a:off x="90112" y="-63657"/>
             <a:ext cx="1461234" cy="369332"/>
           </a:xfrm>
           <a:prstGeom prst="rect">
@@ -11995,6 +11860,1387 @@
           </a:p>
         </p:txBody>
       </p:sp>
+      <p:grpSp>
+        <p:nvGrpSpPr>
+          <p:cNvPr id="416" name="Gruppieren 415"/>
+          <p:cNvGrpSpPr/>
+          <p:nvPr/>
+        </p:nvGrpSpPr>
+        <p:grpSpPr>
+          <a:xfrm>
+            <a:off x="641573" y="4722230"/>
+            <a:ext cx="1034845" cy="673789"/>
+            <a:chOff x="4850698" y="3663378"/>
+            <a:chExt cx="6800228" cy="2576640"/>
+          </a:xfrm>
+          <a:solidFill>
+            <a:schemeClr val="accent6"/>
+          </a:solidFill>
+        </p:grpSpPr>
+        <p:sp>
+          <p:nvSpPr>
+            <p:cNvPr id="417" name="Rechteck 416"/>
+            <p:cNvSpPr/>
+            <p:nvPr/>
+          </p:nvSpPr>
+          <p:spPr>
+            <a:xfrm>
+              <a:off x="4926276" y="5259947"/>
+              <a:ext cx="355600" cy="703943"/>
+            </a:xfrm>
+            <a:prstGeom prst="rect">
+              <a:avLst/>
+            </a:prstGeom>
+            <a:grpFill/>
+            <a:ln>
+              <a:noFill/>
+            </a:ln>
+          </p:spPr>
+          <p:style>
+            <a:lnRef idx="2">
+              <a:schemeClr val="accent1">
+                <a:shade val="50000"/>
+              </a:schemeClr>
+            </a:lnRef>
+            <a:fillRef idx="1">
+              <a:schemeClr val="accent1"/>
+            </a:fillRef>
+            <a:effectRef idx="0">
+              <a:schemeClr val="accent1"/>
+            </a:effectRef>
+            <a:fontRef idx="minor">
+              <a:schemeClr val="lt1"/>
+            </a:fontRef>
+          </p:style>
+          <p:txBody>
+            <a:bodyPr rtlCol="0" anchor="ctr"/>
+            <a:lstStyle/>
+            <a:p>
+              <a:pPr algn="ctr"/>
+              <a:endParaRPr lang="en-US" sz="600"/>
+            </a:p>
+          </p:txBody>
+        </p:sp>
+        <p:sp>
+          <p:nvSpPr>
+            <p:cNvPr id="418" name="Rechteck 417"/>
+            <p:cNvSpPr/>
+            <p:nvPr/>
+          </p:nvSpPr>
+          <p:spPr>
+            <a:xfrm>
+              <a:off x="5397991" y="4868064"/>
+              <a:ext cx="355600" cy="1095826"/>
+            </a:xfrm>
+            <a:prstGeom prst="rect">
+              <a:avLst/>
+            </a:prstGeom>
+            <a:grpFill/>
+            <a:ln>
+              <a:noFill/>
+            </a:ln>
+          </p:spPr>
+          <p:style>
+            <a:lnRef idx="2">
+              <a:schemeClr val="accent1">
+                <a:shade val="50000"/>
+              </a:schemeClr>
+            </a:lnRef>
+            <a:fillRef idx="1">
+              <a:schemeClr val="accent1"/>
+            </a:fillRef>
+            <a:effectRef idx="0">
+              <a:schemeClr val="accent1"/>
+            </a:effectRef>
+            <a:fontRef idx="minor">
+              <a:schemeClr val="lt1"/>
+            </a:fontRef>
+          </p:style>
+          <p:txBody>
+            <a:bodyPr rtlCol="0" anchor="ctr"/>
+            <a:lstStyle/>
+            <a:p>
+              <a:pPr algn="ctr"/>
+              <a:endParaRPr lang="en-US" sz="600"/>
+            </a:p>
+          </p:txBody>
+        </p:sp>
+        <p:sp>
+          <p:nvSpPr>
+            <p:cNvPr id="419" name="Rechteck 418"/>
+            <p:cNvSpPr/>
+            <p:nvPr/>
+          </p:nvSpPr>
+          <p:spPr>
+            <a:xfrm>
+              <a:off x="5869706" y="4077034"/>
+              <a:ext cx="355600" cy="1886856"/>
+            </a:xfrm>
+            <a:prstGeom prst="rect">
+              <a:avLst/>
+            </a:prstGeom>
+            <a:grpFill/>
+            <a:ln>
+              <a:noFill/>
+            </a:ln>
+          </p:spPr>
+          <p:style>
+            <a:lnRef idx="2">
+              <a:schemeClr val="accent1">
+                <a:shade val="50000"/>
+              </a:schemeClr>
+            </a:lnRef>
+            <a:fillRef idx="1">
+              <a:schemeClr val="accent1"/>
+            </a:fillRef>
+            <a:effectRef idx="0">
+              <a:schemeClr val="accent1"/>
+            </a:effectRef>
+            <a:fontRef idx="minor">
+              <a:schemeClr val="lt1"/>
+            </a:fontRef>
+          </p:style>
+          <p:txBody>
+            <a:bodyPr rtlCol="0" anchor="ctr"/>
+            <a:lstStyle/>
+            <a:p>
+              <a:pPr algn="ctr"/>
+              <a:endParaRPr lang="en-US" sz="600"/>
+            </a:p>
+          </p:txBody>
+        </p:sp>
+        <p:sp>
+          <p:nvSpPr>
+            <p:cNvPr id="420" name="Rechteck 419"/>
+            <p:cNvSpPr/>
+            <p:nvPr/>
+          </p:nvSpPr>
+          <p:spPr>
+            <a:xfrm>
+              <a:off x="6341421" y="4693890"/>
+              <a:ext cx="355600" cy="1269999"/>
+            </a:xfrm>
+            <a:prstGeom prst="rect">
+              <a:avLst/>
+            </a:prstGeom>
+            <a:grpFill/>
+            <a:ln>
+              <a:noFill/>
+            </a:ln>
+          </p:spPr>
+          <p:style>
+            <a:lnRef idx="2">
+              <a:schemeClr val="accent1">
+                <a:shade val="50000"/>
+              </a:schemeClr>
+            </a:lnRef>
+            <a:fillRef idx="1">
+              <a:schemeClr val="accent1"/>
+            </a:fillRef>
+            <a:effectRef idx="0">
+              <a:schemeClr val="accent1"/>
+            </a:effectRef>
+            <a:fontRef idx="minor">
+              <a:schemeClr val="lt1"/>
+            </a:fontRef>
+          </p:style>
+          <p:txBody>
+            <a:bodyPr rtlCol="0" anchor="ctr"/>
+            <a:lstStyle/>
+            <a:p>
+              <a:pPr algn="ctr"/>
+              <a:endParaRPr lang="en-US" sz="600"/>
+            </a:p>
+          </p:txBody>
+        </p:sp>
+        <p:sp>
+          <p:nvSpPr>
+            <p:cNvPr id="421" name="Rechteck 420"/>
+            <p:cNvSpPr/>
+            <p:nvPr/>
+          </p:nvSpPr>
+          <p:spPr>
+            <a:xfrm>
+              <a:off x="6813136" y="5151091"/>
+              <a:ext cx="355600" cy="812798"/>
+            </a:xfrm>
+            <a:prstGeom prst="rect">
+              <a:avLst/>
+            </a:prstGeom>
+            <a:grpFill/>
+            <a:ln>
+              <a:noFill/>
+            </a:ln>
+          </p:spPr>
+          <p:style>
+            <a:lnRef idx="2">
+              <a:schemeClr val="accent1">
+                <a:shade val="50000"/>
+              </a:schemeClr>
+            </a:lnRef>
+            <a:fillRef idx="1">
+              <a:schemeClr val="accent1"/>
+            </a:fillRef>
+            <a:effectRef idx="0">
+              <a:schemeClr val="accent1"/>
+            </a:effectRef>
+            <a:fontRef idx="minor">
+              <a:schemeClr val="lt1"/>
+            </a:fontRef>
+          </p:style>
+          <p:txBody>
+            <a:bodyPr rtlCol="0" anchor="ctr"/>
+            <a:lstStyle/>
+            <a:p>
+              <a:pPr algn="ctr"/>
+              <a:endParaRPr lang="en-US" sz="600"/>
+            </a:p>
+          </p:txBody>
+        </p:sp>
+        <p:sp>
+          <p:nvSpPr>
+            <p:cNvPr id="422" name="Rechteck 421"/>
+            <p:cNvSpPr/>
+            <p:nvPr/>
+          </p:nvSpPr>
+          <p:spPr>
+            <a:xfrm>
+              <a:off x="7284851" y="5492177"/>
+              <a:ext cx="355600" cy="471712"/>
+            </a:xfrm>
+            <a:prstGeom prst="rect">
+              <a:avLst/>
+            </a:prstGeom>
+            <a:grpFill/>
+            <a:ln>
+              <a:noFill/>
+            </a:ln>
+          </p:spPr>
+          <p:style>
+            <a:lnRef idx="2">
+              <a:schemeClr val="accent1">
+                <a:shade val="50000"/>
+              </a:schemeClr>
+            </a:lnRef>
+            <a:fillRef idx="1">
+              <a:schemeClr val="accent1"/>
+            </a:fillRef>
+            <a:effectRef idx="0">
+              <a:schemeClr val="accent1"/>
+            </a:effectRef>
+            <a:fontRef idx="minor">
+              <a:schemeClr val="lt1"/>
+            </a:fontRef>
+          </p:style>
+          <p:txBody>
+            <a:bodyPr rtlCol="0" anchor="ctr"/>
+            <a:lstStyle/>
+            <a:p>
+              <a:pPr algn="ctr"/>
+              <a:endParaRPr lang="en-US" sz="600"/>
+            </a:p>
+          </p:txBody>
+        </p:sp>
+        <p:cxnSp>
+          <p:nvCxnSpPr>
+            <p:cNvPr id="423" name="Gerade Verbindung mit Pfeil 422"/>
+            <p:cNvCxnSpPr/>
+            <p:nvPr/>
+          </p:nvCxnSpPr>
+          <p:spPr>
+            <a:xfrm flipV="1">
+              <a:off x="4850698" y="3663378"/>
+              <a:ext cx="0" cy="2316519"/>
+            </a:xfrm>
+            <a:prstGeom prst="straightConnector1">
+              <a:avLst/>
+            </a:prstGeom>
+            <a:grpFill/>
+            <a:ln w="12700">
+              <a:solidFill>
+                <a:schemeClr val="tx1"/>
+              </a:solidFill>
+              <a:tailEnd type="triangle"/>
+            </a:ln>
+          </p:spPr>
+          <p:style>
+            <a:lnRef idx="1">
+              <a:schemeClr val="accent1"/>
+            </a:lnRef>
+            <a:fillRef idx="0">
+              <a:schemeClr val="accent1"/>
+            </a:fillRef>
+            <a:effectRef idx="0">
+              <a:schemeClr val="accent1"/>
+            </a:effectRef>
+            <a:fontRef idx="minor">
+              <a:schemeClr val="tx1"/>
+            </a:fontRef>
+          </p:style>
+        </p:cxnSp>
+        <p:sp>
+          <p:nvSpPr>
+            <p:cNvPr id="424" name="Rechteck 423"/>
+            <p:cNvSpPr/>
+            <p:nvPr/>
+          </p:nvSpPr>
+          <p:spPr>
+            <a:xfrm>
+              <a:off x="7756566" y="5791199"/>
+              <a:ext cx="355600" cy="172689"/>
+            </a:xfrm>
+            <a:prstGeom prst="rect">
+              <a:avLst/>
+            </a:prstGeom>
+            <a:grpFill/>
+            <a:ln>
+              <a:noFill/>
+            </a:ln>
+          </p:spPr>
+          <p:style>
+            <a:lnRef idx="2">
+              <a:schemeClr val="accent1">
+                <a:shade val="50000"/>
+              </a:schemeClr>
+            </a:lnRef>
+            <a:fillRef idx="1">
+              <a:schemeClr val="accent1"/>
+            </a:fillRef>
+            <a:effectRef idx="0">
+              <a:schemeClr val="accent1"/>
+            </a:effectRef>
+            <a:fontRef idx="minor">
+              <a:schemeClr val="lt1"/>
+            </a:fontRef>
+          </p:style>
+          <p:txBody>
+            <a:bodyPr rtlCol="0" anchor="ctr"/>
+            <a:lstStyle/>
+            <a:p>
+              <a:pPr algn="ctr"/>
+              <a:endParaRPr lang="en-US" sz="600"/>
+            </a:p>
+          </p:txBody>
+        </p:sp>
+        <p:sp>
+          <p:nvSpPr>
+            <p:cNvPr id="425" name="Rechteck 424"/>
+            <p:cNvSpPr/>
+            <p:nvPr/>
+          </p:nvSpPr>
+          <p:spPr>
+            <a:xfrm>
+              <a:off x="8228281" y="5791199"/>
+              <a:ext cx="355600" cy="172690"/>
+            </a:xfrm>
+            <a:prstGeom prst="rect">
+              <a:avLst/>
+            </a:prstGeom>
+            <a:grpFill/>
+            <a:ln>
+              <a:noFill/>
+            </a:ln>
+          </p:spPr>
+          <p:style>
+            <a:lnRef idx="2">
+              <a:schemeClr val="accent1">
+                <a:shade val="50000"/>
+              </a:schemeClr>
+            </a:lnRef>
+            <a:fillRef idx="1">
+              <a:schemeClr val="accent1"/>
+            </a:fillRef>
+            <a:effectRef idx="0">
+              <a:schemeClr val="accent1"/>
+            </a:effectRef>
+            <a:fontRef idx="minor">
+              <a:schemeClr val="lt1"/>
+            </a:fontRef>
+          </p:style>
+          <p:txBody>
+            <a:bodyPr rtlCol="0" anchor="ctr"/>
+            <a:lstStyle/>
+            <a:p>
+              <a:pPr algn="ctr"/>
+              <a:endParaRPr lang="en-US" sz="600"/>
+            </a:p>
+          </p:txBody>
+        </p:sp>
+        <p:sp>
+          <p:nvSpPr>
+            <p:cNvPr id="426" name="Rechteck 425"/>
+            <p:cNvSpPr/>
+            <p:nvPr/>
+          </p:nvSpPr>
+          <p:spPr>
+            <a:xfrm>
+              <a:off x="8699996" y="5791199"/>
+              <a:ext cx="355600" cy="172690"/>
+            </a:xfrm>
+            <a:prstGeom prst="rect">
+              <a:avLst/>
+            </a:prstGeom>
+            <a:grpFill/>
+            <a:ln>
+              <a:noFill/>
+            </a:ln>
+          </p:spPr>
+          <p:style>
+            <a:lnRef idx="2">
+              <a:schemeClr val="accent1">
+                <a:shade val="50000"/>
+              </a:schemeClr>
+            </a:lnRef>
+            <a:fillRef idx="1">
+              <a:schemeClr val="accent1"/>
+            </a:fillRef>
+            <a:effectRef idx="0">
+              <a:schemeClr val="accent1"/>
+            </a:effectRef>
+            <a:fontRef idx="minor">
+              <a:schemeClr val="lt1"/>
+            </a:fontRef>
+          </p:style>
+          <p:txBody>
+            <a:bodyPr rtlCol="0" anchor="ctr"/>
+            <a:lstStyle/>
+            <a:p>
+              <a:pPr algn="ctr"/>
+              <a:endParaRPr lang="en-US" sz="600"/>
+            </a:p>
+          </p:txBody>
+        </p:sp>
+        <p:sp>
+          <p:nvSpPr>
+            <p:cNvPr id="427" name="Rechteck 426"/>
+            <p:cNvSpPr/>
+            <p:nvPr/>
+          </p:nvSpPr>
+          <p:spPr>
+            <a:xfrm>
+              <a:off x="9171711" y="5791199"/>
+              <a:ext cx="355600" cy="172690"/>
+            </a:xfrm>
+            <a:prstGeom prst="rect">
+              <a:avLst/>
+            </a:prstGeom>
+            <a:grpFill/>
+            <a:ln>
+              <a:noFill/>
+            </a:ln>
+          </p:spPr>
+          <p:style>
+            <a:lnRef idx="2">
+              <a:schemeClr val="accent1">
+                <a:shade val="50000"/>
+              </a:schemeClr>
+            </a:lnRef>
+            <a:fillRef idx="1">
+              <a:schemeClr val="accent1"/>
+            </a:fillRef>
+            <a:effectRef idx="0">
+              <a:schemeClr val="accent1"/>
+            </a:effectRef>
+            <a:fontRef idx="minor">
+              <a:schemeClr val="lt1"/>
+            </a:fontRef>
+          </p:style>
+          <p:txBody>
+            <a:bodyPr rtlCol="0" anchor="ctr"/>
+            <a:lstStyle/>
+            <a:p>
+              <a:pPr algn="ctr"/>
+              <a:endParaRPr lang="en-US" sz="600"/>
+            </a:p>
+          </p:txBody>
+        </p:sp>
+        <p:sp>
+          <p:nvSpPr>
+            <p:cNvPr id="428" name="Rechteck 427"/>
+            <p:cNvSpPr/>
+            <p:nvPr/>
+          </p:nvSpPr>
+          <p:spPr>
+            <a:xfrm>
+              <a:off x="9643426" y="5900057"/>
+              <a:ext cx="355600" cy="63832"/>
+            </a:xfrm>
+            <a:prstGeom prst="rect">
+              <a:avLst/>
+            </a:prstGeom>
+            <a:grpFill/>
+            <a:ln>
+              <a:noFill/>
+            </a:ln>
+          </p:spPr>
+          <p:style>
+            <a:lnRef idx="2">
+              <a:schemeClr val="accent1">
+                <a:shade val="50000"/>
+              </a:schemeClr>
+            </a:lnRef>
+            <a:fillRef idx="1">
+              <a:schemeClr val="accent1"/>
+            </a:fillRef>
+            <a:effectRef idx="0">
+              <a:schemeClr val="accent1"/>
+            </a:effectRef>
+            <a:fontRef idx="minor">
+              <a:schemeClr val="lt1"/>
+            </a:fontRef>
+          </p:style>
+          <p:txBody>
+            <a:bodyPr rtlCol="0" anchor="ctr"/>
+            <a:lstStyle/>
+            <a:p>
+              <a:pPr algn="ctr"/>
+              <a:endParaRPr lang="en-US" sz="600"/>
+            </a:p>
+          </p:txBody>
+        </p:sp>
+        <p:sp>
+          <p:nvSpPr>
+            <p:cNvPr id="429" name="Textfeld 428"/>
+            <p:cNvSpPr txBox="1"/>
+            <p:nvPr/>
+          </p:nvSpPr>
+          <p:spPr>
+            <a:xfrm>
+              <a:off x="11354050" y="6055352"/>
+              <a:ext cx="296876" cy="184666"/>
+            </a:xfrm>
+            <a:prstGeom prst="rect">
+              <a:avLst/>
+            </a:prstGeom>
+            <a:grpFill/>
+          </p:spPr>
+          <p:txBody>
+            <a:bodyPr wrap="none" rtlCol="0">
+              <a:spAutoFit/>
+            </a:bodyPr>
+            <a:lstStyle/>
+            <a:p>
+              <a:r>
+                <a:rPr lang="de-DE" sz="600" dirty="0" err="1" smtClean="0"/>
+                <a:t>day</a:t>
+              </a:r>
+              <a:endParaRPr lang="en-US" sz="600" dirty="0"/>
+            </a:p>
+          </p:txBody>
+        </p:sp>
+        <p:cxnSp>
+          <p:nvCxnSpPr>
+            <p:cNvPr id="430" name="Gerade Verbindung mit Pfeil 429"/>
+            <p:cNvCxnSpPr/>
+            <p:nvPr/>
+          </p:nvCxnSpPr>
+          <p:spPr>
+            <a:xfrm flipV="1">
+              <a:off x="4850698" y="6025615"/>
+              <a:ext cx="6673645" cy="5081"/>
+            </a:xfrm>
+            <a:prstGeom prst="straightConnector1">
+              <a:avLst/>
+            </a:prstGeom>
+            <a:grpFill/>
+            <a:ln w="12700">
+              <a:solidFill>
+                <a:schemeClr val="tx1"/>
+              </a:solidFill>
+              <a:tailEnd type="triangle"/>
+            </a:ln>
+          </p:spPr>
+          <p:style>
+            <a:lnRef idx="1">
+              <a:schemeClr val="accent1"/>
+            </a:lnRef>
+            <a:fillRef idx="0">
+              <a:schemeClr val="accent1"/>
+            </a:fillRef>
+            <a:effectRef idx="0">
+              <a:schemeClr val="accent1"/>
+            </a:effectRef>
+            <a:fontRef idx="minor">
+              <a:schemeClr val="tx1"/>
+            </a:fontRef>
+          </p:style>
+        </p:cxnSp>
+        <p:sp>
+          <p:nvSpPr>
+            <p:cNvPr id="431" name="Textfeld 430"/>
+            <p:cNvSpPr txBox="1"/>
+            <p:nvPr/>
+          </p:nvSpPr>
+          <p:spPr>
+            <a:xfrm>
+              <a:off x="4926276" y="6049578"/>
+              <a:ext cx="223138" cy="184666"/>
+            </a:xfrm>
+            <a:prstGeom prst="rect">
+              <a:avLst/>
+            </a:prstGeom>
+            <a:grpFill/>
+          </p:spPr>
+          <p:txBody>
+            <a:bodyPr wrap="none" rtlCol="0">
+              <a:spAutoFit/>
+            </a:bodyPr>
+            <a:lstStyle/>
+            <a:p>
+              <a:r>
+                <a:rPr lang="de-DE" sz="600" dirty="0" smtClean="0"/>
+                <a:t>1</a:t>
+              </a:r>
+              <a:endParaRPr lang="en-US" sz="600" dirty="0"/>
+            </a:p>
+          </p:txBody>
+        </p:sp>
+        <p:sp>
+          <p:nvSpPr>
+            <p:cNvPr id="432" name="Textfeld 431"/>
+            <p:cNvSpPr txBox="1"/>
+            <p:nvPr/>
+          </p:nvSpPr>
+          <p:spPr>
+            <a:xfrm>
+              <a:off x="5424948" y="6049578"/>
+              <a:ext cx="223138" cy="184666"/>
+            </a:xfrm>
+            <a:prstGeom prst="rect">
+              <a:avLst/>
+            </a:prstGeom>
+            <a:grpFill/>
+          </p:spPr>
+          <p:txBody>
+            <a:bodyPr wrap="none" rtlCol="0">
+              <a:spAutoFit/>
+            </a:bodyPr>
+            <a:lstStyle/>
+            <a:p>
+              <a:r>
+                <a:rPr lang="de-DE" sz="600" dirty="0" smtClean="0"/>
+                <a:t>2</a:t>
+              </a:r>
+              <a:endParaRPr lang="en-US" sz="600" dirty="0"/>
+            </a:p>
+          </p:txBody>
+        </p:sp>
+        <p:sp>
+          <p:nvSpPr>
+            <p:cNvPr id="433" name="Textfeld 432"/>
+            <p:cNvSpPr txBox="1"/>
+            <p:nvPr/>
+          </p:nvSpPr>
+          <p:spPr>
+            <a:xfrm>
+              <a:off x="5923620" y="6049578"/>
+              <a:ext cx="223138" cy="184666"/>
+            </a:xfrm>
+            <a:prstGeom prst="rect">
+              <a:avLst/>
+            </a:prstGeom>
+            <a:grpFill/>
+          </p:spPr>
+          <p:txBody>
+            <a:bodyPr wrap="none" rtlCol="0">
+              <a:spAutoFit/>
+            </a:bodyPr>
+            <a:lstStyle/>
+            <a:p>
+              <a:r>
+                <a:rPr lang="de-DE" sz="600" dirty="0" smtClean="0"/>
+                <a:t>3</a:t>
+              </a:r>
+              <a:endParaRPr lang="en-US" sz="600" dirty="0"/>
+            </a:p>
+          </p:txBody>
+        </p:sp>
+        <p:sp>
+          <p:nvSpPr>
+            <p:cNvPr id="434" name="Textfeld 433"/>
+            <p:cNvSpPr txBox="1"/>
+            <p:nvPr/>
+          </p:nvSpPr>
+          <p:spPr>
+            <a:xfrm>
+              <a:off x="6378750" y="6049578"/>
+              <a:ext cx="223138" cy="184666"/>
+            </a:xfrm>
+            <a:prstGeom prst="rect">
+              <a:avLst/>
+            </a:prstGeom>
+            <a:grpFill/>
+          </p:spPr>
+          <p:txBody>
+            <a:bodyPr wrap="none" rtlCol="0">
+              <a:spAutoFit/>
+            </a:bodyPr>
+            <a:lstStyle/>
+            <a:p>
+              <a:r>
+                <a:rPr lang="de-DE" sz="600" dirty="0" smtClean="0"/>
+                <a:t>4</a:t>
+              </a:r>
+              <a:endParaRPr lang="en-US" sz="600" dirty="0"/>
+            </a:p>
+          </p:txBody>
+        </p:sp>
+        <p:sp>
+          <p:nvSpPr>
+            <p:cNvPr id="435" name="Textfeld 434"/>
+            <p:cNvSpPr txBox="1"/>
+            <p:nvPr/>
+          </p:nvSpPr>
+          <p:spPr>
+            <a:xfrm>
+              <a:off x="6841137" y="6049578"/>
+              <a:ext cx="223138" cy="184666"/>
+            </a:xfrm>
+            <a:prstGeom prst="rect">
+              <a:avLst/>
+            </a:prstGeom>
+            <a:grpFill/>
+          </p:spPr>
+          <p:txBody>
+            <a:bodyPr wrap="none" rtlCol="0">
+              <a:spAutoFit/>
+            </a:bodyPr>
+            <a:lstStyle/>
+            <a:p>
+              <a:r>
+                <a:rPr lang="de-DE" sz="600" dirty="0" smtClean="0"/>
+                <a:t>5</a:t>
+              </a:r>
+              <a:endParaRPr lang="en-US" sz="600" dirty="0"/>
+            </a:p>
+          </p:txBody>
+        </p:sp>
+        <p:sp>
+          <p:nvSpPr>
+            <p:cNvPr id="436" name="Textfeld 435"/>
+            <p:cNvSpPr txBox="1"/>
+            <p:nvPr/>
+          </p:nvSpPr>
+          <p:spPr>
+            <a:xfrm>
+              <a:off x="7310781" y="6049578"/>
+              <a:ext cx="223138" cy="184666"/>
+            </a:xfrm>
+            <a:prstGeom prst="rect">
+              <a:avLst/>
+            </a:prstGeom>
+            <a:grpFill/>
+          </p:spPr>
+          <p:txBody>
+            <a:bodyPr wrap="none" rtlCol="0">
+              <a:spAutoFit/>
+            </a:bodyPr>
+            <a:lstStyle/>
+            <a:p>
+              <a:r>
+                <a:rPr lang="de-DE" sz="600" dirty="0" smtClean="0"/>
+                <a:t>6</a:t>
+              </a:r>
+              <a:endParaRPr lang="en-US" sz="600" dirty="0"/>
+            </a:p>
+          </p:txBody>
+        </p:sp>
+        <p:sp>
+          <p:nvSpPr>
+            <p:cNvPr id="437" name="Textfeld 436"/>
+            <p:cNvSpPr txBox="1"/>
+            <p:nvPr/>
+          </p:nvSpPr>
+          <p:spPr>
+            <a:xfrm>
+              <a:off x="7787682" y="6049578"/>
+              <a:ext cx="223138" cy="184666"/>
+            </a:xfrm>
+            <a:prstGeom prst="rect">
+              <a:avLst/>
+            </a:prstGeom>
+            <a:grpFill/>
+          </p:spPr>
+          <p:txBody>
+            <a:bodyPr wrap="none" rtlCol="0">
+              <a:spAutoFit/>
+            </a:bodyPr>
+            <a:lstStyle/>
+            <a:p>
+              <a:r>
+                <a:rPr lang="de-DE" sz="600" dirty="0" smtClean="0"/>
+                <a:t>7</a:t>
+              </a:r>
+              <a:endParaRPr lang="en-US" sz="600" dirty="0"/>
+            </a:p>
+          </p:txBody>
+        </p:sp>
+        <p:sp>
+          <p:nvSpPr>
+            <p:cNvPr id="438" name="Textfeld 437"/>
+            <p:cNvSpPr txBox="1"/>
+            <p:nvPr/>
+          </p:nvSpPr>
+          <p:spPr>
+            <a:xfrm>
+              <a:off x="8271840" y="6049578"/>
+              <a:ext cx="223138" cy="184666"/>
+            </a:xfrm>
+            <a:prstGeom prst="rect">
+              <a:avLst/>
+            </a:prstGeom>
+            <a:grpFill/>
+          </p:spPr>
+          <p:txBody>
+            <a:bodyPr wrap="none" rtlCol="0">
+              <a:spAutoFit/>
+            </a:bodyPr>
+            <a:lstStyle/>
+            <a:p>
+              <a:r>
+                <a:rPr lang="de-DE" sz="600" dirty="0" smtClean="0"/>
+                <a:t>8</a:t>
+              </a:r>
+              <a:endParaRPr lang="en-US" sz="600" dirty="0"/>
+            </a:p>
+          </p:txBody>
+        </p:sp>
+        <p:sp>
+          <p:nvSpPr>
+            <p:cNvPr id="439" name="Textfeld 438"/>
+            <p:cNvSpPr txBox="1"/>
+            <p:nvPr/>
+          </p:nvSpPr>
+          <p:spPr>
+            <a:xfrm>
+              <a:off x="8726970" y="6049578"/>
+              <a:ext cx="223138" cy="184666"/>
+            </a:xfrm>
+            <a:prstGeom prst="rect">
+              <a:avLst/>
+            </a:prstGeom>
+            <a:grpFill/>
+          </p:spPr>
+          <p:txBody>
+            <a:bodyPr wrap="none" rtlCol="0">
+              <a:spAutoFit/>
+            </a:bodyPr>
+            <a:lstStyle/>
+            <a:p>
+              <a:r>
+                <a:rPr lang="de-DE" sz="600" dirty="0" smtClean="0"/>
+                <a:t>9</a:t>
+              </a:r>
+              <a:endParaRPr lang="en-US" sz="600" dirty="0"/>
+            </a:p>
+          </p:txBody>
+        </p:sp>
+        <p:sp>
+          <p:nvSpPr>
+            <p:cNvPr id="440" name="Textfeld 439"/>
+            <p:cNvSpPr txBox="1"/>
+            <p:nvPr/>
+          </p:nvSpPr>
+          <p:spPr>
+            <a:xfrm>
+              <a:off x="9159204" y="6049578"/>
+              <a:ext cx="261610" cy="184666"/>
+            </a:xfrm>
+            <a:prstGeom prst="rect">
+              <a:avLst/>
+            </a:prstGeom>
+            <a:grpFill/>
+          </p:spPr>
+          <p:txBody>
+            <a:bodyPr wrap="none" rtlCol="0">
+              <a:spAutoFit/>
+            </a:bodyPr>
+            <a:lstStyle/>
+            <a:p>
+              <a:r>
+                <a:rPr lang="de-DE" sz="600" dirty="0" smtClean="0"/>
+                <a:t>10</a:t>
+              </a:r>
+              <a:endParaRPr lang="en-US" sz="600" dirty="0"/>
+            </a:p>
+          </p:txBody>
+        </p:sp>
+        <p:sp>
+          <p:nvSpPr>
+            <p:cNvPr id="441" name="Textfeld 440"/>
+            <p:cNvSpPr txBox="1"/>
+            <p:nvPr/>
+          </p:nvSpPr>
+          <p:spPr>
+            <a:xfrm>
+              <a:off x="9614398" y="6049578"/>
+              <a:ext cx="261610" cy="184666"/>
+            </a:xfrm>
+            <a:prstGeom prst="rect">
+              <a:avLst/>
+            </a:prstGeom>
+            <a:grpFill/>
+          </p:spPr>
+          <p:txBody>
+            <a:bodyPr wrap="none" rtlCol="0">
+              <a:spAutoFit/>
+            </a:bodyPr>
+            <a:lstStyle/>
+            <a:p>
+              <a:r>
+                <a:rPr lang="de-DE" sz="600" dirty="0" smtClean="0"/>
+                <a:t>11</a:t>
+              </a:r>
+              <a:endParaRPr lang="en-US" sz="600" dirty="0"/>
+            </a:p>
+          </p:txBody>
+        </p:sp>
+        <p:sp>
+          <p:nvSpPr>
+            <p:cNvPr id="442" name="Rechteck 441"/>
+            <p:cNvSpPr/>
+            <p:nvPr/>
+          </p:nvSpPr>
+          <p:spPr>
+            <a:xfrm>
+              <a:off x="10064343" y="5900060"/>
+              <a:ext cx="355600" cy="63832"/>
+            </a:xfrm>
+            <a:prstGeom prst="rect">
+              <a:avLst/>
+            </a:prstGeom>
+            <a:grpFill/>
+            <a:ln>
+              <a:noFill/>
+            </a:ln>
+          </p:spPr>
+          <p:style>
+            <a:lnRef idx="2">
+              <a:schemeClr val="accent1">
+                <a:shade val="50000"/>
+              </a:schemeClr>
+            </a:lnRef>
+            <a:fillRef idx="1">
+              <a:schemeClr val="accent1"/>
+            </a:fillRef>
+            <a:effectRef idx="0">
+              <a:schemeClr val="accent1"/>
+            </a:effectRef>
+            <a:fontRef idx="minor">
+              <a:schemeClr val="lt1"/>
+            </a:fontRef>
+          </p:style>
+          <p:txBody>
+            <a:bodyPr rtlCol="0" anchor="ctr"/>
+            <a:lstStyle/>
+            <a:p>
+              <a:pPr algn="ctr"/>
+              <a:endParaRPr lang="en-US" sz="600"/>
+            </a:p>
+          </p:txBody>
+        </p:sp>
+        <p:sp>
+          <p:nvSpPr>
+            <p:cNvPr id="443" name="Textfeld 442"/>
+            <p:cNvSpPr txBox="1"/>
+            <p:nvPr/>
+          </p:nvSpPr>
+          <p:spPr>
+            <a:xfrm>
+              <a:off x="10035315" y="6049581"/>
+              <a:ext cx="261610" cy="184666"/>
+            </a:xfrm>
+            <a:prstGeom prst="rect">
+              <a:avLst/>
+            </a:prstGeom>
+            <a:grpFill/>
+          </p:spPr>
+          <p:txBody>
+            <a:bodyPr wrap="none" rtlCol="0">
+              <a:spAutoFit/>
+            </a:bodyPr>
+            <a:lstStyle/>
+            <a:p>
+              <a:r>
+                <a:rPr lang="de-DE" sz="600" dirty="0" smtClean="0"/>
+                <a:t>12</a:t>
+              </a:r>
+              <a:endParaRPr lang="en-US" sz="600" dirty="0"/>
+            </a:p>
+          </p:txBody>
+        </p:sp>
+        <p:sp>
+          <p:nvSpPr>
+            <p:cNvPr id="444" name="Rechteck 443"/>
+            <p:cNvSpPr/>
+            <p:nvPr/>
+          </p:nvSpPr>
+          <p:spPr>
+            <a:xfrm>
+              <a:off x="10485260" y="5900063"/>
+              <a:ext cx="355600" cy="63832"/>
+            </a:xfrm>
+            <a:prstGeom prst="rect">
+              <a:avLst/>
+            </a:prstGeom>
+            <a:grpFill/>
+            <a:ln>
+              <a:noFill/>
+            </a:ln>
+          </p:spPr>
+          <p:style>
+            <a:lnRef idx="2">
+              <a:schemeClr val="accent1">
+                <a:shade val="50000"/>
+              </a:schemeClr>
+            </a:lnRef>
+            <a:fillRef idx="1">
+              <a:schemeClr val="accent1"/>
+            </a:fillRef>
+            <a:effectRef idx="0">
+              <a:schemeClr val="accent1"/>
+            </a:effectRef>
+            <a:fontRef idx="minor">
+              <a:schemeClr val="lt1"/>
+            </a:fontRef>
+          </p:style>
+          <p:txBody>
+            <a:bodyPr rtlCol="0" anchor="ctr"/>
+            <a:lstStyle/>
+            <a:p>
+              <a:pPr algn="ctr"/>
+              <a:endParaRPr lang="en-US" sz="600"/>
+            </a:p>
+          </p:txBody>
+        </p:sp>
+        <p:sp>
+          <p:nvSpPr>
+            <p:cNvPr id="445" name="Textfeld 444"/>
+            <p:cNvSpPr txBox="1"/>
+            <p:nvPr/>
+          </p:nvSpPr>
+          <p:spPr>
+            <a:xfrm>
+              <a:off x="10456232" y="6049584"/>
+              <a:ext cx="261610" cy="184666"/>
+            </a:xfrm>
+            <a:prstGeom prst="rect">
+              <a:avLst/>
+            </a:prstGeom>
+            <a:grpFill/>
+          </p:spPr>
+          <p:txBody>
+            <a:bodyPr wrap="none" rtlCol="0">
+              <a:spAutoFit/>
+            </a:bodyPr>
+            <a:lstStyle/>
+            <a:p>
+              <a:r>
+                <a:rPr lang="de-DE" sz="600" dirty="0" smtClean="0"/>
+                <a:t>13</a:t>
+              </a:r>
+              <a:endParaRPr lang="en-US" sz="600" dirty="0"/>
+            </a:p>
+          </p:txBody>
+        </p:sp>
+        <p:sp>
+          <p:nvSpPr>
+            <p:cNvPr id="446" name="Rechteck 445"/>
+            <p:cNvSpPr/>
+            <p:nvPr/>
+          </p:nvSpPr>
+          <p:spPr>
+            <a:xfrm>
+              <a:off x="10906177" y="5900066"/>
+              <a:ext cx="355600" cy="63832"/>
+            </a:xfrm>
+            <a:prstGeom prst="rect">
+              <a:avLst/>
+            </a:prstGeom>
+            <a:grpFill/>
+            <a:ln>
+              <a:noFill/>
+            </a:ln>
+          </p:spPr>
+          <p:style>
+            <a:lnRef idx="2">
+              <a:schemeClr val="accent1">
+                <a:shade val="50000"/>
+              </a:schemeClr>
+            </a:lnRef>
+            <a:fillRef idx="1">
+              <a:schemeClr val="accent1"/>
+            </a:fillRef>
+            <a:effectRef idx="0">
+              <a:schemeClr val="accent1"/>
+            </a:effectRef>
+            <a:fontRef idx="minor">
+              <a:schemeClr val="lt1"/>
+            </a:fontRef>
+          </p:style>
+          <p:txBody>
+            <a:bodyPr rtlCol="0" anchor="ctr"/>
+            <a:lstStyle/>
+            <a:p>
+              <a:pPr algn="ctr"/>
+              <a:endParaRPr lang="en-US" sz="600"/>
+            </a:p>
+          </p:txBody>
+        </p:sp>
+        <p:sp>
+          <p:nvSpPr>
+            <p:cNvPr id="447" name="Textfeld 446"/>
+            <p:cNvSpPr txBox="1"/>
+            <p:nvPr/>
+          </p:nvSpPr>
+          <p:spPr>
+            <a:xfrm>
+              <a:off x="10877149" y="6049587"/>
+              <a:ext cx="261610" cy="184666"/>
+            </a:xfrm>
+            <a:prstGeom prst="rect">
+              <a:avLst/>
+            </a:prstGeom>
+            <a:grpFill/>
+          </p:spPr>
+          <p:txBody>
+            <a:bodyPr wrap="none" rtlCol="0">
+              <a:spAutoFit/>
+            </a:bodyPr>
+            <a:lstStyle/>
+            <a:p>
+              <a:r>
+                <a:rPr lang="de-DE" sz="600" dirty="0" smtClean="0"/>
+                <a:t>14</a:t>
+              </a:r>
+              <a:endParaRPr lang="en-US" sz="600" dirty="0"/>
+            </a:p>
+          </p:txBody>
+        </p:sp>
+      </p:grpSp>
+      <p:cxnSp>
+        <p:nvCxnSpPr>
+          <p:cNvPr id="448" name="Gerade Verbindung mit Pfeil 447"/>
+          <p:cNvCxnSpPr/>
+          <p:nvPr/>
+        </p:nvCxnSpPr>
+        <p:spPr>
+          <a:xfrm flipV="1">
+            <a:off x="1583450" y="2327349"/>
+            <a:ext cx="8475" cy="2749757"/>
+          </a:xfrm>
+          <a:prstGeom prst="straightConnector1">
+            <a:avLst/>
+          </a:prstGeom>
+          <a:ln w="38100">
+            <a:solidFill>
+              <a:srgbClr val="00B050"/>
+            </a:solidFill>
+            <a:tailEnd type="triangle"/>
+          </a:ln>
+        </p:spPr>
+        <p:style>
+          <a:lnRef idx="1">
+            <a:schemeClr val="accent1"/>
+          </a:lnRef>
+          <a:fillRef idx="0">
+            <a:schemeClr val="accent1"/>
+          </a:fillRef>
+          <a:effectRef idx="0">
+            <a:schemeClr val="accent1"/>
+          </a:effectRef>
+          <a:fontRef idx="minor">
+            <a:schemeClr val="tx1"/>
+          </a:fontRef>
+        </p:style>
+      </p:cxnSp>
+      <p:sp>
+        <p:nvSpPr>
+          <p:cNvPr id="452" name="Rechteck 451"/>
+          <p:cNvSpPr/>
+          <p:nvPr/>
+        </p:nvSpPr>
+        <p:spPr>
+          <a:xfrm>
+            <a:off x="1534958" y="5076030"/>
+            <a:ext cx="98201" cy="372209"/>
+          </a:xfrm>
+          <a:prstGeom prst="rect">
+            <a:avLst/>
+          </a:prstGeom>
+          <a:noFill/>
+          <a:ln w="28575">
+            <a:solidFill>
+              <a:srgbClr val="00B050"/>
+            </a:solidFill>
+          </a:ln>
+        </p:spPr>
+        <p:style>
+          <a:lnRef idx="2">
+            <a:schemeClr val="accent1">
+              <a:shade val="50000"/>
+            </a:schemeClr>
+          </a:lnRef>
+          <a:fillRef idx="1">
+            <a:schemeClr val="accent1"/>
+          </a:fillRef>
+          <a:effectRef idx="0">
+            <a:schemeClr val="accent1"/>
+          </a:effectRef>
+          <a:fontRef idx="minor">
+            <a:schemeClr val="lt1"/>
+          </a:fontRef>
+        </p:style>
+        <p:txBody>
+          <a:bodyPr rtlCol="0" anchor="ctr"/>
+          <a:lstStyle/>
+          <a:p>
+            <a:pPr algn="ctr"/>
+            <a:endParaRPr lang="en-US"/>
+          </a:p>
+        </p:txBody>
+      </p:sp>
+      <p:sp>
+        <p:nvSpPr>
+          <p:cNvPr id="453" name="Textfeld 452"/>
+          <p:cNvSpPr txBox="1"/>
+          <p:nvPr/>
+        </p:nvSpPr>
+        <p:spPr>
+          <a:xfrm>
+            <a:off x="1625917" y="2666732"/>
+            <a:ext cx="293066" cy="307777"/>
+          </a:xfrm>
+          <a:prstGeom prst="rect">
+            <a:avLst/>
+          </a:prstGeom>
+          <a:noFill/>
+        </p:spPr>
+        <p:txBody>
+          <a:bodyPr wrap="square" rtlCol="0">
+            <a:spAutoFit/>
+          </a:bodyPr>
+          <a:lstStyle/>
+          <a:p>
+            <a:r>
+              <a:rPr lang="de-DE" sz="1400" dirty="0" smtClean="0"/>
+              <a:t>1</a:t>
+            </a:r>
+          </a:p>
+        </p:txBody>
+      </p:sp>
+      <p:sp>
+        <p:nvSpPr>
+          <p:cNvPr id="463" name="Rechteck 462"/>
+          <p:cNvSpPr/>
+          <p:nvPr/>
+        </p:nvSpPr>
+        <p:spPr>
+          <a:xfrm>
+            <a:off x="652696" y="4876159"/>
+            <a:ext cx="1068927" cy="453773"/>
+          </a:xfrm>
+          <a:prstGeom prst="rect">
+            <a:avLst/>
+          </a:prstGeom>
+          <a:noFill/>
+          <a:ln w="28575">
+            <a:solidFill>
+              <a:srgbClr val="0070C0"/>
+            </a:solidFill>
+          </a:ln>
+        </p:spPr>
+        <p:style>
+          <a:lnRef idx="2">
+            <a:schemeClr val="accent1">
+              <a:shade val="50000"/>
+            </a:schemeClr>
+          </a:lnRef>
+          <a:fillRef idx="1">
+            <a:schemeClr val="accent1"/>
+          </a:fillRef>
+          <a:effectRef idx="0">
+            <a:schemeClr val="accent1"/>
+          </a:effectRef>
+          <a:fontRef idx="minor">
+            <a:schemeClr val="lt1"/>
+          </a:fontRef>
+        </p:style>
+        <p:txBody>
+          <a:bodyPr rtlCol="0" anchor="ctr"/>
+          <a:lstStyle/>
+          <a:p>
+            <a:pPr algn="ctr"/>
+            <a:endParaRPr lang="en-US"/>
+          </a:p>
+        </p:txBody>
+      </p:sp>
+      <p:cxnSp>
+        <p:nvCxnSpPr>
+          <p:cNvPr id="507" name="Gerade Verbindung mit Pfeil 506"/>
+          <p:cNvCxnSpPr/>
+          <p:nvPr/>
+        </p:nvCxnSpPr>
+        <p:spPr>
+          <a:xfrm flipV="1">
+            <a:off x="7549953" y="3442522"/>
+            <a:ext cx="2540472" cy="2531003"/>
+          </a:xfrm>
+          <a:prstGeom prst="straightConnector1">
+            <a:avLst/>
+          </a:prstGeom>
+          <a:ln w="38100">
+            <a:solidFill>
+              <a:srgbClr val="00B050"/>
+            </a:solidFill>
+            <a:tailEnd type="triangle"/>
+          </a:ln>
+        </p:spPr>
+        <p:style>
+          <a:lnRef idx="1">
+            <a:schemeClr val="accent1"/>
+          </a:lnRef>
+          <a:fillRef idx="0">
+            <a:schemeClr val="accent1"/>
+          </a:fillRef>
+          <a:effectRef idx="0">
+            <a:schemeClr val="accent1"/>
+          </a:effectRef>
+          <a:fontRef idx="minor">
+            <a:schemeClr val="tx1"/>
+          </a:fontRef>
+        </p:style>
+      </p:cxnSp>
+      <p:sp>
+        <p:nvSpPr>
+          <p:cNvPr id="509" name="Textfeld 508"/>
+          <p:cNvSpPr txBox="1"/>
+          <p:nvPr/>
+        </p:nvSpPr>
+        <p:spPr>
+          <a:xfrm>
+            <a:off x="9083694" y="4392984"/>
+            <a:ext cx="537080" cy="307777"/>
+          </a:xfrm>
+          <a:prstGeom prst="rect">
+            <a:avLst/>
+          </a:prstGeom>
+          <a:noFill/>
+        </p:spPr>
+        <p:txBody>
+          <a:bodyPr wrap="square" rtlCol="0">
+            <a:spAutoFit/>
+          </a:bodyPr>
+          <a:lstStyle/>
+          <a:p>
+            <a:r>
+              <a:rPr lang="de-DE" sz="1400" dirty="0" smtClean="0"/>
+              <a:t>1</a:t>
+            </a:r>
+            <a:endParaRPr lang="en-US" sz="1400" dirty="0"/>
+          </a:p>
+        </p:txBody>
+      </p:sp>
     </p:spTree>
     <p:extLst>
       <p:ext uri="{BB962C8B-B14F-4D97-AF65-F5344CB8AC3E}">
@@ -12005,6 +13251,13 @@
   <p:clrMapOvr>
     <a:masterClrMapping/>
   </p:clrMapOvr>
+  <p:timing>
+    <p:tnLst>
+      <p:par>
+        <p:cTn id="1" dur="indefinite" restart="never" nodeType="tmRoot"/>
+      </p:par>
+    </p:tnLst>
+  </p:timing>
 </p:sld>
 </file>
 
@@ -12035,6 +13288,13 @@
   <p:clrMapOvr>
     <a:masterClrMapping/>
   </p:clrMapOvr>
+  <p:timing>
+    <p:tnLst>
+      <p:par>
+        <p:cTn id="1" dur="indefinite" restart="never" nodeType="tmRoot"/>
+      </p:par>
+    </p:tnLst>
+  </p:timing>
 </p:sld>
 </file>
 

</xml_diff>

<commit_message>
Fully-fletched system with age groups and intensive care state.
</commit_message>
<xml_diff>
--- a/research/CORONA_Model.pptx
+++ b/research/CORONA_Model.pptx
@@ -107,6 +107,11 @@
       </a:defRPr>
     </a:lvl9pPr>
   </p:defaultTextStyle>
+  <p:extLst>
+    <p:ext uri="{EFAFB233-063F-42B5-8137-9DF3F51BA10A}">
+      <p15:sldGuideLst xmlns:p15="http://schemas.microsoft.com/office/powerpoint/2012/main"/>
+    </p:ext>
+  </p:extLst>
 </p:presentation>
 </file>
 
@@ -241,7 +246,7 @@
           <a:p>
             <a:fld id="{892A93C0-FA96-4AF9-A2A1-287FA3C3E6F8}" type="datetimeFigureOut">
               <a:rPr lang="en-US" smtClean="0"/>
-              <a:t>3/23/2020</a:t>
+              <a:t>3/25/2020</a:t>
             </a:fld>
             <a:endParaRPr lang="en-US"/>
           </a:p>
@@ -411,7 +416,7 @@
           <a:p>
             <a:fld id="{892A93C0-FA96-4AF9-A2A1-287FA3C3E6F8}" type="datetimeFigureOut">
               <a:rPr lang="en-US" smtClean="0"/>
-              <a:t>3/23/2020</a:t>
+              <a:t>3/25/2020</a:t>
             </a:fld>
             <a:endParaRPr lang="en-US"/>
           </a:p>
@@ -591,7 +596,7 @@
           <a:p>
             <a:fld id="{892A93C0-FA96-4AF9-A2A1-287FA3C3E6F8}" type="datetimeFigureOut">
               <a:rPr lang="en-US" smtClean="0"/>
-              <a:t>3/23/2020</a:t>
+              <a:t>3/25/2020</a:t>
             </a:fld>
             <a:endParaRPr lang="en-US"/>
           </a:p>
@@ -761,7 +766,7 @@
           <a:p>
             <a:fld id="{892A93C0-FA96-4AF9-A2A1-287FA3C3E6F8}" type="datetimeFigureOut">
               <a:rPr lang="en-US" smtClean="0"/>
-              <a:t>3/23/2020</a:t>
+              <a:t>3/25/2020</a:t>
             </a:fld>
             <a:endParaRPr lang="en-US"/>
           </a:p>
@@ -1007,7 +1012,7 @@
           <a:p>
             <a:fld id="{892A93C0-FA96-4AF9-A2A1-287FA3C3E6F8}" type="datetimeFigureOut">
               <a:rPr lang="en-US" smtClean="0"/>
-              <a:t>3/23/2020</a:t>
+              <a:t>3/25/2020</a:t>
             </a:fld>
             <a:endParaRPr lang="en-US"/>
           </a:p>
@@ -1239,7 +1244,7 @@
           <a:p>
             <a:fld id="{892A93C0-FA96-4AF9-A2A1-287FA3C3E6F8}" type="datetimeFigureOut">
               <a:rPr lang="en-US" smtClean="0"/>
-              <a:t>3/23/2020</a:t>
+              <a:t>3/25/2020</a:t>
             </a:fld>
             <a:endParaRPr lang="en-US"/>
           </a:p>
@@ -1606,7 +1611,7 @@
           <a:p>
             <a:fld id="{892A93C0-FA96-4AF9-A2A1-287FA3C3E6F8}" type="datetimeFigureOut">
               <a:rPr lang="en-US" smtClean="0"/>
-              <a:t>3/23/2020</a:t>
+              <a:t>3/25/2020</a:t>
             </a:fld>
             <a:endParaRPr lang="en-US"/>
           </a:p>
@@ -1724,7 +1729,7 @@
           <a:p>
             <a:fld id="{892A93C0-FA96-4AF9-A2A1-287FA3C3E6F8}" type="datetimeFigureOut">
               <a:rPr lang="en-US" smtClean="0"/>
-              <a:t>3/23/2020</a:t>
+              <a:t>3/25/2020</a:t>
             </a:fld>
             <a:endParaRPr lang="en-US"/>
           </a:p>
@@ -1819,7 +1824,7 @@
           <a:p>
             <a:fld id="{892A93C0-FA96-4AF9-A2A1-287FA3C3E6F8}" type="datetimeFigureOut">
               <a:rPr lang="en-US" smtClean="0"/>
-              <a:t>3/23/2020</a:t>
+              <a:t>3/25/2020</a:t>
             </a:fld>
             <a:endParaRPr lang="en-US"/>
           </a:p>
@@ -2096,7 +2101,7 @@
           <a:p>
             <a:fld id="{892A93C0-FA96-4AF9-A2A1-287FA3C3E6F8}" type="datetimeFigureOut">
               <a:rPr lang="en-US" smtClean="0"/>
-              <a:t>3/23/2020</a:t>
+              <a:t>3/25/2020</a:t>
             </a:fld>
             <a:endParaRPr lang="en-US"/>
           </a:p>
@@ -2349,7 +2354,7 @@
           <a:p>
             <a:fld id="{892A93C0-FA96-4AF9-A2A1-287FA3C3E6F8}" type="datetimeFigureOut">
               <a:rPr lang="en-US" smtClean="0"/>
-              <a:t>3/23/2020</a:t>
+              <a:t>3/25/2020</a:t>
             </a:fld>
             <a:endParaRPr lang="en-US"/>
           </a:p>
@@ -2562,7 +2567,7 @@
           <a:p>
             <a:fld id="{892A93C0-FA96-4AF9-A2A1-287FA3C3E6F8}" type="datetimeFigureOut">
               <a:rPr lang="en-US" smtClean="0"/>
-              <a:t>3/23/2020</a:t>
+              <a:t>3/25/2020</a:t>
             </a:fld>
             <a:endParaRPr lang="en-US"/>
           </a:p>
@@ -3168,10 +3173,10 @@
         </p:nvGrpSpPr>
         <p:grpSpPr>
           <a:xfrm>
-            <a:off x="425071" y="526951"/>
-            <a:ext cx="1200529" cy="987524"/>
+            <a:off x="397948" y="512842"/>
+            <a:ext cx="2035866" cy="987524"/>
             <a:chOff x="831471" y="1610336"/>
-            <a:chExt cx="1200529" cy="1268482"/>
+            <a:chExt cx="2035866" cy="1268482"/>
           </a:xfrm>
         </p:grpSpPr>
         <p:grpSp>
@@ -3669,7 +3674,7 @@
           <p:spPr>
             <a:xfrm>
               <a:off x="1020228" y="1610336"/>
-              <a:ext cx="540212" cy="369332"/>
+              <a:ext cx="1847109" cy="474410"/>
             </a:xfrm>
             <a:prstGeom prst="rect">
               <a:avLst/>
@@ -3684,538 +3689,15 @@
             <a:p>
               <a:r>
                 <a:rPr lang="de-DE" dirty="0" smtClean="0"/>
-                <a:t>Age</a:t>
+                <a:t>Age (</a:t>
               </a:r>
-              <a:endParaRPr lang="en-US" dirty="0"/>
-            </a:p>
-          </p:txBody>
-        </p:sp>
-      </p:grpSp>
-      <p:grpSp>
-        <p:nvGrpSpPr>
-          <p:cNvPr id="62" name="Gruppieren 61"/>
-          <p:cNvGrpSpPr/>
-          <p:nvPr/>
-        </p:nvGrpSpPr>
-        <p:grpSpPr>
-          <a:xfrm>
-            <a:off x="3932066" y="439439"/>
-            <a:ext cx="1193272" cy="987524"/>
-            <a:chOff x="838728" y="1610336"/>
-            <a:chExt cx="1193272" cy="1268482"/>
-          </a:xfrm>
-        </p:grpSpPr>
-        <p:grpSp>
-          <p:nvGrpSpPr>
-            <p:cNvPr id="63" name="Gruppieren 62"/>
-            <p:cNvGrpSpPr/>
-            <p:nvPr/>
-          </p:nvGrpSpPr>
-          <p:grpSpPr>
-            <a:xfrm>
-              <a:off x="838728" y="1923142"/>
-              <a:ext cx="1193272" cy="955676"/>
-              <a:chOff x="1186452" y="2888344"/>
-              <a:chExt cx="3221170" cy="2860511"/>
-            </a:xfrm>
-          </p:grpSpPr>
-          <p:sp>
-            <p:nvSpPr>
-              <p:cNvPr id="65" name="Rechteck 64"/>
-              <p:cNvSpPr/>
-              <p:nvPr/>
-            </p:nvSpPr>
-            <p:spPr>
-              <a:xfrm>
-                <a:off x="1320800" y="4484913"/>
-                <a:ext cx="355600" cy="703943"/>
-              </a:xfrm>
-              <a:prstGeom prst="rect">
-                <a:avLst/>
-              </a:prstGeom>
-            </p:spPr>
-            <p:style>
-              <a:lnRef idx="2">
-                <a:schemeClr val="accent1">
-                  <a:shade val="50000"/>
-                </a:schemeClr>
-              </a:lnRef>
-              <a:fillRef idx="1">
-                <a:schemeClr val="accent1"/>
-              </a:fillRef>
-              <a:effectRef idx="0">
-                <a:schemeClr val="accent1"/>
-              </a:effectRef>
-              <a:fontRef idx="minor">
-                <a:schemeClr val="lt1"/>
-              </a:fontRef>
-            </p:style>
-            <p:txBody>
-              <a:bodyPr rtlCol="0" anchor="ctr"/>
-              <a:lstStyle/>
-              <a:p>
-                <a:pPr algn="ctr"/>
-                <a:endParaRPr lang="en-US" sz="600"/>
-              </a:p>
-            </p:txBody>
-          </p:sp>
-          <p:sp>
-            <p:nvSpPr>
-              <p:cNvPr id="66" name="Rechteck 65"/>
-              <p:cNvSpPr/>
-              <p:nvPr/>
-            </p:nvSpPr>
-            <p:spPr>
-              <a:xfrm>
-                <a:off x="1792515" y="4093030"/>
-                <a:ext cx="355600" cy="1095826"/>
-              </a:xfrm>
-              <a:prstGeom prst="rect">
-                <a:avLst/>
-              </a:prstGeom>
-            </p:spPr>
-            <p:style>
-              <a:lnRef idx="2">
-                <a:schemeClr val="accent1">
-                  <a:shade val="50000"/>
-                </a:schemeClr>
-              </a:lnRef>
-              <a:fillRef idx="1">
-                <a:schemeClr val="accent1"/>
-              </a:fillRef>
-              <a:effectRef idx="0">
-                <a:schemeClr val="accent1"/>
-              </a:effectRef>
-              <a:fontRef idx="minor">
-                <a:schemeClr val="lt1"/>
-              </a:fontRef>
-            </p:style>
-            <p:txBody>
-              <a:bodyPr rtlCol="0" anchor="ctr"/>
-              <a:lstStyle/>
-              <a:p>
-                <a:pPr algn="ctr"/>
-                <a:endParaRPr lang="en-US" sz="600"/>
-              </a:p>
-            </p:txBody>
-          </p:sp>
-          <p:sp>
-            <p:nvSpPr>
-              <p:cNvPr id="67" name="Rechteck 66"/>
-              <p:cNvSpPr/>
-              <p:nvPr/>
-            </p:nvSpPr>
-            <p:spPr>
-              <a:xfrm>
-                <a:off x="2264230" y="3302000"/>
-                <a:ext cx="355600" cy="1886856"/>
-              </a:xfrm>
-              <a:prstGeom prst="rect">
-                <a:avLst/>
-              </a:prstGeom>
-            </p:spPr>
-            <p:style>
-              <a:lnRef idx="2">
-                <a:schemeClr val="accent1">
-                  <a:shade val="50000"/>
-                </a:schemeClr>
-              </a:lnRef>
-              <a:fillRef idx="1">
-                <a:schemeClr val="accent1"/>
-              </a:fillRef>
-              <a:effectRef idx="0">
-                <a:schemeClr val="accent1"/>
-              </a:effectRef>
-              <a:fontRef idx="minor">
-                <a:schemeClr val="lt1"/>
-              </a:fontRef>
-            </p:style>
-            <p:txBody>
-              <a:bodyPr rtlCol="0" anchor="ctr"/>
-              <a:lstStyle/>
-              <a:p>
-                <a:pPr algn="ctr"/>
-                <a:endParaRPr lang="en-US" sz="600"/>
-              </a:p>
-            </p:txBody>
-          </p:sp>
-          <p:sp>
-            <p:nvSpPr>
-              <p:cNvPr id="68" name="Rechteck 67"/>
-              <p:cNvSpPr/>
-              <p:nvPr/>
-            </p:nvSpPr>
-            <p:spPr>
-              <a:xfrm>
-                <a:off x="2735945" y="3918856"/>
-                <a:ext cx="355600" cy="1269999"/>
-              </a:xfrm>
-              <a:prstGeom prst="rect">
-                <a:avLst/>
-              </a:prstGeom>
-            </p:spPr>
-            <p:style>
-              <a:lnRef idx="2">
-                <a:schemeClr val="accent1">
-                  <a:shade val="50000"/>
-                </a:schemeClr>
-              </a:lnRef>
-              <a:fillRef idx="1">
-                <a:schemeClr val="accent1"/>
-              </a:fillRef>
-              <a:effectRef idx="0">
-                <a:schemeClr val="accent1"/>
-              </a:effectRef>
-              <a:fontRef idx="minor">
-                <a:schemeClr val="lt1"/>
-              </a:fontRef>
-            </p:style>
-            <p:txBody>
-              <a:bodyPr rtlCol="0" anchor="ctr"/>
-              <a:lstStyle/>
-              <a:p>
-                <a:pPr algn="ctr"/>
-                <a:endParaRPr lang="en-US" sz="600"/>
-              </a:p>
-            </p:txBody>
-          </p:sp>
-          <p:sp>
-            <p:nvSpPr>
-              <p:cNvPr id="69" name="Rechteck 68"/>
-              <p:cNvSpPr/>
-              <p:nvPr/>
-            </p:nvSpPr>
-            <p:spPr>
-              <a:xfrm>
-                <a:off x="3207660" y="4376057"/>
-                <a:ext cx="355600" cy="812798"/>
-              </a:xfrm>
-              <a:prstGeom prst="rect">
-                <a:avLst/>
-              </a:prstGeom>
-            </p:spPr>
-            <p:style>
-              <a:lnRef idx="2">
-                <a:schemeClr val="accent1">
-                  <a:shade val="50000"/>
-                </a:schemeClr>
-              </a:lnRef>
-              <a:fillRef idx="1">
-                <a:schemeClr val="accent1"/>
-              </a:fillRef>
-              <a:effectRef idx="0">
-                <a:schemeClr val="accent1"/>
-              </a:effectRef>
-              <a:fontRef idx="minor">
-                <a:schemeClr val="lt1"/>
-              </a:fontRef>
-            </p:style>
-            <p:txBody>
-              <a:bodyPr rtlCol="0" anchor="ctr"/>
-              <a:lstStyle/>
-              <a:p>
-                <a:pPr algn="ctr"/>
-                <a:endParaRPr lang="en-US" sz="600"/>
-              </a:p>
-            </p:txBody>
-          </p:sp>
-          <p:sp>
-            <p:nvSpPr>
-              <p:cNvPr id="70" name="Rechteck 69"/>
-              <p:cNvSpPr/>
-              <p:nvPr/>
-            </p:nvSpPr>
-            <p:spPr>
-              <a:xfrm>
-                <a:off x="3679375" y="4717143"/>
-                <a:ext cx="355600" cy="471712"/>
-              </a:xfrm>
-              <a:prstGeom prst="rect">
-                <a:avLst/>
-              </a:prstGeom>
-            </p:spPr>
-            <p:style>
-              <a:lnRef idx="2">
-                <a:schemeClr val="accent1">
-                  <a:shade val="50000"/>
-                </a:schemeClr>
-              </a:lnRef>
-              <a:fillRef idx="1">
-                <a:schemeClr val="accent1"/>
-              </a:fillRef>
-              <a:effectRef idx="0">
-                <a:schemeClr val="accent1"/>
-              </a:effectRef>
-              <a:fontRef idx="minor">
-                <a:schemeClr val="lt1"/>
-              </a:fontRef>
-            </p:style>
-            <p:txBody>
-              <a:bodyPr rtlCol="0" anchor="ctr"/>
-              <a:lstStyle/>
-              <a:p>
-                <a:pPr algn="ctr"/>
-                <a:endParaRPr lang="en-US" sz="600"/>
-              </a:p>
-            </p:txBody>
-          </p:sp>
-          <p:grpSp>
-            <p:nvGrpSpPr>
-              <p:cNvPr id="71" name="Gruppieren 70"/>
-              <p:cNvGrpSpPr/>
-              <p:nvPr/>
-            </p:nvGrpSpPr>
-            <p:grpSpPr>
-              <a:xfrm>
-                <a:off x="1245222" y="5123553"/>
-                <a:ext cx="3162400" cy="625302"/>
-                <a:chOff x="1245222" y="5123553"/>
-                <a:chExt cx="3162400" cy="625302"/>
-              </a:xfrm>
-            </p:grpSpPr>
-            <p:sp>
-              <p:nvSpPr>
-                <p:cNvPr id="73" name="Textfeld 72"/>
-                <p:cNvSpPr txBox="1"/>
-                <p:nvPr/>
-              </p:nvSpPr>
-              <p:spPr>
-                <a:xfrm>
-                  <a:off x="1245222" y="5130802"/>
-                  <a:ext cx="771112" cy="552738"/>
-                </a:xfrm>
-                <a:prstGeom prst="rect">
-                  <a:avLst/>
-                </a:prstGeom>
-                <a:noFill/>
-              </p:spPr>
-              <p:txBody>
-                <a:bodyPr wrap="none" rtlCol="0">
-                  <a:spAutoFit/>
-                </a:bodyPr>
-                <a:lstStyle/>
-                <a:p>
-                  <a:r>
-                    <a:rPr lang="de-DE" sz="600" dirty="0" smtClean="0"/>
-                    <a:t>0-4</a:t>
-                  </a:r>
-                  <a:endParaRPr lang="en-US" sz="600" dirty="0"/>
-                </a:p>
-              </p:txBody>
-            </p:sp>
-            <p:sp>
-              <p:nvSpPr>
-                <p:cNvPr id="74" name="Textfeld 73"/>
-                <p:cNvSpPr txBox="1"/>
-                <p:nvPr/>
-              </p:nvSpPr>
-              <p:spPr>
-                <a:xfrm>
-                  <a:off x="1706425" y="5188858"/>
-                  <a:ext cx="874965" cy="552738"/>
-                </a:xfrm>
-                <a:prstGeom prst="rect">
-                  <a:avLst/>
-                </a:prstGeom>
-                <a:noFill/>
-              </p:spPr>
-              <p:txBody>
-                <a:bodyPr wrap="none" rtlCol="0">
-                  <a:spAutoFit/>
-                </a:bodyPr>
-                <a:lstStyle/>
-                <a:p>
-                  <a:r>
-                    <a:rPr lang="de-DE" sz="600" dirty="0" smtClean="0"/>
-                    <a:t>5-14</a:t>
-                  </a:r>
-                  <a:endParaRPr lang="en-US" sz="600" dirty="0"/>
-                </a:p>
-              </p:txBody>
-            </p:sp>
-            <p:sp>
-              <p:nvSpPr>
-                <p:cNvPr id="75" name="Textfeld 74"/>
-                <p:cNvSpPr txBox="1"/>
-                <p:nvPr/>
-              </p:nvSpPr>
-              <p:spPr>
-                <a:xfrm>
-                  <a:off x="2134597" y="5138061"/>
-                  <a:ext cx="978818" cy="552738"/>
-                </a:xfrm>
-                <a:prstGeom prst="rect">
-                  <a:avLst/>
-                </a:prstGeom>
-                <a:noFill/>
-              </p:spPr>
-              <p:txBody>
-                <a:bodyPr wrap="none" rtlCol="0">
-                  <a:spAutoFit/>
-                </a:bodyPr>
-                <a:lstStyle/>
-                <a:p>
-                  <a:r>
-                    <a:rPr lang="de-DE" sz="600" dirty="0" smtClean="0"/>
-                    <a:t>15-34</a:t>
-                  </a:r>
-                  <a:endParaRPr lang="en-US" sz="600" dirty="0"/>
-                </a:p>
-              </p:txBody>
-            </p:sp>
-            <p:sp>
-              <p:nvSpPr>
-                <p:cNvPr id="76" name="Textfeld 75"/>
-                <p:cNvSpPr txBox="1"/>
-                <p:nvPr/>
-              </p:nvSpPr>
-              <p:spPr>
-                <a:xfrm>
-                  <a:off x="2606311" y="5188864"/>
-                  <a:ext cx="978818" cy="552738"/>
-                </a:xfrm>
-                <a:prstGeom prst="rect">
-                  <a:avLst/>
-                </a:prstGeom>
-                <a:noFill/>
-              </p:spPr>
-              <p:txBody>
-                <a:bodyPr wrap="none" rtlCol="0">
-                  <a:spAutoFit/>
-                </a:bodyPr>
-                <a:lstStyle/>
-                <a:p>
-                  <a:r>
-                    <a:rPr lang="de-DE" sz="600" dirty="0" smtClean="0"/>
-                    <a:t>35-59</a:t>
-                  </a:r>
-                  <a:endParaRPr lang="en-US" sz="600" dirty="0"/>
-                </a:p>
-              </p:txBody>
-            </p:sp>
-            <p:sp>
-              <p:nvSpPr>
-                <p:cNvPr id="77" name="Textfeld 76"/>
-                <p:cNvSpPr txBox="1"/>
-                <p:nvPr/>
-              </p:nvSpPr>
-              <p:spPr>
-                <a:xfrm>
-                  <a:off x="3056254" y="5123553"/>
-                  <a:ext cx="978818" cy="552738"/>
-                </a:xfrm>
-                <a:prstGeom prst="rect">
-                  <a:avLst/>
-                </a:prstGeom>
-                <a:noFill/>
-              </p:spPr>
-              <p:txBody>
-                <a:bodyPr wrap="none" rtlCol="0">
-                  <a:spAutoFit/>
-                </a:bodyPr>
-                <a:lstStyle/>
-                <a:p>
-                  <a:r>
-                    <a:rPr lang="de-DE" sz="600" dirty="0" smtClean="0"/>
-                    <a:t>60-79</a:t>
-                  </a:r>
-                  <a:endParaRPr lang="en-US" sz="600" dirty="0"/>
-                </a:p>
-              </p:txBody>
-            </p:sp>
-            <p:sp>
-              <p:nvSpPr>
-                <p:cNvPr id="78" name="Textfeld 77"/>
-                <p:cNvSpPr txBox="1"/>
-                <p:nvPr/>
-              </p:nvSpPr>
-              <p:spPr>
-                <a:xfrm>
-                  <a:off x="3597568" y="5196117"/>
-                  <a:ext cx="810054" cy="552738"/>
-                </a:xfrm>
-                <a:prstGeom prst="rect">
-                  <a:avLst/>
-                </a:prstGeom>
-                <a:noFill/>
-              </p:spPr>
-              <p:txBody>
-                <a:bodyPr wrap="none" rtlCol="0">
-                  <a:spAutoFit/>
-                </a:bodyPr>
-                <a:lstStyle/>
-                <a:p>
-                  <a:r>
-                    <a:rPr lang="de-DE" sz="600" dirty="0" smtClean="0"/>
-                    <a:t>80+</a:t>
-                  </a:r>
-                  <a:endParaRPr lang="en-US" sz="600" dirty="0"/>
-                </a:p>
-              </p:txBody>
-            </p:sp>
-          </p:grpSp>
-          <p:cxnSp>
-            <p:nvCxnSpPr>
-              <p:cNvPr id="72" name="Gerade Verbindung mit Pfeil 71"/>
-              <p:cNvCxnSpPr/>
-              <p:nvPr/>
-            </p:nvCxnSpPr>
-            <p:spPr>
-              <a:xfrm flipV="1">
-                <a:off x="1186452" y="2888344"/>
-                <a:ext cx="0" cy="2316518"/>
-              </a:xfrm>
-              <a:prstGeom prst="straightConnector1">
-                <a:avLst/>
-              </a:prstGeom>
-              <a:ln w="12700">
-                <a:solidFill>
-                  <a:schemeClr val="tx1"/>
-                </a:solidFill>
-                <a:tailEnd type="triangle"/>
-              </a:ln>
-            </p:spPr>
-            <p:style>
-              <a:lnRef idx="1">
-                <a:schemeClr val="accent1"/>
-              </a:lnRef>
-              <a:fillRef idx="0">
-                <a:schemeClr val="accent1"/>
-              </a:fillRef>
-              <a:effectRef idx="0">
-                <a:schemeClr val="accent1"/>
-              </a:effectRef>
-              <a:fontRef idx="minor">
-                <a:schemeClr val="tx1"/>
-              </a:fontRef>
-            </p:style>
-          </p:cxnSp>
-        </p:grpSp>
-        <p:sp>
-          <p:nvSpPr>
-            <p:cNvPr id="64" name="Textfeld 63"/>
-            <p:cNvSpPr txBox="1"/>
-            <p:nvPr/>
-          </p:nvSpPr>
-          <p:spPr>
-            <a:xfrm>
-              <a:off x="1020228" y="1610336"/>
-              <a:ext cx="540212" cy="369332"/>
-            </a:xfrm>
-            <a:prstGeom prst="rect">
-              <a:avLst/>
-            </a:prstGeom>
-            <a:noFill/>
-          </p:spPr>
-          <p:txBody>
-            <a:bodyPr wrap="none" rtlCol="0">
-              <a:spAutoFit/>
-            </a:bodyPr>
-            <a:lstStyle/>
-            <a:p>
+              <a:r>
+                <a:rPr lang="de-DE" dirty="0" err="1" smtClean="0"/>
+                <a:t>everywhere</a:t>
+              </a:r>
               <a:r>
                 <a:rPr lang="de-DE" dirty="0" smtClean="0"/>
-                <a:t>Age</a:t>
+                <a:t>)</a:t>
               </a:r>
               <a:endParaRPr lang="en-US" dirty="0"/>
             </a:p>
@@ -5447,7 +4929,7 @@
         </p:nvSpPr>
         <p:spPr>
           <a:xfrm>
-            <a:off x="4005221" y="4852260"/>
+            <a:off x="3972780" y="3718821"/>
             <a:ext cx="1467649" cy="856838"/>
           </a:xfrm>
           <a:prstGeom prst="roundRect">
@@ -5540,537 +5022,6 @@
           </a:p>
         </p:txBody>
       </p:sp>
-      <p:grpSp>
-        <p:nvGrpSpPr>
-          <p:cNvPr id="125" name="Gruppieren 124"/>
-          <p:cNvGrpSpPr/>
-          <p:nvPr/>
-        </p:nvGrpSpPr>
-        <p:grpSpPr>
-          <a:xfrm>
-            <a:off x="4151728" y="3858204"/>
-            <a:ext cx="1193272" cy="992955"/>
-            <a:chOff x="838728" y="1610336"/>
-            <a:chExt cx="1193272" cy="1268482"/>
-          </a:xfrm>
-        </p:grpSpPr>
-        <p:grpSp>
-          <p:nvGrpSpPr>
-            <p:cNvPr id="126" name="Gruppieren 125"/>
-            <p:cNvGrpSpPr/>
-            <p:nvPr/>
-          </p:nvGrpSpPr>
-          <p:grpSpPr>
-            <a:xfrm>
-              <a:off x="838728" y="1923142"/>
-              <a:ext cx="1193272" cy="955676"/>
-              <a:chOff x="1186452" y="2888344"/>
-              <a:chExt cx="3221170" cy="2860511"/>
-            </a:xfrm>
-          </p:grpSpPr>
-          <p:sp>
-            <p:nvSpPr>
-              <p:cNvPr id="128" name="Rechteck 127"/>
-              <p:cNvSpPr/>
-              <p:nvPr/>
-            </p:nvSpPr>
-            <p:spPr>
-              <a:xfrm>
-                <a:off x="1320800" y="4484913"/>
-                <a:ext cx="355600" cy="703943"/>
-              </a:xfrm>
-              <a:prstGeom prst="rect">
-                <a:avLst/>
-              </a:prstGeom>
-            </p:spPr>
-            <p:style>
-              <a:lnRef idx="2">
-                <a:schemeClr val="accent1">
-                  <a:shade val="50000"/>
-                </a:schemeClr>
-              </a:lnRef>
-              <a:fillRef idx="1">
-                <a:schemeClr val="accent1"/>
-              </a:fillRef>
-              <a:effectRef idx="0">
-                <a:schemeClr val="accent1"/>
-              </a:effectRef>
-              <a:fontRef idx="minor">
-                <a:schemeClr val="lt1"/>
-              </a:fontRef>
-            </p:style>
-            <p:txBody>
-              <a:bodyPr rtlCol="0" anchor="ctr"/>
-              <a:lstStyle/>
-              <a:p>
-                <a:pPr algn="ctr"/>
-                <a:endParaRPr lang="en-US" sz="600"/>
-              </a:p>
-            </p:txBody>
-          </p:sp>
-          <p:sp>
-            <p:nvSpPr>
-              <p:cNvPr id="129" name="Rechteck 128"/>
-              <p:cNvSpPr/>
-              <p:nvPr/>
-            </p:nvSpPr>
-            <p:spPr>
-              <a:xfrm>
-                <a:off x="1792515" y="4093030"/>
-                <a:ext cx="355600" cy="1095826"/>
-              </a:xfrm>
-              <a:prstGeom prst="rect">
-                <a:avLst/>
-              </a:prstGeom>
-            </p:spPr>
-            <p:style>
-              <a:lnRef idx="2">
-                <a:schemeClr val="accent1">
-                  <a:shade val="50000"/>
-                </a:schemeClr>
-              </a:lnRef>
-              <a:fillRef idx="1">
-                <a:schemeClr val="accent1"/>
-              </a:fillRef>
-              <a:effectRef idx="0">
-                <a:schemeClr val="accent1"/>
-              </a:effectRef>
-              <a:fontRef idx="minor">
-                <a:schemeClr val="lt1"/>
-              </a:fontRef>
-            </p:style>
-            <p:txBody>
-              <a:bodyPr rtlCol="0" anchor="ctr"/>
-              <a:lstStyle/>
-              <a:p>
-                <a:pPr algn="ctr"/>
-                <a:endParaRPr lang="en-US" sz="600"/>
-              </a:p>
-            </p:txBody>
-          </p:sp>
-          <p:sp>
-            <p:nvSpPr>
-              <p:cNvPr id="130" name="Rechteck 129"/>
-              <p:cNvSpPr/>
-              <p:nvPr/>
-            </p:nvSpPr>
-            <p:spPr>
-              <a:xfrm>
-                <a:off x="2264230" y="3302000"/>
-                <a:ext cx="355600" cy="1886856"/>
-              </a:xfrm>
-              <a:prstGeom prst="rect">
-                <a:avLst/>
-              </a:prstGeom>
-            </p:spPr>
-            <p:style>
-              <a:lnRef idx="2">
-                <a:schemeClr val="accent1">
-                  <a:shade val="50000"/>
-                </a:schemeClr>
-              </a:lnRef>
-              <a:fillRef idx="1">
-                <a:schemeClr val="accent1"/>
-              </a:fillRef>
-              <a:effectRef idx="0">
-                <a:schemeClr val="accent1"/>
-              </a:effectRef>
-              <a:fontRef idx="minor">
-                <a:schemeClr val="lt1"/>
-              </a:fontRef>
-            </p:style>
-            <p:txBody>
-              <a:bodyPr rtlCol="0" anchor="ctr"/>
-              <a:lstStyle/>
-              <a:p>
-                <a:pPr algn="ctr"/>
-                <a:endParaRPr lang="en-US" sz="600"/>
-              </a:p>
-            </p:txBody>
-          </p:sp>
-          <p:sp>
-            <p:nvSpPr>
-              <p:cNvPr id="131" name="Rechteck 130"/>
-              <p:cNvSpPr/>
-              <p:nvPr/>
-            </p:nvSpPr>
-            <p:spPr>
-              <a:xfrm>
-                <a:off x="2735945" y="3918856"/>
-                <a:ext cx="355600" cy="1269999"/>
-              </a:xfrm>
-              <a:prstGeom prst="rect">
-                <a:avLst/>
-              </a:prstGeom>
-            </p:spPr>
-            <p:style>
-              <a:lnRef idx="2">
-                <a:schemeClr val="accent1">
-                  <a:shade val="50000"/>
-                </a:schemeClr>
-              </a:lnRef>
-              <a:fillRef idx="1">
-                <a:schemeClr val="accent1"/>
-              </a:fillRef>
-              <a:effectRef idx="0">
-                <a:schemeClr val="accent1"/>
-              </a:effectRef>
-              <a:fontRef idx="minor">
-                <a:schemeClr val="lt1"/>
-              </a:fontRef>
-            </p:style>
-            <p:txBody>
-              <a:bodyPr rtlCol="0" anchor="ctr"/>
-              <a:lstStyle/>
-              <a:p>
-                <a:pPr algn="ctr"/>
-                <a:endParaRPr lang="en-US" sz="600"/>
-              </a:p>
-            </p:txBody>
-          </p:sp>
-          <p:sp>
-            <p:nvSpPr>
-              <p:cNvPr id="132" name="Rechteck 131"/>
-              <p:cNvSpPr/>
-              <p:nvPr/>
-            </p:nvSpPr>
-            <p:spPr>
-              <a:xfrm>
-                <a:off x="3207660" y="4376057"/>
-                <a:ext cx="355600" cy="812798"/>
-              </a:xfrm>
-              <a:prstGeom prst="rect">
-                <a:avLst/>
-              </a:prstGeom>
-            </p:spPr>
-            <p:style>
-              <a:lnRef idx="2">
-                <a:schemeClr val="accent1">
-                  <a:shade val="50000"/>
-                </a:schemeClr>
-              </a:lnRef>
-              <a:fillRef idx="1">
-                <a:schemeClr val="accent1"/>
-              </a:fillRef>
-              <a:effectRef idx="0">
-                <a:schemeClr val="accent1"/>
-              </a:effectRef>
-              <a:fontRef idx="minor">
-                <a:schemeClr val="lt1"/>
-              </a:fontRef>
-            </p:style>
-            <p:txBody>
-              <a:bodyPr rtlCol="0" anchor="ctr"/>
-              <a:lstStyle/>
-              <a:p>
-                <a:pPr algn="ctr"/>
-                <a:endParaRPr lang="en-US" sz="600"/>
-              </a:p>
-            </p:txBody>
-          </p:sp>
-          <p:sp>
-            <p:nvSpPr>
-              <p:cNvPr id="133" name="Rechteck 132"/>
-              <p:cNvSpPr/>
-              <p:nvPr/>
-            </p:nvSpPr>
-            <p:spPr>
-              <a:xfrm>
-                <a:off x="3679375" y="4717143"/>
-                <a:ext cx="355600" cy="471712"/>
-              </a:xfrm>
-              <a:prstGeom prst="rect">
-                <a:avLst/>
-              </a:prstGeom>
-            </p:spPr>
-            <p:style>
-              <a:lnRef idx="2">
-                <a:schemeClr val="accent1">
-                  <a:shade val="50000"/>
-                </a:schemeClr>
-              </a:lnRef>
-              <a:fillRef idx="1">
-                <a:schemeClr val="accent1"/>
-              </a:fillRef>
-              <a:effectRef idx="0">
-                <a:schemeClr val="accent1"/>
-              </a:effectRef>
-              <a:fontRef idx="minor">
-                <a:schemeClr val="lt1"/>
-              </a:fontRef>
-            </p:style>
-            <p:txBody>
-              <a:bodyPr rtlCol="0" anchor="ctr"/>
-              <a:lstStyle/>
-              <a:p>
-                <a:pPr algn="ctr"/>
-                <a:endParaRPr lang="en-US" sz="600"/>
-              </a:p>
-            </p:txBody>
-          </p:sp>
-          <p:grpSp>
-            <p:nvGrpSpPr>
-              <p:cNvPr id="134" name="Gruppieren 133"/>
-              <p:cNvGrpSpPr/>
-              <p:nvPr/>
-            </p:nvGrpSpPr>
-            <p:grpSpPr>
-              <a:xfrm>
-                <a:off x="1245222" y="5123553"/>
-                <a:ext cx="3162400" cy="625302"/>
-                <a:chOff x="1245222" y="5123553"/>
-                <a:chExt cx="3162400" cy="625302"/>
-              </a:xfrm>
-            </p:grpSpPr>
-            <p:sp>
-              <p:nvSpPr>
-                <p:cNvPr id="136" name="Textfeld 135"/>
-                <p:cNvSpPr txBox="1"/>
-                <p:nvPr/>
-              </p:nvSpPr>
-              <p:spPr>
-                <a:xfrm>
-                  <a:off x="1245222" y="5130802"/>
-                  <a:ext cx="771112" cy="552738"/>
-                </a:xfrm>
-                <a:prstGeom prst="rect">
-                  <a:avLst/>
-                </a:prstGeom>
-                <a:noFill/>
-              </p:spPr>
-              <p:txBody>
-                <a:bodyPr wrap="none" rtlCol="0">
-                  <a:spAutoFit/>
-                </a:bodyPr>
-                <a:lstStyle/>
-                <a:p>
-                  <a:r>
-                    <a:rPr lang="de-DE" sz="600" dirty="0" smtClean="0"/>
-                    <a:t>0-4</a:t>
-                  </a:r>
-                  <a:endParaRPr lang="en-US" sz="600" dirty="0"/>
-                </a:p>
-              </p:txBody>
-            </p:sp>
-            <p:sp>
-              <p:nvSpPr>
-                <p:cNvPr id="137" name="Textfeld 136"/>
-                <p:cNvSpPr txBox="1"/>
-                <p:nvPr/>
-              </p:nvSpPr>
-              <p:spPr>
-                <a:xfrm>
-                  <a:off x="1706425" y="5188858"/>
-                  <a:ext cx="874965" cy="552738"/>
-                </a:xfrm>
-                <a:prstGeom prst="rect">
-                  <a:avLst/>
-                </a:prstGeom>
-                <a:noFill/>
-              </p:spPr>
-              <p:txBody>
-                <a:bodyPr wrap="none" rtlCol="0">
-                  <a:spAutoFit/>
-                </a:bodyPr>
-                <a:lstStyle/>
-                <a:p>
-                  <a:r>
-                    <a:rPr lang="de-DE" sz="600" dirty="0" smtClean="0"/>
-                    <a:t>5-14</a:t>
-                  </a:r>
-                  <a:endParaRPr lang="en-US" sz="600" dirty="0"/>
-                </a:p>
-              </p:txBody>
-            </p:sp>
-            <p:sp>
-              <p:nvSpPr>
-                <p:cNvPr id="138" name="Textfeld 137"/>
-                <p:cNvSpPr txBox="1"/>
-                <p:nvPr/>
-              </p:nvSpPr>
-              <p:spPr>
-                <a:xfrm>
-                  <a:off x="2134597" y="5138061"/>
-                  <a:ext cx="978818" cy="552738"/>
-                </a:xfrm>
-                <a:prstGeom prst="rect">
-                  <a:avLst/>
-                </a:prstGeom>
-                <a:noFill/>
-              </p:spPr>
-              <p:txBody>
-                <a:bodyPr wrap="none" rtlCol="0">
-                  <a:spAutoFit/>
-                </a:bodyPr>
-                <a:lstStyle/>
-                <a:p>
-                  <a:r>
-                    <a:rPr lang="de-DE" sz="600" dirty="0" smtClean="0"/>
-                    <a:t>15-34</a:t>
-                  </a:r>
-                  <a:endParaRPr lang="en-US" sz="600" dirty="0"/>
-                </a:p>
-              </p:txBody>
-            </p:sp>
-            <p:sp>
-              <p:nvSpPr>
-                <p:cNvPr id="139" name="Textfeld 138"/>
-                <p:cNvSpPr txBox="1"/>
-                <p:nvPr/>
-              </p:nvSpPr>
-              <p:spPr>
-                <a:xfrm>
-                  <a:off x="2606311" y="5188864"/>
-                  <a:ext cx="978818" cy="552738"/>
-                </a:xfrm>
-                <a:prstGeom prst="rect">
-                  <a:avLst/>
-                </a:prstGeom>
-                <a:noFill/>
-              </p:spPr>
-              <p:txBody>
-                <a:bodyPr wrap="none" rtlCol="0">
-                  <a:spAutoFit/>
-                </a:bodyPr>
-                <a:lstStyle/>
-                <a:p>
-                  <a:r>
-                    <a:rPr lang="de-DE" sz="600" dirty="0" smtClean="0"/>
-                    <a:t>35-59</a:t>
-                  </a:r>
-                  <a:endParaRPr lang="en-US" sz="600" dirty="0"/>
-                </a:p>
-              </p:txBody>
-            </p:sp>
-            <p:sp>
-              <p:nvSpPr>
-                <p:cNvPr id="140" name="Textfeld 139"/>
-                <p:cNvSpPr txBox="1"/>
-                <p:nvPr/>
-              </p:nvSpPr>
-              <p:spPr>
-                <a:xfrm>
-                  <a:off x="3056254" y="5123553"/>
-                  <a:ext cx="978818" cy="552738"/>
-                </a:xfrm>
-                <a:prstGeom prst="rect">
-                  <a:avLst/>
-                </a:prstGeom>
-                <a:noFill/>
-              </p:spPr>
-              <p:txBody>
-                <a:bodyPr wrap="none" rtlCol="0">
-                  <a:spAutoFit/>
-                </a:bodyPr>
-                <a:lstStyle/>
-                <a:p>
-                  <a:r>
-                    <a:rPr lang="de-DE" sz="600" dirty="0" smtClean="0"/>
-                    <a:t>60-79</a:t>
-                  </a:r>
-                  <a:endParaRPr lang="en-US" sz="600" dirty="0"/>
-                </a:p>
-              </p:txBody>
-            </p:sp>
-            <p:sp>
-              <p:nvSpPr>
-                <p:cNvPr id="141" name="Textfeld 140"/>
-                <p:cNvSpPr txBox="1"/>
-                <p:nvPr/>
-              </p:nvSpPr>
-              <p:spPr>
-                <a:xfrm>
-                  <a:off x="3597568" y="5196117"/>
-                  <a:ext cx="810054" cy="552738"/>
-                </a:xfrm>
-                <a:prstGeom prst="rect">
-                  <a:avLst/>
-                </a:prstGeom>
-                <a:noFill/>
-              </p:spPr>
-              <p:txBody>
-                <a:bodyPr wrap="none" rtlCol="0">
-                  <a:spAutoFit/>
-                </a:bodyPr>
-                <a:lstStyle/>
-                <a:p>
-                  <a:r>
-                    <a:rPr lang="de-DE" sz="600" dirty="0" smtClean="0"/>
-                    <a:t>80+</a:t>
-                  </a:r>
-                  <a:endParaRPr lang="en-US" sz="600" dirty="0"/>
-                </a:p>
-              </p:txBody>
-            </p:sp>
-          </p:grpSp>
-          <p:cxnSp>
-            <p:nvCxnSpPr>
-              <p:cNvPr id="135" name="Gerade Verbindung mit Pfeil 134"/>
-              <p:cNvCxnSpPr/>
-              <p:nvPr/>
-            </p:nvCxnSpPr>
-            <p:spPr>
-              <a:xfrm flipV="1">
-                <a:off x="1186452" y="2888344"/>
-                <a:ext cx="0" cy="2316518"/>
-              </a:xfrm>
-              <a:prstGeom prst="straightConnector1">
-                <a:avLst/>
-              </a:prstGeom>
-              <a:ln w="12700">
-                <a:solidFill>
-                  <a:schemeClr val="tx1"/>
-                </a:solidFill>
-                <a:tailEnd type="triangle"/>
-              </a:ln>
-            </p:spPr>
-            <p:style>
-              <a:lnRef idx="1">
-                <a:schemeClr val="accent1"/>
-              </a:lnRef>
-              <a:fillRef idx="0">
-                <a:schemeClr val="accent1"/>
-              </a:fillRef>
-              <a:effectRef idx="0">
-                <a:schemeClr val="accent1"/>
-              </a:effectRef>
-              <a:fontRef idx="minor">
-                <a:schemeClr val="tx1"/>
-              </a:fontRef>
-            </p:style>
-          </p:cxnSp>
-        </p:grpSp>
-        <p:sp>
-          <p:nvSpPr>
-            <p:cNvPr id="127" name="Textfeld 126"/>
-            <p:cNvSpPr txBox="1"/>
-            <p:nvPr/>
-          </p:nvSpPr>
-          <p:spPr>
-            <a:xfrm>
-              <a:off x="1020228" y="1610336"/>
-              <a:ext cx="540212" cy="369332"/>
-            </a:xfrm>
-            <a:prstGeom prst="rect">
-              <a:avLst/>
-            </a:prstGeom>
-            <a:noFill/>
-          </p:spPr>
-          <p:txBody>
-            <a:bodyPr wrap="none" rtlCol="0">
-              <a:spAutoFit/>
-            </a:bodyPr>
-            <a:lstStyle/>
-            <a:p>
-              <a:r>
-                <a:rPr lang="de-DE" dirty="0" smtClean="0"/>
-                <a:t>Age</a:t>
-              </a:r>
-              <a:endParaRPr lang="en-US" dirty="0"/>
-            </a:p>
-          </p:txBody>
-        </p:sp>
-      </p:grpSp>
       <p:sp>
         <p:nvSpPr>
           <p:cNvPr id="142" name="Rechteck 141"/>
@@ -6079,8 +5030,8 @@
         </p:nvSpPr>
         <p:spPr>
           <a:xfrm>
-            <a:off x="3716587" y="3901747"/>
-            <a:ext cx="4919321" cy="2548540"/>
+            <a:off x="3716587" y="3060975"/>
+            <a:ext cx="5213516" cy="3389312"/>
           </a:xfrm>
           <a:prstGeom prst="rect">
             <a:avLst/>
@@ -6222,7 +5173,7 @@
         </p:nvSpPr>
         <p:spPr>
           <a:xfrm>
-            <a:off x="6586843" y="4925306"/>
+            <a:off x="7055620" y="3147454"/>
             <a:ext cx="1521923" cy="725714"/>
           </a:xfrm>
           <a:prstGeom prst="roundRect">
@@ -6273,8 +5224,8 @@
         </p:nvSpPr>
         <p:spPr>
           <a:xfrm>
-            <a:off x="6475608" y="4023739"/>
-            <a:ext cx="1846128" cy="1755379"/>
+            <a:off x="6966228" y="3083532"/>
+            <a:ext cx="1846128" cy="1580493"/>
           </a:xfrm>
           <a:prstGeom prst="rect">
             <a:avLst/>
@@ -6320,8 +5271,8 @@
         </p:nvSpPr>
         <p:spPr>
           <a:xfrm>
-            <a:off x="9984013" y="4717652"/>
-            <a:ext cx="1440172" cy="1760345"/>
+            <a:off x="9984013" y="5394509"/>
+            <a:ext cx="1440172" cy="1083488"/>
           </a:xfrm>
           <a:prstGeom prst="rect">
             <a:avLst/>
@@ -6366,7 +5317,7 @@
         </p:nvSpPr>
         <p:spPr>
           <a:xfrm>
-            <a:off x="9883085" y="4346038"/>
+            <a:off x="9902865" y="5015793"/>
             <a:ext cx="1121013" cy="369332"/>
           </a:xfrm>
           <a:prstGeom prst="rect">
@@ -6396,7 +5347,7 @@
         </p:nvSpPr>
         <p:spPr>
           <a:xfrm>
-            <a:off x="10136444" y="2821205"/>
+            <a:off x="10148304" y="2304001"/>
             <a:ext cx="1467649" cy="541645"/>
           </a:xfrm>
           <a:prstGeom prst="roundRect">
@@ -6439,1599 +5390,6 @@
           </a:p>
         </p:txBody>
       </p:sp>
-      <p:grpSp>
-        <p:nvGrpSpPr>
-          <p:cNvPr id="152" name="Gruppieren 151"/>
-          <p:cNvGrpSpPr/>
-          <p:nvPr/>
-        </p:nvGrpSpPr>
-        <p:grpSpPr>
-          <a:xfrm>
-            <a:off x="10182237" y="1828386"/>
-            <a:ext cx="1193272" cy="1015807"/>
-            <a:chOff x="838728" y="1610336"/>
-            <a:chExt cx="1193272" cy="1268482"/>
-          </a:xfrm>
-        </p:grpSpPr>
-        <p:grpSp>
-          <p:nvGrpSpPr>
-            <p:cNvPr id="153" name="Gruppieren 152"/>
-            <p:cNvGrpSpPr/>
-            <p:nvPr/>
-          </p:nvGrpSpPr>
-          <p:grpSpPr>
-            <a:xfrm>
-              <a:off x="838728" y="1923142"/>
-              <a:ext cx="1193272" cy="955676"/>
-              <a:chOff x="1186452" y="2888344"/>
-              <a:chExt cx="3221170" cy="2860511"/>
-            </a:xfrm>
-          </p:grpSpPr>
-          <p:sp>
-            <p:nvSpPr>
-              <p:cNvPr id="155" name="Rechteck 154"/>
-              <p:cNvSpPr/>
-              <p:nvPr/>
-            </p:nvSpPr>
-            <p:spPr>
-              <a:xfrm>
-                <a:off x="1320800" y="4484913"/>
-                <a:ext cx="355600" cy="703943"/>
-              </a:xfrm>
-              <a:prstGeom prst="rect">
-                <a:avLst/>
-              </a:prstGeom>
-            </p:spPr>
-            <p:style>
-              <a:lnRef idx="2">
-                <a:schemeClr val="accent1">
-                  <a:shade val="50000"/>
-                </a:schemeClr>
-              </a:lnRef>
-              <a:fillRef idx="1">
-                <a:schemeClr val="accent1"/>
-              </a:fillRef>
-              <a:effectRef idx="0">
-                <a:schemeClr val="accent1"/>
-              </a:effectRef>
-              <a:fontRef idx="minor">
-                <a:schemeClr val="lt1"/>
-              </a:fontRef>
-            </p:style>
-            <p:txBody>
-              <a:bodyPr rtlCol="0" anchor="ctr"/>
-              <a:lstStyle/>
-              <a:p>
-                <a:pPr algn="ctr"/>
-                <a:endParaRPr lang="en-US" sz="600"/>
-              </a:p>
-            </p:txBody>
-          </p:sp>
-          <p:sp>
-            <p:nvSpPr>
-              <p:cNvPr id="156" name="Rechteck 155"/>
-              <p:cNvSpPr/>
-              <p:nvPr/>
-            </p:nvSpPr>
-            <p:spPr>
-              <a:xfrm>
-                <a:off x="1792515" y="4093030"/>
-                <a:ext cx="355600" cy="1095826"/>
-              </a:xfrm>
-              <a:prstGeom prst="rect">
-                <a:avLst/>
-              </a:prstGeom>
-            </p:spPr>
-            <p:style>
-              <a:lnRef idx="2">
-                <a:schemeClr val="accent1">
-                  <a:shade val="50000"/>
-                </a:schemeClr>
-              </a:lnRef>
-              <a:fillRef idx="1">
-                <a:schemeClr val="accent1"/>
-              </a:fillRef>
-              <a:effectRef idx="0">
-                <a:schemeClr val="accent1"/>
-              </a:effectRef>
-              <a:fontRef idx="minor">
-                <a:schemeClr val="lt1"/>
-              </a:fontRef>
-            </p:style>
-            <p:txBody>
-              <a:bodyPr rtlCol="0" anchor="ctr"/>
-              <a:lstStyle/>
-              <a:p>
-                <a:pPr algn="ctr"/>
-                <a:endParaRPr lang="en-US" sz="600"/>
-              </a:p>
-            </p:txBody>
-          </p:sp>
-          <p:sp>
-            <p:nvSpPr>
-              <p:cNvPr id="157" name="Rechteck 156"/>
-              <p:cNvSpPr/>
-              <p:nvPr/>
-            </p:nvSpPr>
-            <p:spPr>
-              <a:xfrm>
-                <a:off x="2264230" y="3302000"/>
-                <a:ext cx="355600" cy="1886856"/>
-              </a:xfrm>
-              <a:prstGeom prst="rect">
-                <a:avLst/>
-              </a:prstGeom>
-            </p:spPr>
-            <p:style>
-              <a:lnRef idx="2">
-                <a:schemeClr val="accent1">
-                  <a:shade val="50000"/>
-                </a:schemeClr>
-              </a:lnRef>
-              <a:fillRef idx="1">
-                <a:schemeClr val="accent1"/>
-              </a:fillRef>
-              <a:effectRef idx="0">
-                <a:schemeClr val="accent1"/>
-              </a:effectRef>
-              <a:fontRef idx="minor">
-                <a:schemeClr val="lt1"/>
-              </a:fontRef>
-            </p:style>
-            <p:txBody>
-              <a:bodyPr rtlCol="0" anchor="ctr"/>
-              <a:lstStyle/>
-              <a:p>
-                <a:pPr algn="ctr"/>
-                <a:endParaRPr lang="en-US" sz="600"/>
-              </a:p>
-            </p:txBody>
-          </p:sp>
-          <p:sp>
-            <p:nvSpPr>
-              <p:cNvPr id="158" name="Rechteck 157"/>
-              <p:cNvSpPr/>
-              <p:nvPr/>
-            </p:nvSpPr>
-            <p:spPr>
-              <a:xfrm>
-                <a:off x="2735945" y="3918856"/>
-                <a:ext cx="355600" cy="1269999"/>
-              </a:xfrm>
-              <a:prstGeom prst="rect">
-                <a:avLst/>
-              </a:prstGeom>
-            </p:spPr>
-            <p:style>
-              <a:lnRef idx="2">
-                <a:schemeClr val="accent1">
-                  <a:shade val="50000"/>
-                </a:schemeClr>
-              </a:lnRef>
-              <a:fillRef idx="1">
-                <a:schemeClr val="accent1"/>
-              </a:fillRef>
-              <a:effectRef idx="0">
-                <a:schemeClr val="accent1"/>
-              </a:effectRef>
-              <a:fontRef idx="minor">
-                <a:schemeClr val="lt1"/>
-              </a:fontRef>
-            </p:style>
-            <p:txBody>
-              <a:bodyPr rtlCol="0" anchor="ctr"/>
-              <a:lstStyle/>
-              <a:p>
-                <a:pPr algn="ctr"/>
-                <a:endParaRPr lang="en-US" sz="600"/>
-              </a:p>
-            </p:txBody>
-          </p:sp>
-          <p:sp>
-            <p:nvSpPr>
-              <p:cNvPr id="159" name="Rechteck 158"/>
-              <p:cNvSpPr/>
-              <p:nvPr/>
-            </p:nvSpPr>
-            <p:spPr>
-              <a:xfrm>
-                <a:off x="3207660" y="4376057"/>
-                <a:ext cx="355600" cy="812798"/>
-              </a:xfrm>
-              <a:prstGeom prst="rect">
-                <a:avLst/>
-              </a:prstGeom>
-            </p:spPr>
-            <p:style>
-              <a:lnRef idx="2">
-                <a:schemeClr val="accent1">
-                  <a:shade val="50000"/>
-                </a:schemeClr>
-              </a:lnRef>
-              <a:fillRef idx="1">
-                <a:schemeClr val="accent1"/>
-              </a:fillRef>
-              <a:effectRef idx="0">
-                <a:schemeClr val="accent1"/>
-              </a:effectRef>
-              <a:fontRef idx="minor">
-                <a:schemeClr val="lt1"/>
-              </a:fontRef>
-            </p:style>
-            <p:txBody>
-              <a:bodyPr rtlCol="0" anchor="ctr"/>
-              <a:lstStyle/>
-              <a:p>
-                <a:pPr algn="ctr"/>
-                <a:endParaRPr lang="en-US" sz="600"/>
-              </a:p>
-            </p:txBody>
-          </p:sp>
-          <p:sp>
-            <p:nvSpPr>
-              <p:cNvPr id="160" name="Rechteck 159"/>
-              <p:cNvSpPr/>
-              <p:nvPr/>
-            </p:nvSpPr>
-            <p:spPr>
-              <a:xfrm>
-                <a:off x="3679375" y="4717143"/>
-                <a:ext cx="355600" cy="471712"/>
-              </a:xfrm>
-              <a:prstGeom prst="rect">
-                <a:avLst/>
-              </a:prstGeom>
-            </p:spPr>
-            <p:style>
-              <a:lnRef idx="2">
-                <a:schemeClr val="accent1">
-                  <a:shade val="50000"/>
-                </a:schemeClr>
-              </a:lnRef>
-              <a:fillRef idx="1">
-                <a:schemeClr val="accent1"/>
-              </a:fillRef>
-              <a:effectRef idx="0">
-                <a:schemeClr val="accent1"/>
-              </a:effectRef>
-              <a:fontRef idx="minor">
-                <a:schemeClr val="lt1"/>
-              </a:fontRef>
-            </p:style>
-            <p:txBody>
-              <a:bodyPr rtlCol="0" anchor="ctr"/>
-              <a:lstStyle/>
-              <a:p>
-                <a:pPr algn="ctr"/>
-                <a:endParaRPr lang="en-US" sz="600"/>
-              </a:p>
-            </p:txBody>
-          </p:sp>
-          <p:grpSp>
-            <p:nvGrpSpPr>
-              <p:cNvPr id="161" name="Gruppieren 160"/>
-              <p:cNvGrpSpPr/>
-              <p:nvPr/>
-            </p:nvGrpSpPr>
-            <p:grpSpPr>
-              <a:xfrm>
-                <a:off x="1245222" y="5123553"/>
-                <a:ext cx="3162400" cy="625302"/>
-                <a:chOff x="1245222" y="5123553"/>
-                <a:chExt cx="3162400" cy="625302"/>
-              </a:xfrm>
-            </p:grpSpPr>
-            <p:sp>
-              <p:nvSpPr>
-                <p:cNvPr id="163" name="Textfeld 162"/>
-                <p:cNvSpPr txBox="1"/>
-                <p:nvPr/>
-              </p:nvSpPr>
-              <p:spPr>
-                <a:xfrm>
-                  <a:off x="1245222" y="5130802"/>
-                  <a:ext cx="771112" cy="552738"/>
-                </a:xfrm>
-                <a:prstGeom prst="rect">
-                  <a:avLst/>
-                </a:prstGeom>
-                <a:noFill/>
-              </p:spPr>
-              <p:txBody>
-                <a:bodyPr wrap="none" rtlCol="0">
-                  <a:spAutoFit/>
-                </a:bodyPr>
-                <a:lstStyle/>
-                <a:p>
-                  <a:r>
-                    <a:rPr lang="de-DE" sz="600" dirty="0" smtClean="0"/>
-                    <a:t>0-4</a:t>
-                  </a:r>
-                  <a:endParaRPr lang="en-US" sz="600" dirty="0"/>
-                </a:p>
-              </p:txBody>
-            </p:sp>
-            <p:sp>
-              <p:nvSpPr>
-                <p:cNvPr id="164" name="Textfeld 163"/>
-                <p:cNvSpPr txBox="1"/>
-                <p:nvPr/>
-              </p:nvSpPr>
-              <p:spPr>
-                <a:xfrm>
-                  <a:off x="1706425" y="5188858"/>
-                  <a:ext cx="874965" cy="552738"/>
-                </a:xfrm>
-                <a:prstGeom prst="rect">
-                  <a:avLst/>
-                </a:prstGeom>
-                <a:noFill/>
-              </p:spPr>
-              <p:txBody>
-                <a:bodyPr wrap="none" rtlCol="0">
-                  <a:spAutoFit/>
-                </a:bodyPr>
-                <a:lstStyle/>
-                <a:p>
-                  <a:r>
-                    <a:rPr lang="de-DE" sz="600" dirty="0" smtClean="0"/>
-                    <a:t>5-14</a:t>
-                  </a:r>
-                  <a:endParaRPr lang="en-US" sz="600" dirty="0"/>
-                </a:p>
-              </p:txBody>
-            </p:sp>
-            <p:sp>
-              <p:nvSpPr>
-                <p:cNvPr id="165" name="Textfeld 164"/>
-                <p:cNvSpPr txBox="1"/>
-                <p:nvPr/>
-              </p:nvSpPr>
-              <p:spPr>
-                <a:xfrm>
-                  <a:off x="2134597" y="5138061"/>
-                  <a:ext cx="978818" cy="552738"/>
-                </a:xfrm>
-                <a:prstGeom prst="rect">
-                  <a:avLst/>
-                </a:prstGeom>
-                <a:noFill/>
-              </p:spPr>
-              <p:txBody>
-                <a:bodyPr wrap="none" rtlCol="0">
-                  <a:spAutoFit/>
-                </a:bodyPr>
-                <a:lstStyle/>
-                <a:p>
-                  <a:r>
-                    <a:rPr lang="de-DE" sz="600" dirty="0" smtClean="0"/>
-                    <a:t>15-34</a:t>
-                  </a:r>
-                  <a:endParaRPr lang="en-US" sz="600" dirty="0"/>
-                </a:p>
-              </p:txBody>
-            </p:sp>
-            <p:sp>
-              <p:nvSpPr>
-                <p:cNvPr id="166" name="Textfeld 165"/>
-                <p:cNvSpPr txBox="1"/>
-                <p:nvPr/>
-              </p:nvSpPr>
-              <p:spPr>
-                <a:xfrm>
-                  <a:off x="2606311" y="5188864"/>
-                  <a:ext cx="978818" cy="552738"/>
-                </a:xfrm>
-                <a:prstGeom prst="rect">
-                  <a:avLst/>
-                </a:prstGeom>
-                <a:noFill/>
-              </p:spPr>
-              <p:txBody>
-                <a:bodyPr wrap="none" rtlCol="0">
-                  <a:spAutoFit/>
-                </a:bodyPr>
-                <a:lstStyle/>
-                <a:p>
-                  <a:r>
-                    <a:rPr lang="de-DE" sz="600" dirty="0" smtClean="0"/>
-                    <a:t>35-59</a:t>
-                  </a:r>
-                  <a:endParaRPr lang="en-US" sz="600" dirty="0"/>
-                </a:p>
-              </p:txBody>
-            </p:sp>
-            <p:sp>
-              <p:nvSpPr>
-                <p:cNvPr id="167" name="Textfeld 166"/>
-                <p:cNvSpPr txBox="1"/>
-                <p:nvPr/>
-              </p:nvSpPr>
-              <p:spPr>
-                <a:xfrm>
-                  <a:off x="3056254" y="5123553"/>
-                  <a:ext cx="978818" cy="552738"/>
-                </a:xfrm>
-                <a:prstGeom prst="rect">
-                  <a:avLst/>
-                </a:prstGeom>
-                <a:noFill/>
-              </p:spPr>
-              <p:txBody>
-                <a:bodyPr wrap="none" rtlCol="0">
-                  <a:spAutoFit/>
-                </a:bodyPr>
-                <a:lstStyle/>
-                <a:p>
-                  <a:r>
-                    <a:rPr lang="de-DE" sz="600" dirty="0" smtClean="0"/>
-                    <a:t>60-79</a:t>
-                  </a:r>
-                  <a:endParaRPr lang="en-US" sz="600" dirty="0"/>
-                </a:p>
-              </p:txBody>
-            </p:sp>
-            <p:sp>
-              <p:nvSpPr>
-                <p:cNvPr id="168" name="Textfeld 167"/>
-                <p:cNvSpPr txBox="1"/>
-                <p:nvPr/>
-              </p:nvSpPr>
-              <p:spPr>
-                <a:xfrm>
-                  <a:off x="3597568" y="5196117"/>
-                  <a:ext cx="810054" cy="552738"/>
-                </a:xfrm>
-                <a:prstGeom prst="rect">
-                  <a:avLst/>
-                </a:prstGeom>
-                <a:noFill/>
-              </p:spPr>
-              <p:txBody>
-                <a:bodyPr wrap="none" rtlCol="0">
-                  <a:spAutoFit/>
-                </a:bodyPr>
-                <a:lstStyle/>
-                <a:p>
-                  <a:r>
-                    <a:rPr lang="de-DE" sz="600" dirty="0" smtClean="0"/>
-                    <a:t>80+</a:t>
-                  </a:r>
-                  <a:endParaRPr lang="en-US" sz="600" dirty="0"/>
-                </a:p>
-              </p:txBody>
-            </p:sp>
-          </p:grpSp>
-          <p:cxnSp>
-            <p:nvCxnSpPr>
-              <p:cNvPr id="162" name="Gerade Verbindung mit Pfeil 161"/>
-              <p:cNvCxnSpPr/>
-              <p:nvPr/>
-            </p:nvCxnSpPr>
-            <p:spPr>
-              <a:xfrm flipV="1">
-                <a:off x="1186452" y="2888344"/>
-                <a:ext cx="0" cy="2316518"/>
-              </a:xfrm>
-              <a:prstGeom prst="straightConnector1">
-                <a:avLst/>
-              </a:prstGeom>
-              <a:ln w="12700">
-                <a:solidFill>
-                  <a:schemeClr val="tx1"/>
-                </a:solidFill>
-                <a:tailEnd type="triangle"/>
-              </a:ln>
-            </p:spPr>
-            <p:style>
-              <a:lnRef idx="1">
-                <a:schemeClr val="accent1"/>
-              </a:lnRef>
-              <a:fillRef idx="0">
-                <a:schemeClr val="accent1"/>
-              </a:fillRef>
-              <a:effectRef idx="0">
-                <a:schemeClr val="accent1"/>
-              </a:effectRef>
-              <a:fontRef idx="minor">
-                <a:schemeClr val="tx1"/>
-              </a:fontRef>
-            </p:style>
-          </p:cxnSp>
-        </p:grpSp>
-        <p:sp>
-          <p:nvSpPr>
-            <p:cNvPr id="154" name="Textfeld 153"/>
-            <p:cNvSpPr txBox="1"/>
-            <p:nvPr/>
-          </p:nvSpPr>
-          <p:spPr>
-            <a:xfrm>
-              <a:off x="1020228" y="1610336"/>
-              <a:ext cx="540212" cy="369332"/>
-            </a:xfrm>
-            <a:prstGeom prst="rect">
-              <a:avLst/>
-            </a:prstGeom>
-            <a:noFill/>
-          </p:spPr>
-          <p:txBody>
-            <a:bodyPr wrap="none" rtlCol="0">
-              <a:spAutoFit/>
-            </a:bodyPr>
-            <a:lstStyle/>
-            <a:p>
-              <a:r>
-                <a:rPr lang="de-DE" dirty="0" smtClean="0"/>
-                <a:t>Age</a:t>
-              </a:r>
-              <a:endParaRPr lang="en-US" dirty="0"/>
-            </a:p>
-          </p:txBody>
-        </p:sp>
-      </p:grpSp>
-      <p:grpSp>
-        <p:nvGrpSpPr>
-          <p:cNvPr id="169" name="Gruppieren 168"/>
-          <p:cNvGrpSpPr/>
-          <p:nvPr/>
-        </p:nvGrpSpPr>
-        <p:grpSpPr>
-          <a:xfrm>
-            <a:off x="6555398" y="3933298"/>
-            <a:ext cx="1193272" cy="1015807"/>
-            <a:chOff x="838728" y="1610336"/>
-            <a:chExt cx="1193272" cy="1268482"/>
-          </a:xfrm>
-        </p:grpSpPr>
-        <p:grpSp>
-          <p:nvGrpSpPr>
-            <p:cNvPr id="170" name="Gruppieren 169"/>
-            <p:cNvGrpSpPr/>
-            <p:nvPr/>
-          </p:nvGrpSpPr>
-          <p:grpSpPr>
-            <a:xfrm>
-              <a:off x="838728" y="1923142"/>
-              <a:ext cx="1193272" cy="955676"/>
-              <a:chOff x="1186452" y="2888344"/>
-              <a:chExt cx="3221170" cy="2860511"/>
-            </a:xfrm>
-          </p:grpSpPr>
-          <p:sp>
-            <p:nvSpPr>
-              <p:cNvPr id="172" name="Rechteck 171"/>
-              <p:cNvSpPr/>
-              <p:nvPr/>
-            </p:nvSpPr>
-            <p:spPr>
-              <a:xfrm>
-                <a:off x="1320800" y="4484913"/>
-                <a:ext cx="355600" cy="703943"/>
-              </a:xfrm>
-              <a:prstGeom prst="rect">
-                <a:avLst/>
-              </a:prstGeom>
-            </p:spPr>
-            <p:style>
-              <a:lnRef idx="2">
-                <a:schemeClr val="accent1">
-                  <a:shade val="50000"/>
-                </a:schemeClr>
-              </a:lnRef>
-              <a:fillRef idx="1">
-                <a:schemeClr val="accent1"/>
-              </a:fillRef>
-              <a:effectRef idx="0">
-                <a:schemeClr val="accent1"/>
-              </a:effectRef>
-              <a:fontRef idx="minor">
-                <a:schemeClr val="lt1"/>
-              </a:fontRef>
-            </p:style>
-            <p:txBody>
-              <a:bodyPr rtlCol="0" anchor="ctr"/>
-              <a:lstStyle/>
-              <a:p>
-                <a:pPr algn="ctr"/>
-                <a:endParaRPr lang="en-US" sz="600"/>
-              </a:p>
-            </p:txBody>
-          </p:sp>
-          <p:sp>
-            <p:nvSpPr>
-              <p:cNvPr id="173" name="Rechteck 172"/>
-              <p:cNvSpPr/>
-              <p:nvPr/>
-            </p:nvSpPr>
-            <p:spPr>
-              <a:xfrm>
-                <a:off x="1792515" y="4093030"/>
-                <a:ext cx="355600" cy="1095826"/>
-              </a:xfrm>
-              <a:prstGeom prst="rect">
-                <a:avLst/>
-              </a:prstGeom>
-            </p:spPr>
-            <p:style>
-              <a:lnRef idx="2">
-                <a:schemeClr val="accent1">
-                  <a:shade val="50000"/>
-                </a:schemeClr>
-              </a:lnRef>
-              <a:fillRef idx="1">
-                <a:schemeClr val="accent1"/>
-              </a:fillRef>
-              <a:effectRef idx="0">
-                <a:schemeClr val="accent1"/>
-              </a:effectRef>
-              <a:fontRef idx="minor">
-                <a:schemeClr val="lt1"/>
-              </a:fontRef>
-            </p:style>
-            <p:txBody>
-              <a:bodyPr rtlCol="0" anchor="ctr"/>
-              <a:lstStyle/>
-              <a:p>
-                <a:pPr algn="ctr"/>
-                <a:endParaRPr lang="en-US" sz="600"/>
-              </a:p>
-            </p:txBody>
-          </p:sp>
-          <p:sp>
-            <p:nvSpPr>
-              <p:cNvPr id="174" name="Rechteck 173"/>
-              <p:cNvSpPr/>
-              <p:nvPr/>
-            </p:nvSpPr>
-            <p:spPr>
-              <a:xfrm>
-                <a:off x="2264230" y="3302000"/>
-                <a:ext cx="355600" cy="1886856"/>
-              </a:xfrm>
-              <a:prstGeom prst="rect">
-                <a:avLst/>
-              </a:prstGeom>
-            </p:spPr>
-            <p:style>
-              <a:lnRef idx="2">
-                <a:schemeClr val="accent1">
-                  <a:shade val="50000"/>
-                </a:schemeClr>
-              </a:lnRef>
-              <a:fillRef idx="1">
-                <a:schemeClr val="accent1"/>
-              </a:fillRef>
-              <a:effectRef idx="0">
-                <a:schemeClr val="accent1"/>
-              </a:effectRef>
-              <a:fontRef idx="minor">
-                <a:schemeClr val="lt1"/>
-              </a:fontRef>
-            </p:style>
-            <p:txBody>
-              <a:bodyPr rtlCol="0" anchor="ctr"/>
-              <a:lstStyle/>
-              <a:p>
-                <a:pPr algn="ctr"/>
-                <a:endParaRPr lang="en-US" sz="600"/>
-              </a:p>
-            </p:txBody>
-          </p:sp>
-          <p:sp>
-            <p:nvSpPr>
-              <p:cNvPr id="175" name="Rechteck 174"/>
-              <p:cNvSpPr/>
-              <p:nvPr/>
-            </p:nvSpPr>
-            <p:spPr>
-              <a:xfrm>
-                <a:off x="2735945" y="3918856"/>
-                <a:ext cx="355600" cy="1269999"/>
-              </a:xfrm>
-              <a:prstGeom prst="rect">
-                <a:avLst/>
-              </a:prstGeom>
-            </p:spPr>
-            <p:style>
-              <a:lnRef idx="2">
-                <a:schemeClr val="accent1">
-                  <a:shade val="50000"/>
-                </a:schemeClr>
-              </a:lnRef>
-              <a:fillRef idx="1">
-                <a:schemeClr val="accent1"/>
-              </a:fillRef>
-              <a:effectRef idx="0">
-                <a:schemeClr val="accent1"/>
-              </a:effectRef>
-              <a:fontRef idx="minor">
-                <a:schemeClr val="lt1"/>
-              </a:fontRef>
-            </p:style>
-            <p:txBody>
-              <a:bodyPr rtlCol="0" anchor="ctr"/>
-              <a:lstStyle/>
-              <a:p>
-                <a:pPr algn="ctr"/>
-                <a:endParaRPr lang="en-US" sz="600"/>
-              </a:p>
-            </p:txBody>
-          </p:sp>
-          <p:sp>
-            <p:nvSpPr>
-              <p:cNvPr id="176" name="Rechteck 175"/>
-              <p:cNvSpPr/>
-              <p:nvPr/>
-            </p:nvSpPr>
-            <p:spPr>
-              <a:xfrm>
-                <a:off x="3207660" y="4376057"/>
-                <a:ext cx="355600" cy="812798"/>
-              </a:xfrm>
-              <a:prstGeom prst="rect">
-                <a:avLst/>
-              </a:prstGeom>
-            </p:spPr>
-            <p:style>
-              <a:lnRef idx="2">
-                <a:schemeClr val="accent1">
-                  <a:shade val="50000"/>
-                </a:schemeClr>
-              </a:lnRef>
-              <a:fillRef idx="1">
-                <a:schemeClr val="accent1"/>
-              </a:fillRef>
-              <a:effectRef idx="0">
-                <a:schemeClr val="accent1"/>
-              </a:effectRef>
-              <a:fontRef idx="minor">
-                <a:schemeClr val="lt1"/>
-              </a:fontRef>
-            </p:style>
-            <p:txBody>
-              <a:bodyPr rtlCol="0" anchor="ctr"/>
-              <a:lstStyle/>
-              <a:p>
-                <a:pPr algn="ctr"/>
-                <a:endParaRPr lang="en-US" sz="600"/>
-              </a:p>
-            </p:txBody>
-          </p:sp>
-          <p:sp>
-            <p:nvSpPr>
-              <p:cNvPr id="177" name="Rechteck 176"/>
-              <p:cNvSpPr/>
-              <p:nvPr/>
-            </p:nvSpPr>
-            <p:spPr>
-              <a:xfrm>
-                <a:off x="3679375" y="4717143"/>
-                <a:ext cx="355600" cy="471712"/>
-              </a:xfrm>
-              <a:prstGeom prst="rect">
-                <a:avLst/>
-              </a:prstGeom>
-            </p:spPr>
-            <p:style>
-              <a:lnRef idx="2">
-                <a:schemeClr val="accent1">
-                  <a:shade val="50000"/>
-                </a:schemeClr>
-              </a:lnRef>
-              <a:fillRef idx="1">
-                <a:schemeClr val="accent1"/>
-              </a:fillRef>
-              <a:effectRef idx="0">
-                <a:schemeClr val="accent1"/>
-              </a:effectRef>
-              <a:fontRef idx="minor">
-                <a:schemeClr val="lt1"/>
-              </a:fontRef>
-            </p:style>
-            <p:txBody>
-              <a:bodyPr rtlCol="0" anchor="ctr"/>
-              <a:lstStyle/>
-              <a:p>
-                <a:pPr algn="ctr"/>
-                <a:endParaRPr lang="en-US" sz="600"/>
-              </a:p>
-            </p:txBody>
-          </p:sp>
-          <p:grpSp>
-            <p:nvGrpSpPr>
-              <p:cNvPr id="178" name="Gruppieren 177"/>
-              <p:cNvGrpSpPr/>
-              <p:nvPr/>
-            </p:nvGrpSpPr>
-            <p:grpSpPr>
-              <a:xfrm>
-                <a:off x="1245222" y="5123553"/>
-                <a:ext cx="3162400" cy="625302"/>
-                <a:chOff x="1245222" y="5123553"/>
-                <a:chExt cx="3162400" cy="625302"/>
-              </a:xfrm>
-            </p:grpSpPr>
-            <p:sp>
-              <p:nvSpPr>
-                <p:cNvPr id="180" name="Textfeld 179"/>
-                <p:cNvSpPr txBox="1"/>
-                <p:nvPr/>
-              </p:nvSpPr>
-              <p:spPr>
-                <a:xfrm>
-                  <a:off x="1245222" y="5130802"/>
-                  <a:ext cx="771112" cy="552738"/>
-                </a:xfrm>
-                <a:prstGeom prst="rect">
-                  <a:avLst/>
-                </a:prstGeom>
-                <a:noFill/>
-              </p:spPr>
-              <p:txBody>
-                <a:bodyPr wrap="none" rtlCol="0">
-                  <a:spAutoFit/>
-                </a:bodyPr>
-                <a:lstStyle/>
-                <a:p>
-                  <a:r>
-                    <a:rPr lang="de-DE" sz="600" dirty="0" smtClean="0"/>
-                    <a:t>0-4</a:t>
-                  </a:r>
-                  <a:endParaRPr lang="en-US" sz="600" dirty="0"/>
-                </a:p>
-              </p:txBody>
-            </p:sp>
-            <p:sp>
-              <p:nvSpPr>
-                <p:cNvPr id="181" name="Textfeld 180"/>
-                <p:cNvSpPr txBox="1"/>
-                <p:nvPr/>
-              </p:nvSpPr>
-              <p:spPr>
-                <a:xfrm>
-                  <a:off x="1706425" y="5188858"/>
-                  <a:ext cx="874965" cy="552738"/>
-                </a:xfrm>
-                <a:prstGeom prst="rect">
-                  <a:avLst/>
-                </a:prstGeom>
-                <a:noFill/>
-              </p:spPr>
-              <p:txBody>
-                <a:bodyPr wrap="none" rtlCol="0">
-                  <a:spAutoFit/>
-                </a:bodyPr>
-                <a:lstStyle/>
-                <a:p>
-                  <a:r>
-                    <a:rPr lang="de-DE" sz="600" dirty="0" smtClean="0"/>
-                    <a:t>5-14</a:t>
-                  </a:r>
-                  <a:endParaRPr lang="en-US" sz="600" dirty="0"/>
-                </a:p>
-              </p:txBody>
-            </p:sp>
-            <p:sp>
-              <p:nvSpPr>
-                <p:cNvPr id="182" name="Textfeld 181"/>
-                <p:cNvSpPr txBox="1"/>
-                <p:nvPr/>
-              </p:nvSpPr>
-              <p:spPr>
-                <a:xfrm>
-                  <a:off x="2134597" y="5138061"/>
-                  <a:ext cx="978818" cy="552738"/>
-                </a:xfrm>
-                <a:prstGeom prst="rect">
-                  <a:avLst/>
-                </a:prstGeom>
-                <a:noFill/>
-              </p:spPr>
-              <p:txBody>
-                <a:bodyPr wrap="none" rtlCol="0">
-                  <a:spAutoFit/>
-                </a:bodyPr>
-                <a:lstStyle/>
-                <a:p>
-                  <a:r>
-                    <a:rPr lang="de-DE" sz="600" dirty="0" smtClean="0"/>
-                    <a:t>15-34</a:t>
-                  </a:r>
-                  <a:endParaRPr lang="en-US" sz="600" dirty="0"/>
-                </a:p>
-              </p:txBody>
-            </p:sp>
-            <p:sp>
-              <p:nvSpPr>
-                <p:cNvPr id="183" name="Textfeld 182"/>
-                <p:cNvSpPr txBox="1"/>
-                <p:nvPr/>
-              </p:nvSpPr>
-              <p:spPr>
-                <a:xfrm>
-                  <a:off x="2606311" y="5188864"/>
-                  <a:ext cx="978818" cy="552738"/>
-                </a:xfrm>
-                <a:prstGeom prst="rect">
-                  <a:avLst/>
-                </a:prstGeom>
-                <a:noFill/>
-              </p:spPr>
-              <p:txBody>
-                <a:bodyPr wrap="none" rtlCol="0">
-                  <a:spAutoFit/>
-                </a:bodyPr>
-                <a:lstStyle/>
-                <a:p>
-                  <a:r>
-                    <a:rPr lang="de-DE" sz="600" dirty="0" smtClean="0"/>
-                    <a:t>35-59</a:t>
-                  </a:r>
-                  <a:endParaRPr lang="en-US" sz="600" dirty="0"/>
-                </a:p>
-              </p:txBody>
-            </p:sp>
-            <p:sp>
-              <p:nvSpPr>
-                <p:cNvPr id="184" name="Textfeld 183"/>
-                <p:cNvSpPr txBox="1"/>
-                <p:nvPr/>
-              </p:nvSpPr>
-              <p:spPr>
-                <a:xfrm>
-                  <a:off x="3056254" y="5123553"/>
-                  <a:ext cx="978818" cy="552738"/>
-                </a:xfrm>
-                <a:prstGeom prst="rect">
-                  <a:avLst/>
-                </a:prstGeom>
-                <a:noFill/>
-              </p:spPr>
-              <p:txBody>
-                <a:bodyPr wrap="none" rtlCol="0">
-                  <a:spAutoFit/>
-                </a:bodyPr>
-                <a:lstStyle/>
-                <a:p>
-                  <a:r>
-                    <a:rPr lang="de-DE" sz="600" dirty="0" smtClean="0"/>
-                    <a:t>60-79</a:t>
-                  </a:r>
-                  <a:endParaRPr lang="en-US" sz="600" dirty="0"/>
-                </a:p>
-              </p:txBody>
-            </p:sp>
-            <p:sp>
-              <p:nvSpPr>
-                <p:cNvPr id="185" name="Textfeld 184"/>
-                <p:cNvSpPr txBox="1"/>
-                <p:nvPr/>
-              </p:nvSpPr>
-              <p:spPr>
-                <a:xfrm>
-                  <a:off x="3597568" y="5196117"/>
-                  <a:ext cx="810054" cy="552738"/>
-                </a:xfrm>
-                <a:prstGeom prst="rect">
-                  <a:avLst/>
-                </a:prstGeom>
-                <a:noFill/>
-              </p:spPr>
-              <p:txBody>
-                <a:bodyPr wrap="none" rtlCol="0">
-                  <a:spAutoFit/>
-                </a:bodyPr>
-                <a:lstStyle/>
-                <a:p>
-                  <a:r>
-                    <a:rPr lang="de-DE" sz="600" dirty="0" smtClean="0"/>
-                    <a:t>80+</a:t>
-                  </a:r>
-                  <a:endParaRPr lang="en-US" sz="600" dirty="0"/>
-                </a:p>
-              </p:txBody>
-            </p:sp>
-          </p:grpSp>
-          <p:cxnSp>
-            <p:nvCxnSpPr>
-              <p:cNvPr id="179" name="Gerade Verbindung mit Pfeil 178"/>
-              <p:cNvCxnSpPr/>
-              <p:nvPr/>
-            </p:nvCxnSpPr>
-            <p:spPr>
-              <a:xfrm flipV="1">
-                <a:off x="1186452" y="2888344"/>
-                <a:ext cx="0" cy="2316518"/>
-              </a:xfrm>
-              <a:prstGeom prst="straightConnector1">
-                <a:avLst/>
-              </a:prstGeom>
-              <a:ln w="12700">
-                <a:solidFill>
-                  <a:schemeClr val="tx1"/>
-                </a:solidFill>
-                <a:tailEnd type="triangle"/>
-              </a:ln>
-            </p:spPr>
-            <p:style>
-              <a:lnRef idx="1">
-                <a:schemeClr val="accent1"/>
-              </a:lnRef>
-              <a:fillRef idx="0">
-                <a:schemeClr val="accent1"/>
-              </a:fillRef>
-              <a:effectRef idx="0">
-                <a:schemeClr val="accent1"/>
-              </a:effectRef>
-              <a:fontRef idx="minor">
-                <a:schemeClr val="tx1"/>
-              </a:fontRef>
-            </p:style>
-          </p:cxnSp>
-        </p:grpSp>
-        <p:sp>
-          <p:nvSpPr>
-            <p:cNvPr id="171" name="Textfeld 170"/>
-            <p:cNvSpPr txBox="1"/>
-            <p:nvPr/>
-          </p:nvSpPr>
-          <p:spPr>
-            <a:xfrm>
-              <a:off x="1020228" y="1610336"/>
-              <a:ext cx="540212" cy="369332"/>
-            </a:xfrm>
-            <a:prstGeom prst="rect">
-              <a:avLst/>
-            </a:prstGeom>
-            <a:noFill/>
-          </p:spPr>
-          <p:txBody>
-            <a:bodyPr wrap="none" rtlCol="0">
-              <a:spAutoFit/>
-            </a:bodyPr>
-            <a:lstStyle/>
-            <a:p>
-              <a:r>
-                <a:rPr lang="de-DE" dirty="0" smtClean="0"/>
-                <a:t>Age</a:t>
-              </a:r>
-              <a:endParaRPr lang="en-US" dirty="0"/>
-            </a:p>
-          </p:txBody>
-        </p:sp>
-      </p:grpSp>
-      <p:grpSp>
-        <p:nvGrpSpPr>
-          <p:cNvPr id="187" name="Gruppieren 186"/>
-          <p:cNvGrpSpPr/>
-          <p:nvPr/>
-        </p:nvGrpSpPr>
-        <p:grpSpPr>
-          <a:xfrm>
-            <a:off x="10153213" y="4656239"/>
-            <a:ext cx="1193272" cy="1015807"/>
-            <a:chOff x="838728" y="1610336"/>
-            <a:chExt cx="1193272" cy="1268482"/>
-          </a:xfrm>
-        </p:grpSpPr>
-        <p:grpSp>
-          <p:nvGrpSpPr>
-            <p:cNvPr id="188" name="Gruppieren 187"/>
-            <p:cNvGrpSpPr/>
-            <p:nvPr/>
-          </p:nvGrpSpPr>
-          <p:grpSpPr>
-            <a:xfrm>
-              <a:off x="838728" y="1923142"/>
-              <a:ext cx="1193272" cy="955676"/>
-              <a:chOff x="1186452" y="2888344"/>
-              <a:chExt cx="3221170" cy="2860511"/>
-            </a:xfrm>
-          </p:grpSpPr>
-          <p:sp>
-            <p:nvSpPr>
-              <p:cNvPr id="190" name="Rechteck 189"/>
-              <p:cNvSpPr/>
-              <p:nvPr/>
-            </p:nvSpPr>
-            <p:spPr>
-              <a:xfrm>
-                <a:off x="1320800" y="4484913"/>
-                <a:ext cx="355600" cy="703943"/>
-              </a:xfrm>
-              <a:prstGeom prst="rect">
-                <a:avLst/>
-              </a:prstGeom>
-            </p:spPr>
-            <p:style>
-              <a:lnRef idx="2">
-                <a:schemeClr val="accent1">
-                  <a:shade val="50000"/>
-                </a:schemeClr>
-              </a:lnRef>
-              <a:fillRef idx="1">
-                <a:schemeClr val="accent1"/>
-              </a:fillRef>
-              <a:effectRef idx="0">
-                <a:schemeClr val="accent1"/>
-              </a:effectRef>
-              <a:fontRef idx="minor">
-                <a:schemeClr val="lt1"/>
-              </a:fontRef>
-            </p:style>
-            <p:txBody>
-              <a:bodyPr rtlCol="0" anchor="ctr"/>
-              <a:lstStyle/>
-              <a:p>
-                <a:pPr algn="ctr"/>
-                <a:endParaRPr lang="en-US" sz="600"/>
-              </a:p>
-            </p:txBody>
-          </p:sp>
-          <p:sp>
-            <p:nvSpPr>
-              <p:cNvPr id="191" name="Rechteck 190"/>
-              <p:cNvSpPr/>
-              <p:nvPr/>
-            </p:nvSpPr>
-            <p:spPr>
-              <a:xfrm>
-                <a:off x="1792515" y="4093030"/>
-                <a:ext cx="355600" cy="1095826"/>
-              </a:xfrm>
-              <a:prstGeom prst="rect">
-                <a:avLst/>
-              </a:prstGeom>
-            </p:spPr>
-            <p:style>
-              <a:lnRef idx="2">
-                <a:schemeClr val="accent1">
-                  <a:shade val="50000"/>
-                </a:schemeClr>
-              </a:lnRef>
-              <a:fillRef idx="1">
-                <a:schemeClr val="accent1"/>
-              </a:fillRef>
-              <a:effectRef idx="0">
-                <a:schemeClr val="accent1"/>
-              </a:effectRef>
-              <a:fontRef idx="minor">
-                <a:schemeClr val="lt1"/>
-              </a:fontRef>
-            </p:style>
-            <p:txBody>
-              <a:bodyPr rtlCol="0" anchor="ctr"/>
-              <a:lstStyle/>
-              <a:p>
-                <a:pPr algn="ctr"/>
-                <a:endParaRPr lang="en-US" sz="600"/>
-              </a:p>
-            </p:txBody>
-          </p:sp>
-          <p:sp>
-            <p:nvSpPr>
-              <p:cNvPr id="192" name="Rechteck 191"/>
-              <p:cNvSpPr/>
-              <p:nvPr/>
-            </p:nvSpPr>
-            <p:spPr>
-              <a:xfrm>
-                <a:off x="2264230" y="3302000"/>
-                <a:ext cx="355600" cy="1886856"/>
-              </a:xfrm>
-              <a:prstGeom prst="rect">
-                <a:avLst/>
-              </a:prstGeom>
-            </p:spPr>
-            <p:style>
-              <a:lnRef idx="2">
-                <a:schemeClr val="accent1">
-                  <a:shade val="50000"/>
-                </a:schemeClr>
-              </a:lnRef>
-              <a:fillRef idx="1">
-                <a:schemeClr val="accent1"/>
-              </a:fillRef>
-              <a:effectRef idx="0">
-                <a:schemeClr val="accent1"/>
-              </a:effectRef>
-              <a:fontRef idx="minor">
-                <a:schemeClr val="lt1"/>
-              </a:fontRef>
-            </p:style>
-            <p:txBody>
-              <a:bodyPr rtlCol="0" anchor="ctr"/>
-              <a:lstStyle/>
-              <a:p>
-                <a:pPr algn="ctr"/>
-                <a:endParaRPr lang="en-US" sz="600"/>
-              </a:p>
-            </p:txBody>
-          </p:sp>
-          <p:sp>
-            <p:nvSpPr>
-              <p:cNvPr id="193" name="Rechteck 192"/>
-              <p:cNvSpPr/>
-              <p:nvPr/>
-            </p:nvSpPr>
-            <p:spPr>
-              <a:xfrm>
-                <a:off x="2735945" y="3918856"/>
-                <a:ext cx="355600" cy="1269999"/>
-              </a:xfrm>
-              <a:prstGeom prst="rect">
-                <a:avLst/>
-              </a:prstGeom>
-            </p:spPr>
-            <p:style>
-              <a:lnRef idx="2">
-                <a:schemeClr val="accent1">
-                  <a:shade val="50000"/>
-                </a:schemeClr>
-              </a:lnRef>
-              <a:fillRef idx="1">
-                <a:schemeClr val="accent1"/>
-              </a:fillRef>
-              <a:effectRef idx="0">
-                <a:schemeClr val="accent1"/>
-              </a:effectRef>
-              <a:fontRef idx="minor">
-                <a:schemeClr val="lt1"/>
-              </a:fontRef>
-            </p:style>
-            <p:txBody>
-              <a:bodyPr rtlCol="0" anchor="ctr"/>
-              <a:lstStyle/>
-              <a:p>
-                <a:pPr algn="ctr"/>
-                <a:endParaRPr lang="en-US" sz="600"/>
-              </a:p>
-            </p:txBody>
-          </p:sp>
-          <p:sp>
-            <p:nvSpPr>
-              <p:cNvPr id="194" name="Rechteck 193"/>
-              <p:cNvSpPr/>
-              <p:nvPr/>
-            </p:nvSpPr>
-            <p:spPr>
-              <a:xfrm>
-                <a:off x="3207660" y="4376057"/>
-                <a:ext cx="355600" cy="812798"/>
-              </a:xfrm>
-              <a:prstGeom prst="rect">
-                <a:avLst/>
-              </a:prstGeom>
-            </p:spPr>
-            <p:style>
-              <a:lnRef idx="2">
-                <a:schemeClr val="accent1">
-                  <a:shade val="50000"/>
-                </a:schemeClr>
-              </a:lnRef>
-              <a:fillRef idx="1">
-                <a:schemeClr val="accent1"/>
-              </a:fillRef>
-              <a:effectRef idx="0">
-                <a:schemeClr val="accent1"/>
-              </a:effectRef>
-              <a:fontRef idx="minor">
-                <a:schemeClr val="lt1"/>
-              </a:fontRef>
-            </p:style>
-            <p:txBody>
-              <a:bodyPr rtlCol="0" anchor="ctr"/>
-              <a:lstStyle/>
-              <a:p>
-                <a:pPr algn="ctr"/>
-                <a:endParaRPr lang="en-US" sz="600"/>
-              </a:p>
-            </p:txBody>
-          </p:sp>
-          <p:sp>
-            <p:nvSpPr>
-              <p:cNvPr id="195" name="Rechteck 194"/>
-              <p:cNvSpPr/>
-              <p:nvPr/>
-            </p:nvSpPr>
-            <p:spPr>
-              <a:xfrm>
-                <a:off x="3679375" y="4717143"/>
-                <a:ext cx="355600" cy="471712"/>
-              </a:xfrm>
-              <a:prstGeom prst="rect">
-                <a:avLst/>
-              </a:prstGeom>
-            </p:spPr>
-            <p:style>
-              <a:lnRef idx="2">
-                <a:schemeClr val="accent1">
-                  <a:shade val="50000"/>
-                </a:schemeClr>
-              </a:lnRef>
-              <a:fillRef idx="1">
-                <a:schemeClr val="accent1"/>
-              </a:fillRef>
-              <a:effectRef idx="0">
-                <a:schemeClr val="accent1"/>
-              </a:effectRef>
-              <a:fontRef idx="minor">
-                <a:schemeClr val="lt1"/>
-              </a:fontRef>
-            </p:style>
-            <p:txBody>
-              <a:bodyPr rtlCol="0" anchor="ctr"/>
-              <a:lstStyle/>
-              <a:p>
-                <a:pPr algn="ctr"/>
-                <a:endParaRPr lang="en-US" sz="600"/>
-              </a:p>
-            </p:txBody>
-          </p:sp>
-          <p:grpSp>
-            <p:nvGrpSpPr>
-              <p:cNvPr id="196" name="Gruppieren 195"/>
-              <p:cNvGrpSpPr/>
-              <p:nvPr/>
-            </p:nvGrpSpPr>
-            <p:grpSpPr>
-              <a:xfrm>
-                <a:off x="1245222" y="5123553"/>
-                <a:ext cx="3162400" cy="625302"/>
-                <a:chOff x="1245222" y="5123553"/>
-                <a:chExt cx="3162400" cy="625302"/>
-              </a:xfrm>
-            </p:grpSpPr>
-            <p:sp>
-              <p:nvSpPr>
-                <p:cNvPr id="198" name="Textfeld 197"/>
-                <p:cNvSpPr txBox="1"/>
-                <p:nvPr/>
-              </p:nvSpPr>
-              <p:spPr>
-                <a:xfrm>
-                  <a:off x="1245222" y="5130802"/>
-                  <a:ext cx="771112" cy="552738"/>
-                </a:xfrm>
-                <a:prstGeom prst="rect">
-                  <a:avLst/>
-                </a:prstGeom>
-                <a:noFill/>
-              </p:spPr>
-              <p:txBody>
-                <a:bodyPr wrap="none" rtlCol="0">
-                  <a:spAutoFit/>
-                </a:bodyPr>
-                <a:lstStyle/>
-                <a:p>
-                  <a:r>
-                    <a:rPr lang="de-DE" sz="600" dirty="0" smtClean="0"/>
-                    <a:t>0-4</a:t>
-                  </a:r>
-                  <a:endParaRPr lang="en-US" sz="600" dirty="0"/>
-                </a:p>
-              </p:txBody>
-            </p:sp>
-            <p:sp>
-              <p:nvSpPr>
-                <p:cNvPr id="199" name="Textfeld 198"/>
-                <p:cNvSpPr txBox="1"/>
-                <p:nvPr/>
-              </p:nvSpPr>
-              <p:spPr>
-                <a:xfrm>
-                  <a:off x="1706425" y="5188858"/>
-                  <a:ext cx="874965" cy="552738"/>
-                </a:xfrm>
-                <a:prstGeom prst="rect">
-                  <a:avLst/>
-                </a:prstGeom>
-                <a:noFill/>
-              </p:spPr>
-              <p:txBody>
-                <a:bodyPr wrap="none" rtlCol="0">
-                  <a:spAutoFit/>
-                </a:bodyPr>
-                <a:lstStyle/>
-                <a:p>
-                  <a:r>
-                    <a:rPr lang="de-DE" sz="600" dirty="0" smtClean="0"/>
-                    <a:t>5-14</a:t>
-                  </a:r>
-                  <a:endParaRPr lang="en-US" sz="600" dirty="0"/>
-                </a:p>
-              </p:txBody>
-            </p:sp>
-            <p:sp>
-              <p:nvSpPr>
-                <p:cNvPr id="200" name="Textfeld 199"/>
-                <p:cNvSpPr txBox="1"/>
-                <p:nvPr/>
-              </p:nvSpPr>
-              <p:spPr>
-                <a:xfrm>
-                  <a:off x="2134597" y="5138061"/>
-                  <a:ext cx="978818" cy="552738"/>
-                </a:xfrm>
-                <a:prstGeom prst="rect">
-                  <a:avLst/>
-                </a:prstGeom>
-                <a:noFill/>
-              </p:spPr>
-              <p:txBody>
-                <a:bodyPr wrap="none" rtlCol="0">
-                  <a:spAutoFit/>
-                </a:bodyPr>
-                <a:lstStyle/>
-                <a:p>
-                  <a:r>
-                    <a:rPr lang="de-DE" sz="600" dirty="0" smtClean="0"/>
-                    <a:t>15-34</a:t>
-                  </a:r>
-                  <a:endParaRPr lang="en-US" sz="600" dirty="0"/>
-                </a:p>
-              </p:txBody>
-            </p:sp>
-            <p:sp>
-              <p:nvSpPr>
-                <p:cNvPr id="201" name="Textfeld 200"/>
-                <p:cNvSpPr txBox="1"/>
-                <p:nvPr/>
-              </p:nvSpPr>
-              <p:spPr>
-                <a:xfrm>
-                  <a:off x="2606311" y="5188864"/>
-                  <a:ext cx="978818" cy="552738"/>
-                </a:xfrm>
-                <a:prstGeom prst="rect">
-                  <a:avLst/>
-                </a:prstGeom>
-                <a:noFill/>
-              </p:spPr>
-              <p:txBody>
-                <a:bodyPr wrap="none" rtlCol="0">
-                  <a:spAutoFit/>
-                </a:bodyPr>
-                <a:lstStyle/>
-                <a:p>
-                  <a:r>
-                    <a:rPr lang="de-DE" sz="600" dirty="0" smtClean="0"/>
-                    <a:t>35-59</a:t>
-                  </a:r>
-                  <a:endParaRPr lang="en-US" sz="600" dirty="0"/>
-                </a:p>
-              </p:txBody>
-            </p:sp>
-            <p:sp>
-              <p:nvSpPr>
-                <p:cNvPr id="202" name="Textfeld 201"/>
-                <p:cNvSpPr txBox="1"/>
-                <p:nvPr/>
-              </p:nvSpPr>
-              <p:spPr>
-                <a:xfrm>
-                  <a:off x="3056254" y="5123553"/>
-                  <a:ext cx="978818" cy="552738"/>
-                </a:xfrm>
-                <a:prstGeom prst="rect">
-                  <a:avLst/>
-                </a:prstGeom>
-                <a:noFill/>
-              </p:spPr>
-              <p:txBody>
-                <a:bodyPr wrap="none" rtlCol="0">
-                  <a:spAutoFit/>
-                </a:bodyPr>
-                <a:lstStyle/>
-                <a:p>
-                  <a:r>
-                    <a:rPr lang="de-DE" sz="600" dirty="0" smtClean="0"/>
-                    <a:t>60-79</a:t>
-                  </a:r>
-                  <a:endParaRPr lang="en-US" sz="600" dirty="0"/>
-                </a:p>
-              </p:txBody>
-            </p:sp>
-            <p:sp>
-              <p:nvSpPr>
-                <p:cNvPr id="203" name="Textfeld 202"/>
-                <p:cNvSpPr txBox="1"/>
-                <p:nvPr/>
-              </p:nvSpPr>
-              <p:spPr>
-                <a:xfrm>
-                  <a:off x="3597568" y="5196117"/>
-                  <a:ext cx="810054" cy="552738"/>
-                </a:xfrm>
-                <a:prstGeom prst="rect">
-                  <a:avLst/>
-                </a:prstGeom>
-                <a:noFill/>
-              </p:spPr>
-              <p:txBody>
-                <a:bodyPr wrap="none" rtlCol="0">
-                  <a:spAutoFit/>
-                </a:bodyPr>
-                <a:lstStyle/>
-                <a:p>
-                  <a:r>
-                    <a:rPr lang="de-DE" sz="600" dirty="0" smtClean="0"/>
-                    <a:t>80+</a:t>
-                  </a:r>
-                  <a:endParaRPr lang="en-US" sz="600" dirty="0"/>
-                </a:p>
-              </p:txBody>
-            </p:sp>
-          </p:grpSp>
-          <p:cxnSp>
-            <p:nvCxnSpPr>
-              <p:cNvPr id="197" name="Gerade Verbindung mit Pfeil 196"/>
-              <p:cNvCxnSpPr/>
-              <p:nvPr/>
-            </p:nvCxnSpPr>
-            <p:spPr>
-              <a:xfrm flipV="1">
-                <a:off x="1186452" y="2888344"/>
-                <a:ext cx="0" cy="2316518"/>
-              </a:xfrm>
-              <a:prstGeom prst="straightConnector1">
-                <a:avLst/>
-              </a:prstGeom>
-              <a:ln w="12700">
-                <a:solidFill>
-                  <a:schemeClr val="tx1"/>
-                </a:solidFill>
-                <a:tailEnd type="triangle"/>
-              </a:ln>
-            </p:spPr>
-            <p:style>
-              <a:lnRef idx="1">
-                <a:schemeClr val="accent1"/>
-              </a:lnRef>
-              <a:fillRef idx="0">
-                <a:schemeClr val="accent1"/>
-              </a:fillRef>
-              <a:effectRef idx="0">
-                <a:schemeClr val="accent1"/>
-              </a:effectRef>
-              <a:fontRef idx="minor">
-                <a:schemeClr val="tx1"/>
-              </a:fontRef>
-            </p:style>
-          </p:cxnSp>
-        </p:grpSp>
-        <p:sp>
-          <p:nvSpPr>
-            <p:cNvPr id="189" name="Textfeld 188"/>
-            <p:cNvSpPr txBox="1"/>
-            <p:nvPr/>
-          </p:nvSpPr>
-          <p:spPr>
-            <a:xfrm>
-              <a:off x="1020228" y="1610336"/>
-              <a:ext cx="540212" cy="369332"/>
-            </a:xfrm>
-            <a:prstGeom prst="rect">
-              <a:avLst/>
-            </a:prstGeom>
-            <a:noFill/>
-          </p:spPr>
-          <p:txBody>
-            <a:bodyPr wrap="none" rtlCol="0">
-              <a:spAutoFit/>
-            </a:bodyPr>
-            <a:lstStyle/>
-            <a:p>
-              <a:r>
-                <a:rPr lang="de-DE" dirty="0" smtClean="0"/>
-                <a:t>Age</a:t>
-              </a:r>
-              <a:endParaRPr lang="en-US" dirty="0"/>
-            </a:p>
-          </p:txBody>
-        </p:sp>
-      </p:grpSp>
       <p:sp>
         <p:nvSpPr>
           <p:cNvPr id="215" name="Textfeld 214"/>
@@ -8040,7 +5398,7 @@
         </p:nvSpPr>
         <p:spPr>
           <a:xfrm>
-            <a:off x="3621136" y="3577210"/>
+            <a:off x="3703855" y="3059761"/>
             <a:ext cx="1121013" cy="369332"/>
           </a:xfrm>
           <a:prstGeom prst="rect">
@@ -8074,7 +5432,7 @@
         <p:spPr>
           <a:xfrm>
             <a:off x="4471212" y="2821395"/>
-            <a:ext cx="263094" cy="3031071"/>
+            <a:ext cx="295777" cy="2048643"/>
           </a:xfrm>
           <a:prstGeom prst="straightConnector1">
             <a:avLst/>
@@ -8215,7 +5573,7 @@
         <p:spPr>
           <a:xfrm>
             <a:off x="4471212" y="2821395"/>
-            <a:ext cx="2724483" cy="3031071"/>
+            <a:ext cx="3433112" cy="1170694"/>
           </a:xfrm>
           <a:prstGeom prst="straightConnector1">
             <a:avLst/>
@@ -8250,7 +5608,7 @@
         </p:nvGrpSpPr>
         <p:grpSpPr>
           <a:xfrm>
-            <a:off x="4190048" y="5635172"/>
+            <a:off x="4222731" y="4652744"/>
             <a:ext cx="1034845" cy="673789"/>
             <a:chOff x="4850698" y="3663378"/>
             <a:chExt cx="6800228" cy="2576640"/>
@@ -9469,7 +6827,7 @@
         </p:nvSpPr>
         <p:spPr>
           <a:xfrm>
-            <a:off x="4199842" y="5852466"/>
+            <a:off x="4232525" y="4870038"/>
             <a:ext cx="1068927" cy="453773"/>
           </a:xfrm>
           <a:prstGeom prst="rect">
@@ -9545,7 +6903,7 @@
         </p:nvSpPr>
         <p:spPr>
           <a:xfrm>
-            <a:off x="5091494" y="5917817"/>
+            <a:off x="5124177" y="4935389"/>
             <a:ext cx="98201" cy="372209"/>
           </a:xfrm>
           <a:prstGeom prst="rect">
@@ -9586,13 +6944,16 @@
       <p:cxnSp>
         <p:nvCxnSpPr>
           <p:cNvPr id="326" name="Gerade Verbindung mit Pfeil 325"/>
-          <p:cNvCxnSpPr/>
+          <p:cNvCxnSpPr>
+            <a:stCxn id="373" idx="0"/>
+            <a:endCxn id="374" idx="1"/>
+          </p:cNvCxnSpPr>
           <p:nvPr/>
         </p:nvCxnSpPr>
         <p:spPr>
-          <a:xfrm>
-            <a:off x="5288464" y="6199137"/>
-            <a:ext cx="1295560" cy="25538"/>
+          <a:xfrm flipH="1" flipV="1">
+            <a:off x="7328114" y="4302383"/>
+            <a:ext cx="836863" cy="1176823"/>
           </a:xfrm>
           <a:prstGeom prst="straightConnector1">
             <a:avLst/>
@@ -9657,7 +7018,7 @@
         </p:nvSpPr>
         <p:spPr>
           <a:xfrm>
-            <a:off x="5752991" y="5925463"/>
+            <a:off x="6262207" y="4112676"/>
             <a:ext cx="299066" cy="307777"/>
           </a:xfrm>
           <a:prstGeom prst="rect">
@@ -9713,15 +7074,15 @@
         <p:nvCxnSpPr>
           <p:cNvPr id="336" name="Gerade Verbindung mit Pfeil 335"/>
           <p:cNvCxnSpPr>
-            <a:stCxn id="376" idx="3"/>
+            <a:stCxn id="337" idx="3"/>
             <a:endCxn id="145" idx="1"/>
           </p:cNvCxnSpPr>
           <p:nvPr/>
         </p:nvCxnSpPr>
         <p:spPr>
-          <a:xfrm flipV="1">
-            <a:off x="7834506" y="6007857"/>
-            <a:ext cx="2271054" cy="100977"/>
+          <a:xfrm>
+            <a:off x="8473938" y="5597650"/>
+            <a:ext cx="1631622" cy="410207"/>
           </a:xfrm>
           <a:prstGeom prst="straightConnector1">
             <a:avLst/>
@@ -9756,8 +7117,8 @@
         </p:nvSpPr>
         <p:spPr>
           <a:xfrm>
-            <a:off x="9883085" y="1772565"/>
-            <a:ext cx="1846128" cy="1755379"/>
+            <a:off x="9894945" y="1973966"/>
+            <a:ext cx="1846128" cy="1036774"/>
           </a:xfrm>
           <a:prstGeom prst="rect">
             <a:avLst/>
@@ -9803,7 +7164,7 @@
         </p:nvSpPr>
         <p:spPr>
           <a:xfrm>
-            <a:off x="760849" y="2723063"/>
+            <a:off x="656794" y="2974509"/>
             <a:ext cx="306494" cy="369332"/>
           </a:xfrm>
           <a:prstGeom prst="rect">
@@ -9833,7 +7194,7 @@
         </p:nvGrpSpPr>
         <p:grpSpPr>
           <a:xfrm>
-            <a:off x="6599959" y="5707835"/>
+            <a:off x="7332171" y="3831035"/>
             <a:ext cx="1034845" cy="673789"/>
             <a:chOff x="4850698" y="3663378"/>
             <a:chExt cx="6800228" cy="2576640"/>
@@ -11014,7 +8375,7 @@
         </p:nvSpPr>
         <p:spPr>
           <a:xfrm>
-            <a:off x="7501405" y="5990480"/>
+            <a:off x="8115876" y="5479206"/>
             <a:ext cx="98201" cy="372209"/>
           </a:xfrm>
           <a:prstGeom prst="rect">
@@ -11060,7 +8421,7 @@
         </p:nvSpPr>
         <p:spPr>
           <a:xfrm>
-            <a:off x="6556884" y="5852466"/>
+            <a:off x="7265513" y="3992089"/>
             <a:ext cx="1277622" cy="512735"/>
           </a:xfrm>
           <a:prstGeom prst="rect">
@@ -11106,7 +8467,7 @@
         </p:nvSpPr>
         <p:spPr>
           <a:xfrm>
-            <a:off x="9184593" y="5691391"/>
+            <a:off x="9069840" y="5765610"/>
             <a:ext cx="293066" cy="307777"/>
           </a:xfrm>
           <a:prstGeom prst="rect">
@@ -11133,14 +8494,14 @@
           <p:cNvPr id="379" name="Gerade Verbindung mit Pfeil 378"/>
           <p:cNvCxnSpPr>
             <a:stCxn id="323" idx="0"/>
-            <a:endCxn id="150" idx="1"/>
+            <a:endCxn id="290" idx="1"/>
           </p:cNvCxnSpPr>
           <p:nvPr/>
         </p:nvCxnSpPr>
         <p:spPr>
           <a:xfrm flipV="1">
-            <a:off x="5140595" y="3092028"/>
-            <a:ext cx="4995849" cy="2825789"/>
+            <a:off x="5173278" y="4592713"/>
+            <a:ext cx="4839101" cy="342676"/>
           </a:xfrm>
           <a:prstGeom prst="straightConnector1">
             <a:avLst/>
@@ -11175,7 +8536,7 @@
         </p:nvSpPr>
         <p:spPr>
           <a:xfrm>
-            <a:off x="9059947" y="3314697"/>
+            <a:off x="9054272" y="3788972"/>
             <a:ext cx="293066" cy="307777"/>
           </a:xfrm>
           <a:prstGeom prst="rect">
@@ -11246,15 +8607,15 @@
         <p:nvCxnSpPr>
           <p:cNvPr id="383" name="Gerade Verbindung mit Pfeil 382"/>
           <p:cNvCxnSpPr>
-            <a:stCxn id="382" idx="0"/>
+            <a:stCxn id="382" idx="3"/>
             <a:endCxn id="150" idx="1"/>
           </p:cNvCxnSpPr>
           <p:nvPr/>
         </p:nvCxnSpPr>
         <p:spPr>
           <a:xfrm>
-            <a:off x="4871883" y="2293105"/>
-            <a:ext cx="5264561" cy="798923"/>
+            <a:off x="4920614" y="2561780"/>
+            <a:ext cx="5227690" cy="13044"/>
           </a:xfrm>
           <a:prstGeom prst="straightConnector1">
             <a:avLst/>
@@ -11289,7 +8650,7 @@
         </p:nvSpPr>
         <p:spPr>
           <a:xfrm>
-            <a:off x="9108211" y="2575881"/>
+            <a:off x="9594581" y="2278076"/>
             <a:ext cx="293066" cy="307777"/>
           </a:xfrm>
           <a:prstGeom prst="rect">
@@ -11318,8 +8679,8 @@
         </p:nvSpPr>
         <p:spPr>
           <a:xfrm>
-            <a:off x="232229" y="3598238"/>
-            <a:ext cx="8704345" cy="3071076"/>
+            <a:off x="232229" y="2945808"/>
+            <a:ext cx="8704345" cy="3723506"/>
           </a:xfrm>
           <a:prstGeom prst="rect">
             <a:avLst/>
@@ -13178,13 +10539,16 @@
       <p:cxnSp>
         <p:nvCxnSpPr>
           <p:cNvPr id="507" name="Gerade Verbindung mit Pfeil 506"/>
-          <p:cNvCxnSpPr/>
+          <p:cNvCxnSpPr>
+            <a:stCxn id="375" idx="3"/>
+            <a:endCxn id="290" idx="1"/>
+          </p:cNvCxnSpPr>
           <p:nvPr/>
         </p:nvCxnSpPr>
         <p:spPr>
-          <a:xfrm flipV="1">
-            <a:off x="7549953" y="3442522"/>
-            <a:ext cx="2540472" cy="2531003"/>
+          <a:xfrm>
+            <a:off x="8323130" y="4238757"/>
+            <a:ext cx="1689249" cy="353956"/>
           </a:xfrm>
           <a:prstGeom prst="straightConnector1">
             <a:avLst/>
@@ -13219,8 +10583,8 @@
         </p:nvSpPr>
         <p:spPr>
           <a:xfrm>
-            <a:off x="9083694" y="4392984"/>
-            <a:ext cx="537080" cy="307777"/>
+            <a:off x="9133623" y="4615126"/>
+            <a:ext cx="318871" cy="307777"/>
           </a:xfrm>
           <a:prstGeom prst="rect">
             <a:avLst/>
@@ -13241,6 +10605,1701 @@
           </a:p>
         </p:txBody>
       </p:sp>
+      <p:sp>
+        <p:nvSpPr>
+          <p:cNvPr id="290" name="Abgerundetes Rechteck 289"/>
+          <p:cNvSpPr/>
+          <p:nvPr/>
+        </p:nvSpPr>
+        <p:spPr>
+          <a:xfrm>
+            <a:off x="10012379" y="4321890"/>
+            <a:ext cx="1467649" cy="541645"/>
+          </a:xfrm>
+          <a:prstGeom prst="roundRect">
+            <a:avLst/>
+          </a:prstGeom>
+        </p:spPr>
+        <p:style>
+          <a:lnRef idx="2">
+            <a:schemeClr val="accent1">
+              <a:shade val="50000"/>
+            </a:schemeClr>
+          </a:lnRef>
+          <a:fillRef idx="1">
+            <a:schemeClr val="accent1"/>
+          </a:fillRef>
+          <a:effectRef idx="0">
+            <a:schemeClr val="accent1"/>
+          </a:effectRef>
+          <a:fontRef idx="minor">
+            <a:schemeClr val="lt1"/>
+          </a:fontRef>
+        </p:style>
+        <p:txBody>
+          <a:bodyPr rtlCol="0" anchor="ctr"/>
+          <a:lstStyle/>
+          <a:p>
+            <a:pPr algn="ctr"/>
+            <a:r>
+              <a:rPr lang="de-DE" dirty="0" smtClean="0"/>
+              <a:t>C</a:t>
+            </a:r>
+            <a:r>
+              <a:rPr lang="de-DE" baseline="-25000" dirty="0" smtClean="0"/>
+              <a:t>R</a:t>
+            </a:r>
+            <a:endParaRPr lang="de-DE" baseline="-25000" dirty="0" smtClean="0"/>
+          </a:p>
+          <a:p>
+            <a:pPr algn="ctr"/>
+            <a:r>
+              <a:rPr lang="de-DE" dirty="0" err="1" smtClean="0"/>
+              <a:t>cured</a:t>
+            </a:r>
+            <a:endParaRPr lang="de-DE" dirty="0" smtClean="0"/>
+          </a:p>
+        </p:txBody>
+      </p:sp>
+      <p:sp>
+        <p:nvSpPr>
+          <p:cNvPr id="291" name="Textfeld 290"/>
+          <p:cNvSpPr txBox="1"/>
+          <p:nvPr/>
+        </p:nvSpPr>
+        <p:spPr>
+          <a:xfrm>
+            <a:off x="9956468" y="3742231"/>
+            <a:ext cx="1121013" cy="369332"/>
+          </a:xfrm>
+          <a:prstGeom prst="rect">
+            <a:avLst/>
+          </a:prstGeom>
+          <a:noFill/>
+        </p:spPr>
+        <p:txBody>
+          <a:bodyPr wrap="none" rtlCol="0">
+            <a:spAutoFit/>
+          </a:bodyPr>
+          <a:lstStyle/>
+          <a:p>
+            <a:r>
+              <a:rPr lang="de-DE" dirty="0" err="1" smtClean="0"/>
+              <a:t>measured</a:t>
+            </a:r>
+            <a:endParaRPr lang="en-US" dirty="0"/>
+          </a:p>
+        </p:txBody>
+      </p:sp>
+      <p:sp>
+        <p:nvSpPr>
+          <p:cNvPr id="292" name="Rechteck 291"/>
+          <p:cNvSpPr/>
+          <p:nvPr/>
+        </p:nvSpPr>
+        <p:spPr>
+          <a:xfrm>
+            <a:off x="9986970" y="3704914"/>
+            <a:ext cx="1714384" cy="1322333"/>
+          </a:xfrm>
+          <a:prstGeom prst="rect">
+            <a:avLst/>
+          </a:prstGeom>
+          <a:noFill/>
+          <a:ln w="38100">
+            <a:solidFill>
+              <a:srgbClr val="FFC000"/>
+            </a:solidFill>
+          </a:ln>
+        </p:spPr>
+        <p:style>
+          <a:lnRef idx="2">
+            <a:schemeClr val="accent1">
+              <a:shade val="50000"/>
+            </a:schemeClr>
+          </a:lnRef>
+          <a:fillRef idx="1">
+            <a:schemeClr val="accent1"/>
+          </a:fillRef>
+          <a:effectRef idx="0">
+            <a:schemeClr val="accent1"/>
+          </a:effectRef>
+          <a:fontRef idx="minor">
+            <a:schemeClr val="lt1"/>
+          </a:fontRef>
+        </p:style>
+        <p:txBody>
+          <a:bodyPr rtlCol="0" anchor="ctr"/>
+          <a:lstStyle/>
+          <a:p>
+            <a:pPr algn="ctr"/>
+            <a:endParaRPr lang="en-US"/>
+          </a:p>
+        </p:txBody>
+      </p:sp>
+      <p:sp>
+        <p:nvSpPr>
+          <p:cNvPr id="294" name="Abgerundetes Rechteck 293"/>
+          <p:cNvSpPr/>
+          <p:nvPr/>
+        </p:nvSpPr>
+        <p:spPr>
+          <a:xfrm>
+            <a:off x="5911255" y="5458338"/>
+            <a:ext cx="1155790" cy="725714"/>
+          </a:xfrm>
+          <a:prstGeom prst="roundRect">
+            <a:avLst/>
+          </a:prstGeom>
+        </p:spPr>
+        <p:style>
+          <a:lnRef idx="2">
+            <a:schemeClr val="accent1">
+              <a:shade val="50000"/>
+            </a:schemeClr>
+          </a:lnRef>
+          <a:fillRef idx="1">
+            <a:schemeClr val="accent1"/>
+          </a:fillRef>
+          <a:effectRef idx="0">
+            <a:schemeClr val="accent1"/>
+          </a:effectRef>
+          <a:fontRef idx="minor">
+            <a:schemeClr val="lt1"/>
+          </a:fontRef>
+        </p:style>
+        <p:txBody>
+          <a:bodyPr rtlCol="0" anchor="ctr"/>
+          <a:lstStyle/>
+          <a:p>
+            <a:pPr algn="ctr"/>
+            <a:r>
+              <a:rPr lang="de-DE" dirty="0" smtClean="0"/>
+              <a:t>H</a:t>
+            </a:r>
+            <a:r>
+              <a:rPr lang="de-DE" baseline="-25000" dirty="0" smtClean="0"/>
+              <a:t>IC</a:t>
+            </a:r>
+            <a:endParaRPr lang="de-DE" baseline="-25000" dirty="0" smtClean="0"/>
+          </a:p>
+          <a:p>
+            <a:pPr algn="ctr"/>
+            <a:r>
+              <a:rPr lang="de-DE" dirty="0" smtClean="0"/>
+              <a:t>Intensive care</a:t>
+            </a:r>
+            <a:endParaRPr lang="en-US" dirty="0"/>
+          </a:p>
+        </p:txBody>
+      </p:sp>
+      <p:sp>
+        <p:nvSpPr>
+          <p:cNvPr id="297" name="Rechteck 296"/>
+          <p:cNvSpPr/>
+          <p:nvPr/>
+        </p:nvSpPr>
+        <p:spPr>
+          <a:xfrm>
+            <a:off x="5827282" y="5076030"/>
+            <a:ext cx="2985074" cy="1282327"/>
+          </a:xfrm>
+          <a:prstGeom prst="rect">
+            <a:avLst/>
+          </a:prstGeom>
+          <a:noFill/>
+          <a:ln w="38100">
+            <a:solidFill>
+              <a:srgbClr val="FFC000"/>
+            </a:solidFill>
+            <a:prstDash val="dash"/>
+          </a:ln>
+        </p:spPr>
+        <p:style>
+          <a:lnRef idx="2">
+            <a:schemeClr val="accent1">
+              <a:shade val="50000"/>
+            </a:schemeClr>
+          </a:lnRef>
+          <a:fillRef idx="1">
+            <a:schemeClr val="accent1"/>
+          </a:fillRef>
+          <a:effectRef idx="0">
+            <a:schemeClr val="accent1"/>
+          </a:effectRef>
+          <a:fontRef idx="minor">
+            <a:schemeClr val="lt1"/>
+          </a:fontRef>
+        </p:style>
+        <p:txBody>
+          <a:bodyPr rtlCol="0" anchor="ctr"/>
+          <a:lstStyle/>
+          <a:p>
+            <a:pPr algn="ctr"/>
+            <a:endParaRPr lang="en-US"/>
+          </a:p>
+        </p:txBody>
+      </p:sp>
+      <p:grpSp>
+        <p:nvGrpSpPr>
+          <p:cNvPr id="298" name="Gruppieren 297"/>
+          <p:cNvGrpSpPr/>
+          <p:nvPr/>
+        </p:nvGrpSpPr>
+        <p:grpSpPr>
+          <a:xfrm>
+            <a:off x="7257173" y="5233643"/>
+            <a:ext cx="1034845" cy="673789"/>
+            <a:chOff x="4850698" y="3663378"/>
+            <a:chExt cx="6800228" cy="2576640"/>
+          </a:xfrm>
+        </p:grpSpPr>
+        <p:sp>
+          <p:nvSpPr>
+            <p:cNvPr id="299" name="Rechteck 298"/>
+            <p:cNvSpPr/>
+            <p:nvPr/>
+          </p:nvSpPr>
+          <p:spPr>
+            <a:xfrm>
+              <a:off x="4926276" y="5259947"/>
+              <a:ext cx="355600" cy="703943"/>
+            </a:xfrm>
+            <a:prstGeom prst="rect">
+              <a:avLst/>
+            </a:prstGeom>
+            <a:solidFill>
+              <a:srgbClr val="FF0000"/>
+            </a:solidFill>
+            <a:ln>
+              <a:noFill/>
+            </a:ln>
+          </p:spPr>
+          <p:style>
+            <a:lnRef idx="2">
+              <a:schemeClr val="accent1">
+                <a:shade val="50000"/>
+              </a:schemeClr>
+            </a:lnRef>
+            <a:fillRef idx="1">
+              <a:schemeClr val="accent1"/>
+            </a:fillRef>
+            <a:effectRef idx="0">
+              <a:schemeClr val="accent1"/>
+            </a:effectRef>
+            <a:fontRef idx="minor">
+              <a:schemeClr val="lt1"/>
+            </a:fontRef>
+          </p:style>
+          <p:txBody>
+            <a:bodyPr rtlCol="0" anchor="ctr"/>
+            <a:lstStyle/>
+            <a:p>
+              <a:pPr algn="ctr"/>
+              <a:endParaRPr lang="en-US" sz="600"/>
+            </a:p>
+          </p:txBody>
+        </p:sp>
+        <p:sp>
+          <p:nvSpPr>
+            <p:cNvPr id="300" name="Rechteck 299"/>
+            <p:cNvSpPr/>
+            <p:nvPr/>
+          </p:nvSpPr>
+          <p:spPr>
+            <a:xfrm>
+              <a:off x="5397991" y="4868064"/>
+              <a:ext cx="355600" cy="1095826"/>
+            </a:xfrm>
+            <a:prstGeom prst="rect">
+              <a:avLst/>
+            </a:prstGeom>
+            <a:solidFill>
+              <a:srgbClr val="FF0000"/>
+            </a:solidFill>
+            <a:ln>
+              <a:noFill/>
+            </a:ln>
+          </p:spPr>
+          <p:style>
+            <a:lnRef idx="2">
+              <a:schemeClr val="accent1">
+                <a:shade val="50000"/>
+              </a:schemeClr>
+            </a:lnRef>
+            <a:fillRef idx="1">
+              <a:schemeClr val="accent1"/>
+            </a:fillRef>
+            <a:effectRef idx="0">
+              <a:schemeClr val="accent1"/>
+            </a:effectRef>
+            <a:fontRef idx="minor">
+              <a:schemeClr val="lt1"/>
+            </a:fontRef>
+          </p:style>
+          <p:txBody>
+            <a:bodyPr rtlCol="0" anchor="ctr"/>
+            <a:lstStyle/>
+            <a:p>
+              <a:pPr algn="ctr"/>
+              <a:endParaRPr lang="en-US" sz="600"/>
+            </a:p>
+          </p:txBody>
+        </p:sp>
+        <p:sp>
+          <p:nvSpPr>
+            <p:cNvPr id="301" name="Rechteck 300"/>
+            <p:cNvSpPr/>
+            <p:nvPr/>
+          </p:nvSpPr>
+          <p:spPr>
+            <a:xfrm>
+              <a:off x="5869706" y="4077034"/>
+              <a:ext cx="355600" cy="1886856"/>
+            </a:xfrm>
+            <a:prstGeom prst="rect">
+              <a:avLst/>
+            </a:prstGeom>
+            <a:solidFill>
+              <a:srgbClr val="FF0000"/>
+            </a:solidFill>
+            <a:ln>
+              <a:noFill/>
+            </a:ln>
+          </p:spPr>
+          <p:style>
+            <a:lnRef idx="2">
+              <a:schemeClr val="accent1">
+                <a:shade val="50000"/>
+              </a:schemeClr>
+            </a:lnRef>
+            <a:fillRef idx="1">
+              <a:schemeClr val="accent1"/>
+            </a:fillRef>
+            <a:effectRef idx="0">
+              <a:schemeClr val="accent1"/>
+            </a:effectRef>
+            <a:fontRef idx="minor">
+              <a:schemeClr val="lt1"/>
+            </a:fontRef>
+          </p:style>
+          <p:txBody>
+            <a:bodyPr rtlCol="0" anchor="ctr"/>
+            <a:lstStyle/>
+            <a:p>
+              <a:pPr algn="ctr"/>
+              <a:endParaRPr lang="en-US" sz="600"/>
+            </a:p>
+          </p:txBody>
+        </p:sp>
+        <p:sp>
+          <p:nvSpPr>
+            <p:cNvPr id="302" name="Rechteck 301"/>
+            <p:cNvSpPr/>
+            <p:nvPr/>
+          </p:nvSpPr>
+          <p:spPr>
+            <a:xfrm>
+              <a:off x="6341421" y="4693890"/>
+              <a:ext cx="355600" cy="1269999"/>
+            </a:xfrm>
+            <a:prstGeom prst="rect">
+              <a:avLst/>
+            </a:prstGeom>
+            <a:solidFill>
+              <a:srgbClr val="FF0000"/>
+            </a:solidFill>
+            <a:ln>
+              <a:noFill/>
+            </a:ln>
+          </p:spPr>
+          <p:style>
+            <a:lnRef idx="2">
+              <a:schemeClr val="accent1">
+                <a:shade val="50000"/>
+              </a:schemeClr>
+            </a:lnRef>
+            <a:fillRef idx="1">
+              <a:schemeClr val="accent1"/>
+            </a:fillRef>
+            <a:effectRef idx="0">
+              <a:schemeClr val="accent1"/>
+            </a:effectRef>
+            <a:fontRef idx="minor">
+              <a:schemeClr val="lt1"/>
+            </a:fontRef>
+          </p:style>
+          <p:txBody>
+            <a:bodyPr rtlCol="0" anchor="ctr"/>
+            <a:lstStyle/>
+            <a:p>
+              <a:pPr algn="ctr"/>
+              <a:endParaRPr lang="en-US" sz="600"/>
+            </a:p>
+          </p:txBody>
+        </p:sp>
+        <p:sp>
+          <p:nvSpPr>
+            <p:cNvPr id="303" name="Rechteck 302"/>
+            <p:cNvSpPr/>
+            <p:nvPr/>
+          </p:nvSpPr>
+          <p:spPr>
+            <a:xfrm>
+              <a:off x="6813136" y="5151091"/>
+              <a:ext cx="355600" cy="812798"/>
+            </a:xfrm>
+            <a:prstGeom prst="rect">
+              <a:avLst/>
+            </a:prstGeom>
+            <a:solidFill>
+              <a:srgbClr val="FF0000"/>
+            </a:solidFill>
+            <a:ln>
+              <a:noFill/>
+            </a:ln>
+          </p:spPr>
+          <p:style>
+            <a:lnRef idx="2">
+              <a:schemeClr val="accent1">
+                <a:shade val="50000"/>
+              </a:schemeClr>
+            </a:lnRef>
+            <a:fillRef idx="1">
+              <a:schemeClr val="accent1"/>
+            </a:fillRef>
+            <a:effectRef idx="0">
+              <a:schemeClr val="accent1"/>
+            </a:effectRef>
+            <a:fontRef idx="minor">
+              <a:schemeClr val="lt1"/>
+            </a:fontRef>
+          </p:style>
+          <p:txBody>
+            <a:bodyPr rtlCol="0" anchor="ctr"/>
+            <a:lstStyle/>
+            <a:p>
+              <a:pPr algn="ctr"/>
+              <a:endParaRPr lang="en-US" sz="600"/>
+            </a:p>
+          </p:txBody>
+        </p:sp>
+        <p:sp>
+          <p:nvSpPr>
+            <p:cNvPr id="304" name="Rechteck 303"/>
+            <p:cNvSpPr/>
+            <p:nvPr/>
+          </p:nvSpPr>
+          <p:spPr>
+            <a:xfrm>
+              <a:off x="7284851" y="5492177"/>
+              <a:ext cx="355600" cy="471712"/>
+            </a:xfrm>
+            <a:prstGeom prst="rect">
+              <a:avLst/>
+            </a:prstGeom>
+            <a:solidFill>
+              <a:srgbClr val="FF0000"/>
+            </a:solidFill>
+            <a:ln>
+              <a:noFill/>
+            </a:ln>
+          </p:spPr>
+          <p:style>
+            <a:lnRef idx="2">
+              <a:schemeClr val="accent1">
+                <a:shade val="50000"/>
+              </a:schemeClr>
+            </a:lnRef>
+            <a:fillRef idx="1">
+              <a:schemeClr val="accent1"/>
+            </a:fillRef>
+            <a:effectRef idx="0">
+              <a:schemeClr val="accent1"/>
+            </a:effectRef>
+            <a:fontRef idx="minor">
+              <a:schemeClr val="lt1"/>
+            </a:fontRef>
+          </p:style>
+          <p:txBody>
+            <a:bodyPr rtlCol="0" anchor="ctr"/>
+            <a:lstStyle/>
+            <a:p>
+              <a:pPr algn="ctr"/>
+              <a:endParaRPr lang="en-US" sz="600"/>
+            </a:p>
+          </p:txBody>
+        </p:sp>
+        <p:cxnSp>
+          <p:nvCxnSpPr>
+            <p:cNvPr id="305" name="Gerade Verbindung mit Pfeil 304"/>
+            <p:cNvCxnSpPr/>
+            <p:nvPr/>
+          </p:nvCxnSpPr>
+          <p:spPr>
+            <a:xfrm flipV="1">
+              <a:off x="4850698" y="3663378"/>
+              <a:ext cx="0" cy="2316519"/>
+            </a:xfrm>
+            <a:prstGeom prst="straightConnector1">
+              <a:avLst/>
+            </a:prstGeom>
+            <a:ln w="12700">
+              <a:solidFill>
+                <a:schemeClr val="tx1"/>
+              </a:solidFill>
+              <a:tailEnd type="triangle"/>
+            </a:ln>
+          </p:spPr>
+          <p:style>
+            <a:lnRef idx="1">
+              <a:schemeClr val="accent1"/>
+            </a:lnRef>
+            <a:fillRef idx="0">
+              <a:schemeClr val="accent1"/>
+            </a:fillRef>
+            <a:effectRef idx="0">
+              <a:schemeClr val="accent1"/>
+            </a:effectRef>
+            <a:fontRef idx="minor">
+              <a:schemeClr val="tx1"/>
+            </a:fontRef>
+          </p:style>
+        </p:cxnSp>
+        <p:sp>
+          <p:nvSpPr>
+            <p:cNvPr id="306" name="Rechteck 305"/>
+            <p:cNvSpPr/>
+            <p:nvPr/>
+          </p:nvSpPr>
+          <p:spPr>
+            <a:xfrm>
+              <a:off x="7756566" y="5791199"/>
+              <a:ext cx="355600" cy="172689"/>
+            </a:xfrm>
+            <a:prstGeom prst="rect">
+              <a:avLst/>
+            </a:prstGeom>
+            <a:solidFill>
+              <a:srgbClr val="FF0000"/>
+            </a:solidFill>
+            <a:ln>
+              <a:noFill/>
+            </a:ln>
+          </p:spPr>
+          <p:style>
+            <a:lnRef idx="2">
+              <a:schemeClr val="accent1">
+                <a:shade val="50000"/>
+              </a:schemeClr>
+            </a:lnRef>
+            <a:fillRef idx="1">
+              <a:schemeClr val="accent1"/>
+            </a:fillRef>
+            <a:effectRef idx="0">
+              <a:schemeClr val="accent1"/>
+            </a:effectRef>
+            <a:fontRef idx="minor">
+              <a:schemeClr val="lt1"/>
+            </a:fontRef>
+          </p:style>
+          <p:txBody>
+            <a:bodyPr rtlCol="0" anchor="ctr"/>
+            <a:lstStyle/>
+            <a:p>
+              <a:pPr algn="ctr"/>
+              <a:endParaRPr lang="en-US" sz="600"/>
+            </a:p>
+          </p:txBody>
+        </p:sp>
+        <p:sp>
+          <p:nvSpPr>
+            <p:cNvPr id="307" name="Rechteck 306"/>
+            <p:cNvSpPr/>
+            <p:nvPr/>
+          </p:nvSpPr>
+          <p:spPr>
+            <a:xfrm>
+              <a:off x="8228281" y="5791199"/>
+              <a:ext cx="355600" cy="172690"/>
+            </a:xfrm>
+            <a:prstGeom prst="rect">
+              <a:avLst/>
+            </a:prstGeom>
+            <a:solidFill>
+              <a:srgbClr val="FF0000"/>
+            </a:solidFill>
+            <a:ln>
+              <a:noFill/>
+            </a:ln>
+          </p:spPr>
+          <p:style>
+            <a:lnRef idx="2">
+              <a:schemeClr val="accent1">
+                <a:shade val="50000"/>
+              </a:schemeClr>
+            </a:lnRef>
+            <a:fillRef idx="1">
+              <a:schemeClr val="accent1"/>
+            </a:fillRef>
+            <a:effectRef idx="0">
+              <a:schemeClr val="accent1"/>
+            </a:effectRef>
+            <a:fontRef idx="minor">
+              <a:schemeClr val="lt1"/>
+            </a:fontRef>
+          </p:style>
+          <p:txBody>
+            <a:bodyPr rtlCol="0" anchor="ctr"/>
+            <a:lstStyle/>
+            <a:p>
+              <a:pPr algn="ctr"/>
+              <a:endParaRPr lang="en-US" sz="600"/>
+            </a:p>
+          </p:txBody>
+        </p:sp>
+        <p:sp>
+          <p:nvSpPr>
+            <p:cNvPr id="308" name="Rechteck 307"/>
+            <p:cNvSpPr/>
+            <p:nvPr/>
+          </p:nvSpPr>
+          <p:spPr>
+            <a:xfrm>
+              <a:off x="8699996" y="5791199"/>
+              <a:ext cx="355600" cy="172690"/>
+            </a:xfrm>
+            <a:prstGeom prst="rect">
+              <a:avLst/>
+            </a:prstGeom>
+            <a:solidFill>
+              <a:srgbClr val="FF0000"/>
+            </a:solidFill>
+            <a:ln>
+              <a:noFill/>
+            </a:ln>
+          </p:spPr>
+          <p:style>
+            <a:lnRef idx="2">
+              <a:schemeClr val="accent1">
+                <a:shade val="50000"/>
+              </a:schemeClr>
+            </a:lnRef>
+            <a:fillRef idx="1">
+              <a:schemeClr val="accent1"/>
+            </a:fillRef>
+            <a:effectRef idx="0">
+              <a:schemeClr val="accent1"/>
+            </a:effectRef>
+            <a:fontRef idx="minor">
+              <a:schemeClr val="lt1"/>
+            </a:fontRef>
+          </p:style>
+          <p:txBody>
+            <a:bodyPr rtlCol="0" anchor="ctr"/>
+            <a:lstStyle/>
+            <a:p>
+              <a:pPr algn="ctr"/>
+              <a:endParaRPr lang="en-US" sz="600"/>
+            </a:p>
+          </p:txBody>
+        </p:sp>
+        <p:sp>
+          <p:nvSpPr>
+            <p:cNvPr id="309" name="Rechteck 308"/>
+            <p:cNvSpPr/>
+            <p:nvPr/>
+          </p:nvSpPr>
+          <p:spPr>
+            <a:xfrm>
+              <a:off x="9171711" y="5791199"/>
+              <a:ext cx="355600" cy="172690"/>
+            </a:xfrm>
+            <a:prstGeom prst="rect">
+              <a:avLst/>
+            </a:prstGeom>
+            <a:solidFill>
+              <a:srgbClr val="FF0000"/>
+            </a:solidFill>
+            <a:ln>
+              <a:noFill/>
+            </a:ln>
+          </p:spPr>
+          <p:style>
+            <a:lnRef idx="2">
+              <a:schemeClr val="accent1">
+                <a:shade val="50000"/>
+              </a:schemeClr>
+            </a:lnRef>
+            <a:fillRef idx="1">
+              <a:schemeClr val="accent1"/>
+            </a:fillRef>
+            <a:effectRef idx="0">
+              <a:schemeClr val="accent1"/>
+            </a:effectRef>
+            <a:fontRef idx="minor">
+              <a:schemeClr val="lt1"/>
+            </a:fontRef>
+          </p:style>
+          <p:txBody>
+            <a:bodyPr rtlCol="0" anchor="ctr"/>
+            <a:lstStyle/>
+            <a:p>
+              <a:pPr algn="ctr"/>
+              <a:endParaRPr lang="en-US" sz="600"/>
+            </a:p>
+          </p:txBody>
+        </p:sp>
+        <p:sp>
+          <p:nvSpPr>
+            <p:cNvPr id="311" name="Rechteck 310"/>
+            <p:cNvSpPr/>
+            <p:nvPr/>
+          </p:nvSpPr>
+          <p:spPr>
+            <a:xfrm>
+              <a:off x="9643426" y="5900057"/>
+              <a:ext cx="355600" cy="63832"/>
+            </a:xfrm>
+            <a:prstGeom prst="rect">
+              <a:avLst/>
+            </a:prstGeom>
+            <a:solidFill>
+              <a:srgbClr val="FF0000"/>
+            </a:solidFill>
+            <a:ln>
+              <a:noFill/>
+            </a:ln>
+          </p:spPr>
+          <p:style>
+            <a:lnRef idx="2">
+              <a:schemeClr val="accent1">
+                <a:shade val="50000"/>
+              </a:schemeClr>
+            </a:lnRef>
+            <a:fillRef idx="1">
+              <a:schemeClr val="accent1"/>
+            </a:fillRef>
+            <a:effectRef idx="0">
+              <a:schemeClr val="accent1"/>
+            </a:effectRef>
+            <a:fontRef idx="minor">
+              <a:schemeClr val="lt1"/>
+            </a:fontRef>
+          </p:style>
+          <p:txBody>
+            <a:bodyPr rtlCol="0" anchor="ctr"/>
+            <a:lstStyle/>
+            <a:p>
+              <a:pPr algn="ctr"/>
+              <a:endParaRPr lang="en-US" sz="600"/>
+            </a:p>
+          </p:txBody>
+        </p:sp>
+        <p:sp>
+          <p:nvSpPr>
+            <p:cNvPr id="312" name="Textfeld 311"/>
+            <p:cNvSpPr txBox="1"/>
+            <p:nvPr/>
+          </p:nvSpPr>
+          <p:spPr>
+            <a:xfrm>
+              <a:off x="11354050" y="6055352"/>
+              <a:ext cx="296876" cy="184666"/>
+            </a:xfrm>
+            <a:prstGeom prst="rect">
+              <a:avLst/>
+            </a:prstGeom>
+            <a:noFill/>
+          </p:spPr>
+          <p:txBody>
+            <a:bodyPr wrap="none" rtlCol="0">
+              <a:spAutoFit/>
+            </a:bodyPr>
+            <a:lstStyle/>
+            <a:p>
+              <a:r>
+                <a:rPr lang="de-DE" sz="600" dirty="0" err="1" smtClean="0"/>
+                <a:t>day</a:t>
+              </a:r>
+              <a:endParaRPr lang="en-US" sz="600" dirty="0"/>
+            </a:p>
+          </p:txBody>
+        </p:sp>
+        <p:cxnSp>
+          <p:nvCxnSpPr>
+            <p:cNvPr id="313" name="Gerade Verbindung mit Pfeil 312"/>
+            <p:cNvCxnSpPr/>
+            <p:nvPr/>
+          </p:nvCxnSpPr>
+          <p:spPr>
+            <a:xfrm flipV="1">
+              <a:off x="4850698" y="6025615"/>
+              <a:ext cx="6673645" cy="5081"/>
+            </a:xfrm>
+            <a:prstGeom prst="straightConnector1">
+              <a:avLst/>
+            </a:prstGeom>
+            <a:ln w="12700">
+              <a:solidFill>
+                <a:schemeClr val="tx1"/>
+              </a:solidFill>
+              <a:tailEnd type="triangle"/>
+            </a:ln>
+          </p:spPr>
+          <p:style>
+            <a:lnRef idx="1">
+              <a:schemeClr val="accent1"/>
+            </a:lnRef>
+            <a:fillRef idx="0">
+              <a:schemeClr val="accent1"/>
+            </a:fillRef>
+            <a:effectRef idx="0">
+              <a:schemeClr val="accent1"/>
+            </a:effectRef>
+            <a:fontRef idx="minor">
+              <a:schemeClr val="tx1"/>
+            </a:fontRef>
+          </p:style>
+        </p:cxnSp>
+        <p:sp>
+          <p:nvSpPr>
+            <p:cNvPr id="314" name="Textfeld 313"/>
+            <p:cNvSpPr txBox="1"/>
+            <p:nvPr/>
+          </p:nvSpPr>
+          <p:spPr>
+            <a:xfrm>
+              <a:off x="4926276" y="6049578"/>
+              <a:ext cx="223138" cy="184666"/>
+            </a:xfrm>
+            <a:prstGeom prst="rect">
+              <a:avLst/>
+            </a:prstGeom>
+            <a:noFill/>
+          </p:spPr>
+          <p:txBody>
+            <a:bodyPr wrap="none" rtlCol="0">
+              <a:spAutoFit/>
+            </a:bodyPr>
+            <a:lstStyle/>
+            <a:p>
+              <a:r>
+                <a:rPr lang="de-DE" sz="600" dirty="0" smtClean="0"/>
+                <a:t>1</a:t>
+              </a:r>
+              <a:endParaRPr lang="en-US" sz="600" dirty="0"/>
+            </a:p>
+          </p:txBody>
+        </p:sp>
+        <p:sp>
+          <p:nvSpPr>
+            <p:cNvPr id="315" name="Textfeld 314"/>
+            <p:cNvSpPr txBox="1"/>
+            <p:nvPr/>
+          </p:nvSpPr>
+          <p:spPr>
+            <a:xfrm>
+              <a:off x="5424948" y="6049578"/>
+              <a:ext cx="223138" cy="184666"/>
+            </a:xfrm>
+            <a:prstGeom prst="rect">
+              <a:avLst/>
+            </a:prstGeom>
+            <a:noFill/>
+          </p:spPr>
+          <p:txBody>
+            <a:bodyPr wrap="none" rtlCol="0">
+              <a:spAutoFit/>
+            </a:bodyPr>
+            <a:lstStyle/>
+            <a:p>
+              <a:r>
+                <a:rPr lang="de-DE" sz="600" dirty="0" smtClean="0"/>
+                <a:t>2</a:t>
+              </a:r>
+              <a:endParaRPr lang="en-US" sz="600" dirty="0"/>
+            </a:p>
+          </p:txBody>
+        </p:sp>
+        <p:sp>
+          <p:nvSpPr>
+            <p:cNvPr id="316" name="Textfeld 315"/>
+            <p:cNvSpPr txBox="1"/>
+            <p:nvPr/>
+          </p:nvSpPr>
+          <p:spPr>
+            <a:xfrm>
+              <a:off x="5923620" y="6049578"/>
+              <a:ext cx="223138" cy="184666"/>
+            </a:xfrm>
+            <a:prstGeom prst="rect">
+              <a:avLst/>
+            </a:prstGeom>
+            <a:noFill/>
+          </p:spPr>
+          <p:txBody>
+            <a:bodyPr wrap="none" rtlCol="0">
+              <a:spAutoFit/>
+            </a:bodyPr>
+            <a:lstStyle/>
+            <a:p>
+              <a:r>
+                <a:rPr lang="de-DE" sz="600" dirty="0" smtClean="0"/>
+                <a:t>3</a:t>
+              </a:r>
+              <a:endParaRPr lang="en-US" sz="600" dirty="0"/>
+            </a:p>
+          </p:txBody>
+        </p:sp>
+        <p:sp>
+          <p:nvSpPr>
+            <p:cNvPr id="317" name="Textfeld 316"/>
+            <p:cNvSpPr txBox="1"/>
+            <p:nvPr/>
+          </p:nvSpPr>
+          <p:spPr>
+            <a:xfrm>
+              <a:off x="6378750" y="6049578"/>
+              <a:ext cx="223138" cy="184666"/>
+            </a:xfrm>
+            <a:prstGeom prst="rect">
+              <a:avLst/>
+            </a:prstGeom>
+            <a:noFill/>
+          </p:spPr>
+          <p:txBody>
+            <a:bodyPr wrap="none" rtlCol="0">
+              <a:spAutoFit/>
+            </a:bodyPr>
+            <a:lstStyle/>
+            <a:p>
+              <a:r>
+                <a:rPr lang="de-DE" sz="600" dirty="0" smtClean="0"/>
+                <a:t>4</a:t>
+              </a:r>
+              <a:endParaRPr lang="en-US" sz="600" dirty="0"/>
+            </a:p>
+          </p:txBody>
+        </p:sp>
+        <p:sp>
+          <p:nvSpPr>
+            <p:cNvPr id="318" name="Textfeld 317"/>
+            <p:cNvSpPr txBox="1"/>
+            <p:nvPr/>
+          </p:nvSpPr>
+          <p:spPr>
+            <a:xfrm>
+              <a:off x="6841137" y="6049578"/>
+              <a:ext cx="223138" cy="184666"/>
+            </a:xfrm>
+            <a:prstGeom prst="rect">
+              <a:avLst/>
+            </a:prstGeom>
+            <a:noFill/>
+          </p:spPr>
+          <p:txBody>
+            <a:bodyPr wrap="none" rtlCol="0">
+              <a:spAutoFit/>
+            </a:bodyPr>
+            <a:lstStyle/>
+            <a:p>
+              <a:r>
+                <a:rPr lang="de-DE" sz="600" dirty="0" smtClean="0"/>
+                <a:t>5</a:t>
+              </a:r>
+              <a:endParaRPr lang="en-US" sz="600" dirty="0"/>
+            </a:p>
+          </p:txBody>
+        </p:sp>
+        <p:sp>
+          <p:nvSpPr>
+            <p:cNvPr id="319" name="Textfeld 318"/>
+            <p:cNvSpPr txBox="1"/>
+            <p:nvPr/>
+          </p:nvSpPr>
+          <p:spPr>
+            <a:xfrm>
+              <a:off x="7310781" y="6049578"/>
+              <a:ext cx="223138" cy="184666"/>
+            </a:xfrm>
+            <a:prstGeom prst="rect">
+              <a:avLst/>
+            </a:prstGeom>
+            <a:noFill/>
+          </p:spPr>
+          <p:txBody>
+            <a:bodyPr wrap="none" rtlCol="0">
+              <a:spAutoFit/>
+            </a:bodyPr>
+            <a:lstStyle/>
+            <a:p>
+              <a:r>
+                <a:rPr lang="de-DE" sz="600" dirty="0" smtClean="0"/>
+                <a:t>6</a:t>
+              </a:r>
+              <a:endParaRPr lang="en-US" sz="600" dirty="0"/>
+            </a:p>
+          </p:txBody>
+        </p:sp>
+        <p:sp>
+          <p:nvSpPr>
+            <p:cNvPr id="320" name="Textfeld 319"/>
+            <p:cNvSpPr txBox="1"/>
+            <p:nvPr/>
+          </p:nvSpPr>
+          <p:spPr>
+            <a:xfrm>
+              <a:off x="7787682" y="6049578"/>
+              <a:ext cx="223138" cy="184666"/>
+            </a:xfrm>
+            <a:prstGeom prst="rect">
+              <a:avLst/>
+            </a:prstGeom>
+            <a:noFill/>
+          </p:spPr>
+          <p:txBody>
+            <a:bodyPr wrap="none" rtlCol="0">
+              <a:spAutoFit/>
+            </a:bodyPr>
+            <a:lstStyle/>
+            <a:p>
+              <a:r>
+                <a:rPr lang="de-DE" sz="600" dirty="0" smtClean="0"/>
+                <a:t>7</a:t>
+              </a:r>
+              <a:endParaRPr lang="en-US" sz="600" dirty="0"/>
+            </a:p>
+          </p:txBody>
+        </p:sp>
+        <p:sp>
+          <p:nvSpPr>
+            <p:cNvPr id="321" name="Textfeld 320"/>
+            <p:cNvSpPr txBox="1"/>
+            <p:nvPr/>
+          </p:nvSpPr>
+          <p:spPr>
+            <a:xfrm>
+              <a:off x="8271840" y="6049578"/>
+              <a:ext cx="223138" cy="184666"/>
+            </a:xfrm>
+            <a:prstGeom prst="rect">
+              <a:avLst/>
+            </a:prstGeom>
+            <a:noFill/>
+          </p:spPr>
+          <p:txBody>
+            <a:bodyPr wrap="none" rtlCol="0">
+              <a:spAutoFit/>
+            </a:bodyPr>
+            <a:lstStyle/>
+            <a:p>
+              <a:r>
+                <a:rPr lang="de-DE" sz="600" dirty="0" smtClean="0"/>
+                <a:t>8</a:t>
+              </a:r>
+              <a:endParaRPr lang="en-US" sz="600" dirty="0"/>
+            </a:p>
+          </p:txBody>
+        </p:sp>
+        <p:sp>
+          <p:nvSpPr>
+            <p:cNvPr id="322" name="Textfeld 321"/>
+            <p:cNvSpPr txBox="1"/>
+            <p:nvPr/>
+          </p:nvSpPr>
+          <p:spPr>
+            <a:xfrm>
+              <a:off x="8726970" y="6049578"/>
+              <a:ext cx="223138" cy="184666"/>
+            </a:xfrm>
+            <a:prstGeom prst="rect">
+              <a:avLst/>
+            </a:prstGeom>
+            <a:noFill/>
+          </p:spPr>
+          <p:txBody>
+            <a:bodyPr wrap="none" rtlCol="0">
+              <a:spAutoFit/>
+            </a:bodyPr>
+            <a:lstStyle/>
+            <a:p>
+              <a:r>
+                <a:rPr lang="de-DE" sz="600" dirty="0" smtClean="0"/>
+                <a:t>9</a:t>
+              </a:r>
+              <a:endParaRPr lang="en-US" sz="600" dirty="0"/>
+            </a:p>
+          </p:txBody>
+        </p:sp>
+        <p:sp>
+          <p:nvSpPr>
+            <p:cNvPr id="324" name="Textfeld 323"/>
+            <p:cNvSpPr txBox="1"/>
+            <p:nvPr/>
+          </p:nvSpPr>
+          <p:spPr>
+            <a:xfrm>
+              <a:off x="9159204" y="6049578"/>
+              <a:ext cx="261610" cy="184666"/>
+            </a:xfrm>
+            <a:prstGeom prst="rect">
+              <a:avLst/>
+            </a:prstGeom>
+            <a:noFill/>
+          </p:spPr>
+          <p:txBody>
+            <a:bodyPr wrap="none" rtlCol="0">
+              <a:spAutoFit/>
+            </a:bodyPr>
+            <a:lstStyle/>
+            <a:p>
+              <a:r>
+                <a:rPr lang="de-DE" sz="600" dirty="0" smtClean="0"/>
+                <a:t>10</a:t>
+              </a:r>
+              <a:endParaRPr lang="en-US" sz="600" dirty="0"/>
+            </a:p>
+          </p:txBody>
+        </p:sp>
+        <p:sp>
+          <p:nvSpPr>
+            <p:cNvPr id="325" name="Textfeld 324"/>
+            <p:cNvSpPr txBox="1"/>
+            <p:nvPr/>
+          </p:nvSpPr>
+          <p:spPr>
+            <a:xfrm>
+              <a:off x="9614398" y="6049578"/>
+              <a:ext cx="261610" cy="184666"/>
+            </a:xfrm>
+            <a:prstGeom prst="rect">
+              <a:avLst/>
+            </a:prstGeom>
+            <a:noFill/>
+          </p:spPr>
+          <p:txBody>
+            <a:bodyPr wrap="none" rtlCol="0">
+              <a:spAutoFit/>
+            </a:bodyPr>
+            <a:lstStyle/>
+            <a:p>
+              <a:r>
+                <a:rPr lang="de-DE" sz="600" dirty="0" smtClean="0"/>
+                <a:t>11</a:t>
+              </a:r>
+              <a:endParaRPr lang="en-US" sz="600" dirty="0"/>
+            </a:p>
+          </p:txBody>
+        </p:sp>
+        <p:sp>
+          <p:nvSpPr>
+            <p:cNvPr id="327" name="Rechteck 326"/>
+            <p:cNvSpPr/>
+            <p:nvPr/>
+          </p:nvSpPr>
+          <p:spPr>
+            <a:xfrm>
+              <a:off x="10064343" y="5900060"/>
+              <a:ext cx="355600" cy="63832"/>
+            </a:xfrm>
+            <a:prstGeom prst="rect">
+              <a:avLst/>
+            </a:prstGeom>
+            <a:solidFill>
+              <a:srgbClr val="FF0000"/>
+            </a:solidFill>
+            <a:ln>
+              <a:noFill/>
+            </a:ln>
+          </p:spPr>
+          <p:style>
+            <a:lnRef idx="2">
+              <a:schemeClr val="accent1">
+                <a:shade val="50000"/>
+              </a:schemeClr>
+            </a:lnRef>
+            <a:fillRef idx="1">
+              <a:schemeClr val="accent1"/>
+            </a:fillRef>
+            <a:effectRef idx="0">
+              <a:schemeClr val="accent1"/>
+            </a:effectRef>
+            <a:fontRef idx="minor">
+              <a:schemeClr val="lt1"/>
+            </a:fontRef>
+          </p:style>
+          <p:txBody>
+            <a:bodyPr rtlCol="0" anchor="ctr"/>
+            <a:lstStyle/>
+            <a:p>
+              <a:pPr algn="ctr"/>
+              <a:endParaRPr lang="en-US" sz="600"/>
+            </a:p>
+          </p:txBody>
+        </p:sp>
+        <p:sp>
+          <p:nvSpPr>
+            <p:cNvPr id="330" name="Textfeld 329"/>
+            <p:cNvSpPr txBox="1"/>
+            <p:nvPr/>
+          </p:nvSpPr>
+          <p:spPr>
+            <a:xfrm>
+              <a:off x="10035315" y="6049581"/>
+              <a:ext cx="261610" cy="184666"/>
+            </a:xfrm>
+            <a:prstGeom prst="rect">
+              <a:avLst/>
+            </a:prstGeom>
+            <a:noFill/>
+          </p:spPr>
+          <p:txBody>
+            <a:bodyPr wrap="none" rtlCol="0">
+              <a:spAutoFit/>
+            </a:bodyPr>
+            <a:lstStyle/>
+            <a:p>
+              <a:r>
+                <a:rPr lang="de-DE" sz="600" dirty="0" smtClean="0"/>
+                <a:t>12</a:t>
+              </a:r>
+              <a:endParaRPr lang="en-US" sz="600" dirty="0"/>
+            </a:p>
+          </p:txBody>
+        </p:sp>
+        <p:sp>
+          <p:nvSpPr>
+            <p:cNvPr id="331" name="Rechteck 330"/>
+            <p:cNvSpPr/>
+            <p:nvPr/>
+          </p:nvSpPr>
+          <p:spPr>
+            <a:xfrm>
+              <a:off x="10485260" y="5900063"/>
+              <a:ext cx="355600" cy="63832"/>
+            </a:xfrm>
+            <a:prstGeom prst="rect">
+              <a:avLst/>
+            </a:prstGeom>
+            <a:solidFill>
+              <a:srgbClr val="FF0000"/>
+            </a:solidFill>
+            <a:ln>
+              <a:noFill/>
+            </a:ln>
+          </p:spPr>
+          <p:style>
+            <a:lnRef idx="2">
+              <a:schemeClr val="accent1">
+                <a:shade val="50000"/>
+              </a:schemeClr>
+            </a:lnRef>
+            <a:fillRef idx="1">
+              <a:schemeClr val="accent1"/>
+            </a:fillRef>
+            <a:effectRef idx="0">
+              <a:schemeClr val="accent1"/>
+            </a:effectRef>
+            <a:fontRef idx="minor">
+              <a:schemeClr val="lt1"/>
+            </a:fontRef>
+          </p:style>
+          <p:txBody>
+            <a:bodyPr rtlCol="0" anchor="ctr"/>
+            <a:lstStyle/>
+            <a:p>
+              <a:pPr algn="ctr"/>
+              <a:endParaRPr lang="en-US" sz="600"/>
+            </a:p>
+          </p:txBody>
+        </p:sp>
+        <p:sp>
+          <p:nvSpPr>
+            <p:cNvPr id="332" name="Textfeld 331"/>
+            <p:cNvSpPr txBox="1"/>
+            <p:nvPr/>
+          </p:nvSpPr>
+          <p:spPr>
+            <a:xfrm>
+              <a:off x="10456232" y="6049584"/>
+              <a:ext cx="261610" cy="184666"/>
+            </a:xfrm>
+            <a:prstGeom prst="rect">
+              <a:avLst/>
+            </a:prstGeom>
+            <a:noFill/>
+          </p:spPr>
+          <p:txBody>
+            <a:bodyPr wrap="none" rtlCol="0">
+              <a:spAutoFit/>
+            </a:bodyPr>
+            <a:lstStyle/>
+            <a:p>
+              <a:r>
+                <a:rPr lang="de-DE" sz="600" dirty="0" smtClean="0"/>
+                <a:t>13</a:t>
+              </a:r>
+              <a:endParaRPr lang="en-US" sz="600" dirty="0"/>
+            </a:p>
+          </p:txBody>
+        </p:sp>
+        <p:sp>
+          <p:nvSpPr>
+            <p:cNvPr id="333" name="Rechteck 332"/>
+            <p:cNvSpPr/>
+            <p:nvPr/>
+          </p:nvSpPr>
+          <p:spPr>
+            <a:xfrm>
+              <a:off x="10906177" y="5900066"/>
+              <a:ext cx="355600" cy="63832"/>
+            </a:xfrm>
+            <a:prstGeom prst="rect">
+              <a:avLst/>
+            </a:prstGeom>
+            <a:solidFill>
+              <a:srgbClr val="FF0000"/>
+            </a:solidFill>
+            <a:ln>
+              <a:noFill/>
+            </a:ln>
+          </p:spPr>
+          <p:style>
+            <a:lnRef idx="2">
+              <a:schemeClr val="accent1">
+                <a:shade val="50000"/>
+              </a:schemeClr>
+            </a:lnRef>
+            <a:fillRef idx="1">
+              <a:schemeClr val="accent1"/>
+            </a:fillRef>
+            <a:effectRef idx="0">
+              <a:schemeClr val="accent1"/>
+            </a:effectRef>
+            <a:fontRef idx="minor">
+              <a:schemeClr val="lt1"/>
+            </a:fontRef>
+          </p:style>
+          <p:txBody>
+            <a:bodyPr rtlCol="0" anchor="ctr"/>
+            <a:lstStyle/>
+            <a:p>
+              <a:pPr algn="ctr"/>
+              <a:endParaRPr lang="en-US" sz="600"/>
+            </a:p>
+          </p:txBody>
+        </p:sp>
+        <p:sp>
+          <p:nvSpPr>
+            <p:cNvPr id="335" name="Textfeld 334"/>
+            <p:cNvSpPr txBox="1"/>
+            <p:nvPr/>
+          </p:nvSpPr>
+          <p:spPr>
+            <a:xfrm>
+              <a:off x="10877149" y="6049587"/>
+              <a:ext cx="261610" cy="184666"/>
+            </a:xfrm>
+            <a:prstGeom prst="rect">
+              <a:avLst/>
+            </a:prstGeom>
+            <a:noFill/>
+          </p:spPr>
+          <p:txBody>
+            <a:bodyPr wrap="none" rtlCol="0">
+              <a:spAutoFit/>
+            </a:bodyPr>
+            <a:lstStyle/>
+            <a:p>
+              <a:r>
+                <a:rPr lang="de-DE" sz="600" dirty="0" smtClean="0"/>
+                <a:t>14</a:t>
+              </a:r>
+              <a:endParaRPr lang="en-US" sz="600" dirty="0"/>
+            </a:p>
+          </p:txBody>
+        </p:sp>
+      </p:grpSp>
+      <p:sp>
+        <p:nvSpPr>
+          <p:cNvPr id="337" name="Rechteck 336"/>
+          <p:cNvSpPr/>
+          <p:nvPr/>
+        </p:nvSpPr>
+        <p:spPr>
+          <a:xfrm>
+            <a:off x="7196316" y="5341282"/>
+            <a:ext cx="1277622" cy="512735"/>
+          </a:xfrm>
+          <a:prstGeom prst="rect">
+            <a:avLst/>
+          </a:prstGeom>
+          <a:noFill/>
+          <a:ln w="28575">
+            <a:solidFill>
+              <a:srgbClr val="0070C0"/>
+            </a:solidFill>
+          </a:ln>
+        </p:spPr>
+        <p:style>
+          <a:lnRef idx="2">
+            <a:schemeClr val="accent1">
+              <a:shade val="50000"/>
+            </a:schemeClr>
+          </a:lnRef>
+          <a:fillRef idx="1">
+            <a:schemeClr val="accent1"/>
+          </a:fillRef>
+          <a:effectRef idx="0">
+            <a:schemeClr val="accent1"/>
+          </a:effectRef>
+          <a:fontRef idx="minor">
+            <a:schemeClr val="lt1"/>
+          </a:fontRef>
+        </p:style>
+        <p:txBody>
+          <a:bodyPr rtlCol="0" anchor="ctr"/>
+          <a:lstStyle/>
+          <a:p>
+            <a:pPr algn="ctr"/>
+            <a:endParaRPr lang="en-US"/>
+          </a:p>
+        </p:txBody>
+      </p:sp>
+      <p:cxnSp>
+        <p:nvCxnSpPr>
+          <p:cNvPr id="372" name="Gerade Verbindung mit Pfeil 371"/>
+          <p:cNvCxnSpPr>
+            <a:stCxn id="376" idx="2"/>
+            <a:endCxn id="337" idx="0"/>
+          </p:cNvCxnSpPr>
+          <p:nvPr/>
+        </p:nvCxnSpPr>
+        <p:spPr>
+          <a:xfrm flipH="1">
+            <a:off x="7835127" y="4504824"/>
+            <a:ext cx="69197" cy="836458"/>
+          </a:xfrm>
+          <a:prstGeom prst="straightConnector1">
+            <a:avLst/>
+          </a:prstGeom>
+          <a:ln w="38100">
+            <a:solidFill>
+              <a:srgbClr val="00B050"/>
+            </a:solidFill>
+            <a:tailEnd type="triangle"/>
+          </a:ln>
+        </p:spPr>
+        <p:style>
+          <a:lnRef idx="1">
+            <a:schemeClr val="accent1"/>
+          </a:lnRef>
+          <a:fillRef idx="0">
+            <a:schemeClr val="accent1"/>
+          </a:fillRef>
+          <a:effectRef idx="0">
+            <a:schemeClr val="accent1"/>
+          </a:effectRef>
+          <a:fontRef idx="minor">
+            <a:schemeClr val="tx1"/>
+          </a:fontRef>
+        </p:style>
+      </p:cxnSp>
+      <p:sp>
+        <p:nvSpPr>
+          <p:cNvPr id="374" name="Rechteck 373"/>
+          <p:cNvSpPr/>
+          <p:nvPr/>
+        </p:nvSpPr>
+        <p:spPr>
+          <a:xfrm>
+            <a:off x="7328114" y="4116278"/>
+            <a:ext cx="98201" cy="372209"/>
+          </a:xfrm>
+          <a:prstGeom prst="rect">
+            <a:avLst/>
+          </a:prstGeom>
+          <a:noFill/>
+          <a:ln w="28575">
+            <a:solidFill>
+              <a:srgbClr val="00B050"/>
+            </a:solidFill>
+          </a:ln>
+        </p:spPr>
+        <p:style>
+          <a:lnRef idx="2">
+            <a:schemeClr val="accent1">
+              <a:shade val="50000"/>
+            </a:schemeClr>
+          </a:lnRef>
+          <a:fillRef idx="1">
+            <a:schemeClr val="accent1"/>
+          </a:fillRef>
+          <a:effectRef idx="0">
+            <a:schemeClr val="accent1"/>
+          </a:effectRef>
+          <a:fontRef idx="minor">
+            <a:schemeClr val="lt1"/>
+          </a:fontRef>
+        </p:style>
+        <p:txBody>
+          <a:bodyPr rtlCol="0" anchor="ctr"/>
+          <a:lstStyle/>
+          <a:p>
+            <a:pPr algn="ctr"/>
+            <a:endParaRPr lang="en-US"/>
+          </a:p>
+        </p:txBody>
+      </p:sp>
+      <p:sp>
+        <p:nvSpPr>
+          <p:cNvPr id="375" name="Rechteck 374"/>
+          <p:cNvSpPr/>
+          <p:nvPr/>
+        </p:nvSpPr>
+        <p:spPr>
+          <a:xfrm>
+            <a:off x="8224929" y="4052652"/>
+            <a:ext cx="98201" cy="372209"/>
+          </a:xfrm>
+          <a:prstGeom prst="rect">
+            <a:avLst/>
+          </a:prstGeom>
+          <a:noFill/>
+          <a:ln w="28575">
+            <a:solidFill>
+              <a:srgbClr val="00B050"/>
+            </a:solidFill>
+          </a:ln>
+        </p:spPr>
+        <p:style>
+          <a:lnRef idx="2">
+            <a:schemeClr val="accent1">
+              <a:shade val="50000"/>
+            </a:schemeClr>
+          </a:lnRef>
+          <a:fillRef idx="1">
+            <a:schemeClr val="accent1"/>
+          </a:fillRef>
+          <a:effectRef idx="0">
+            <a:schemeClr val="accent1"/>
+          </a:effectRef>
+          <a:fontRef idx="minor">
+            <a:schemeClr val="lt1"/>
+          </a:fontRef>
+        </p:style>
+        <p:txBody>
+          <a:bodyPr rtlCol="0" anchor="ctr"/>
+          <a:lstStyle/>
+          <a:p>
+            <a:pPr algn="ctr"/>
+            <a:endParaRPr lang="en-US"/>
+          </a:p>
+        </p:txBody>
+      </p:sp>
+      <p:sp>
+        <p:nvSpPr>
+          <p:cNvPr id="378" name="Textfeld 377"/>
+          <p:cNvSpPr txBox="1"/>
+          <p:nvPr/>
+        </p:nvSpPr>
+        <p:spPr>
+          <a:xfrm>
+            <a:off x="7538142" y="4778682"/>
+            <a:ext cx="318871" cy="307777"/>
+          </a:xfrm>
+          <a:prstGeom prst="rect">
+            <a:avLst/>
+          </a:prstGeom>
+          <a:noFill/>
+        </p:spPr>
+        <p:txBody>
+          <a:bodyPr wrap="square" rtlCol="0">
+            <a:spAutoFit/>
+          </a:bodyPr>
+          <a:lstStyle/>
+          <a:p>
+            <a:r>
+              <a:rPr lang="de-DE" sz="1400" dirty="0" smtClean="0"/>
+              <a:t>1</a:t>
+            </a:r>
+            <a:endParaRPr lang="en-US" sz="1400" dirty="0"/>
+          </a:p>
+        </p:txBody>
+      </p:sp>
+      <p:sp>
+        <p:nvSpPr>
+          <p:cNvPr id="380" name="Textfeld 379"/>
+          <p:cNvSpPr txBox="1"/>
+          <p:nvPr/>
+        </p:nvSpPr>
+        <p:spPr>
+          <a:xfrm>
+            <a:off x="7857013" y="4722645"/>
+            <a:ext cx="515737" cy="307777"/>
+          </a:xfrm>
+          <a:prstGeom prst="rect">
+            <a:avLst/>
+          </a:prstGeom>
+          <a:noFill/>
+        </p:spPr>
+        <p:txBody>
+          <a:bodyPr wrap="square" rtlCol="0">
+            <a:spAutoFit/>
+          </a:bodyPr>
+          <a:lstStyle/>
+          <a:p>
+            <a:r>
+              <a:rPr lang="de-DE" sz="1400" dirty="0" err="1" smtClean="0"/>
+              <a:t>h</a:t>
+            </a:r>
+            <a:r>
+              <a:rPr lang="de-DE" sz="1400" baseline="-25000" dirty="0" err="1" smtClean="0"/>
+              <a:t>IC</a:t>
+            </a:r>
+            <a:endParaRPr lang="en-US" sz="1400" baseline="-25000" dirty="0"/>
+          </a:p>
+        </p:txBody>
+      </p:sp>
+      <p:cxnSp>
+        <p:nvCxnSpPr>
+          <p:cNvPr id="384" name="Gerade Verbindung mit Pfeil 383"/>
+          <p:cNvCxnSpPr>
+            <a:endCxn id="376" idx="1"/>
+          </p:cNvCxnSpPr>
+          <p:nvPr/>
+        </p:nvCxnSpPr>
+        <p:spPr>
+          <a:xfrm flipV="1">
+            <a:off x="5325678" y="4248457"/>
+            <a:ext cx="1939835" cy="839332"/>
+          </a:xfrm>
+          <a:prstGeom prst="straightConnector1">
+            <a:avLst/>
+          </a:prstGeom>
+          <a:ln w="38100">
+            <a:solidFill>
+              <a:srgbClr val="00B050"/>
+            </a:solidFill>
+            <a:tailEnd type="triangle"/>
+          </a:ln>
+        </p:spPr>
+        <p:style>
+          <a:lnRef idx="1">
+            <a:schemeClr val="accent1"/>
+          </a:lnRef>
+          <a:fillRef idx="0">
+            <a:schemeClr val="accent1"/>
+          </a:fillRef>
+          <a:effectRef idx="0">
+            <a:schemeClr val="accent1"/>
+          </a:effectRef>
+          <a:fontRef idx="minor">
+            <a:schemeClr val="tx1"/>
+          </a:fontRef>
+        </p:style>
+      </p:cxnSp>
     </p:spTree>
     <p:extLst>
       <p:ext uri="{BB962C8B-B14F-4D97-AF65-F5344CB8AC3E}">

</xml_diff>

<commit_message>
updated PPT file of the model.
</commit_message>
<xml_diff>
--- a/research/CORONA_Model.pptx
+++ b/research/CORONA_Model.pptx
@@ -7111,53 +7111,6 @@
       </p:cxnSp>
       <p:sp>
         <p:nvSpPr>
-          <p:cNvPr id="338" name="Rechteck 337"/>
-          <p:cNvSpPr/>
-          <p:nvPr/>
-        </p:nvSpPr>
-        <p:spPr>
-          <a:xfrm>
-            <a:off x="9894945" y="1973966"/>
-            <a:ext cx="1846128" cy="1036774"/>
-          </a:xfrm>
-          <a:prstGeom prst="rect">
-            <a:avLst/>
-          </a:prstGeom>
-          <a:noFill/>
-          <a:ln w="38100">
-            <a:solidFill>
-              <a:srgbClr val="FFC000"/>
-            </a:solidFill>
-            <a:prstDash val="dash"/>
-          </a:ln>
-        </p:spPr>
-        <p:style>
-          <a:lnRef idx="2">
-            <a:schemeClr val="accent1">
-              <a:shade val="50000"/>
-            </a:schemeClr>
-          </a:lnRef>
-          <a:fillRef idx="1">
-            <a:schemeClr val="accent1"/>
-          </a:fillRef>
-          <a:effectRef idx="0">
-            <a:schemeClr val="accent1"/>
-          </a:effectRef>
-          <a:fontRef idx="minor">
-            <a:schemeClr val="lt1"/>
-          </a:fontRef>
-        </p:style>
-        <p:txBody>
-          <a:bodyPr rtlCol="0" anchor="ctr"/>
-          <a:lstStyle/>
-          <a:p>
-            <a:pPr algn="ctr"/>
-            <a:endParaRPr lang="en-US"/>
-          </a:p>
-        </p:txBody>
-      </p:sp>
-      <p:sp>
-        <p:nvSpPr>
           <p:cNvPr id="339" name="Textfeld 338"/>
           <p:cNvSpPr txBox="1"/>
           <p:nvPr/>
@@ -8807,8 +8760,8 @@
         </p:nvSpPr>
         <p:spPr>
           <a:xfrm>
-            <a:off x="5348455" y="720283"/>
-            <a:ext cx="4089196" cy="2585323"/>
+            <a:off x="5189542" y="281128"/>
+            <a:ext cx="4254563" cy="2862322"/>
           </a:xfrm>
           <a:prstGeom prst="rect">
             <a:avLst/>
@@ -8908,7 +8861,11 @@
             </a:r>
             <a:r>
               <a:rPr lang="de-DE" dirty="0" smtClean="0"/>
-              <a:t> still in </a:t>
+              <a:t> </a:t>
+            </a:r>
+            <a:r>
+              <a:rPr lang="de-DE" dirty="0" smtClean="0"/>
+              <a:t>in </a:t>
             </a:r>
             <a:r>
               <a:rPr lang="de-DE" dirty="0" err="1" smtClean="0"/>
@@ -8928,15 +8885,7 @@
             </a:r>
             <a:r>
               <a:rPr lang="de-DE" dirty="0" err="1" smtClean="0"/>
-              <a:t>have</a:t>
-            </a:r>
-            <a:r>
-              <a:rPr lang="de-DE" dirty="0" smtClean="0"/>
-              <a:t> a </a:t>
-            </a:r>
-            <a:r>
-              <a:rPr lang="de-DE" dirty="0" err="1" smtClean="0"/>
-              <a:t>chance</a:t>
+              <a:t>cured</a:t>
             </a:r>
             <a:r>
               <a:rPr lang="de-DE" dirty="0" smtClean="0"/>
@@ -8944,18 +8893,7 @@
             </a:r>
             <a:r>
               <a:rPr lang="de-DE" dirty="0" err="1" smtClean="0"/>
-              <a:t>to</a:t>
-            </a:r>
-            <a:r>
-              <a:rPr lang="de-DE" dirty="0"/>
-              <a:t/>
-            </a:r>
-            <a:br>
-              <a:rPr lang="de-DE" dirty="0"/>
-            </a:br>
-            <a:r>
-              <a:rPr lang="de-DE" dirty="0" err="1" smtClean="0"/>
-              <a:t>to</a:t>
+              <a:t>if</a:t>
             </a:r>
             <a:r>
               <a:rPr lang="de-DE" dirty="0" smtClean="0"/>
@@ -8963,7 +8901,7 @@
             </a:r>
             <a:r>
               <a:rPr lang="de-DE" dirty="0" err="1" smtClean="0"/>
-              <a:t>be</a:t>
+              <a:t>you</a:t>
             </a:r>
             <a:r>
               <a:rPr lang="de-DE" dirty="0" smtClean="0"/>
@@ -8971,9 +8909,31 @@
             </a:r>
             <a:r>
               <a:rPr lang="de-DE" dirty="0" err="1" smtClean="0"/>
-              <a:t>cured</a:t>
-            </a:r>
-            <a:endParaRPr lang="de-DE" dirty="0" smtClean="0"/>
+              <a:t>survive</a:t>
+            </a:r>
+            <a:r>
+              <a:rPr lang="de-DE" dirty="0" smtClean="0"/>
+              <a:t> </a:t>
+            </a:r>
+            <a:r>
+              <a:rPr lang="de-DE" dirty="0" err="1" smtClean="0"/>
+              <a:t>till</a:t>
+            </a:r>
+            <a:r>
+              <a:rPr lang="de-DE" dirty="0" smtClean="0"/>
+              <a:t/>
+            </a:r>
+            <a:br>
+              <a:rPr lang="de-DE" dirty="0" smtClean="0"/>
+            </a:br>
+            <a:r>
+              <a:rPr lang="de-DE" dirty="0" err="1" smtClean="0"/>
+              <a:t>the</a:t>
+            </a:r>
+            <a:r>
+              <a:rPr lang="de-DE" dirty="0" smtClean="0"/>
+              <a:t> last time bin</a:t>
+            </a:r>
           </a:p>
           <a:p>
             <a:pPr marL="285750" indent="-285750">
@@ -8981,16 +8941,44 @@
               <a:buChar char="•"/>
             </a:pPr>
             <a:r>
-              <a:rPr lang="de-DE" dirty="0" err="1" smtClean="0"/>
-              <a:t>Everyone</a:t>
-            </a:r>
-            <a:r>
               <a:rPr lang="de-DE" dirty="0" smtClean="0"/>
-              <a:t> still in </a:t>
+              <a:t>In </a:t>
             </a:r>
             <a:r>
               <a:rPr lang="de-DE" dirty="0" err="1" smtClean="0"/>
               <a:t>hospital</a:t>
+            </a:r>
+            <a:r>
+              <a:rPr lang="de-DE" dirty="0" smtClean="0"/>
+              <a:t> </a:t>
+            </a:r>
+            <a:r>
+              <a:rPr lang="de-DE" dirty="0" err="1" smtClean="0"/>
+              <a:t>there</a:t>
+            </a:r>
+            <a:r>
+              <a:rPr lang="de-DE" dirty="0" smtClean="0"/>
+              <a:t> </a:t>
+            </a:r>
+            <a:r>
+              <a:rPr lang="de-DE" dirty="0" err="1" smtClean="0"/>
+              <a:t>is</a:t>
+            </a:r>
+            <a:r>
+              <a:rPr lang="de-DE" dirty="0" smtClean="0"/>
+              <a:t> a </a:t>
+            </a:r>
+            <a:r>
+              <a:rPr lang="de-DE" dirty="0" err="1" smtClean="0"/>
+              <a:t>chance</a:t>
+            </a:r>
+            <a:r>
+              <a:rPr lang="de-DE" dirty="0" smtClean="0"/>
+              <a:t> </a:t>
+            </a:r>
+            <a:r>
+              <a:rPr lang="de-DE" dirty="0" err="1" smtClean="0"/>
+              <a:t>to</a:t>
             </a:r>
             <a:r>
               <a:rPr lang="de-DE" dirty="0" smtClean="0"/>
@@ -9000,24 +8988,50 @@
               <a:rPr lang="de-DE" dirty="0" smtClean="0"/>
             </a:br>
             <a:r>
+              <a:rPr lang="de-DE" dirty="0" err="1" smtClean="0"/>
+              <a:t>need</a:t>
+            </a:r>
+            <a:r>
               <a:rPr lang="de-DE" dirty="0" smtClean="0"/>
-              <a:t>(stuck at </a:t>
-            </a:r>
+              <a:t> intensive care</a:t>
+            </a:r>
+            <a:endParaRPr lang="de-DE" dirty="0" smtClean="0"/>
+          </a:p>
+          <a:p>
+            <a:pPr marL="285750" indent="-285750">
+              <a:buFont typeface="Arial" panose="020B0604020202020204" pitchFamily="34" charset="0"/>
+              <a:buChar char="•"/>
+            </a:pPr>
             <a:r>
               <a:rPr lang="de-DE" dirty="0" err="1" smtClean="0"/>
-              <a:t>the</a:t>
+              <a:t>Everyone</a:t>
             </a:r>
             <a:r>
               <a:rPr lang="de-DE" dirty="0" smtClean="0"/>
-              <a:t> last bin) </a:t>
-            </a:r>
+              <a:t> still in </a:t>
+            </a:r>
+            <a:r>
+              <a:rPr lang="de-DE" dirty="0" smtClean="0"/>
+              <a:t>intensive care</a:t>
+            </a:r>
+            <a:r>
+              <a:rPr lang="de-DE" dirty="0" smtClean="0"/>
+              <a:t/>
+            </a:r>
+            <a:br>
+              <a:rPr lang="de-DE" dirty="0" smtClean="0"/>
+            </a:br>
             <a:r>
               <a:rPr lang="de-DE" dirty="0" err="1" smtClean="0"/>
               <a:t>has</a:t>
             </a:r>
             <a:r>
               <a:rPr lang="de-DE" dirty="0" smtClean="0"/>
-              <a:t> a </a:t>
+              <a:t> </a:t>
+            </a:r>
+            <a:r>
+              <a:rPr lang="de-DE" dirty="0" smtClean="0"/>
+              <a:t>a </a:t>
             </a:r>
             <a:r>
               <a:rPr lang="de-DE" dirty="0" err="1" smtClean="0"/>
@@ -9025,23 +9039,25 @@
             </a:r>
             <a:r>
               <a:rPr lang="de-DE" dirty="0"/>
-              <a:t/>
-            </a:r>
-            <a:br>
-              <a:rPr lang="de-DE" dirty="0"/>
-            </a:br>
+              <a:t> </a:t>
+            </a:r>
             <a:r>
               <a:rPr lang="de-DE" dirty="0" err="1" smtClean="0"/>
               <a:t>to</a:t>
             </a:r>
             <a:r>
-              <a:rPr lang="de-DE" dirty="0"/>
-              <a:t> </a:t>
-            </a:r>
-            <a:r>
               <a:rPr lang="de-DE" dirty="0" smtClean="0"/>
-              <a:t>die</a:t>
-            </a:r>
+              <a:t> die (per </a:t>
+            </a:r>
+            <a:r>
+              <a:rPr lang="de-DE" dirty="0" err="1" smtClean="0"/>
+              <a:t>day</a:t>
+            </a:r>
+            <a:r>
+              <a:rPr lang="de-DE" dirty="0" smtClean="0"/>
+              <a:t>)</a:t>
+            </a:r>
+            <a:endParaRPr lang="de-DE" dirty="0" smtClean="0"/>
           </a:p>
           <a:p>
             <a:pPr marL="285750" indent="-285750">
@@ -10710,6 +10726,7 @@
             <a:solidFill>
               <a:srgbClr val="FFC000"/>
             </a:solidFill>
+            <a:prstDash val="lgDash"/>
           </a:ln>
         </p:spPr>
         <p:style>
@@ -12300,6 +12317,51 @@
           </a:fontRef>
         </p:style>
       </p:cxnSp>
+      <p:sp>
+        <p:nvSpPr>
+          <p:cNvPr id="385" name="Textfeld 384"/>
+          <p:cNvSpPr txBox="1"/>
+          <p:nvPr/>
+        </p:nvSpPr>
+        <p:spPr>
+          <a:xfrm>
+            <a:off x="10132343" y="1622704"/>
+            <a:ext cx="1552220" cy="646331"/>
+          </a:xfrm>
+          <a:prstGeom prst="rect">
+            <a:avLst/>
+          </a:prstGeom>
+          <a:noFill/>
+        </p:spPr>
+        <p:txBody>
+          <a:bodyPr wrap="none" rtlCol="0">
+            <a:spAutoFit/>
+          </a:bodyPr>
+          <a:lstStyle/>
+          <a:p>
+            <a:r>
+              <a:rPr lang="de-DE" dirty="0" smtClean="0"/>
+              <a:t>not </a:t>
+            </a:r>
+            <a:r>
+              <a:rPr lang="de-DE" dirty="0" err="1" smtClean="0"/>
+              <a:t>measured</a:t>
+            </a:r>
+            <a:r>
+              <a:rPr lang="de-DE" dirty="0" smtClean="0"/>
+              <a:t>,</a:t>
+            </a:r>
+            <a:br>
+              <a:rPr lang="de-DE" dirty="0" smtClean="0"/>
+            </a:br>
+            <a:r>
+              <a:rPr lang="de-DE" dirty="0" smtClean="0"/>
+              <a:t>but immune</a:t>
+            </a:r>
+            <a:endParaRPr lang="en-US" dirty="0"/>
+          </a:p>
+        </p:txBody>
+      </p:sp>
     </p:spTree>
     <p:extLst>
       <p:ext uri="{BB962C8B-B14F-4D97-AF65-F5344CB8AC3E}">

</xml_diff>

<commit_message>
Improvements on the model (now including Iq, the state of quarantined infected but not detected persons). Fit functionality via tesorflow is now also included and a first test for German-wide data is performed with only the infection rate ii and the initial infections left as variables.
</commit_message>
<xml_diff>
--- a/research/CORONA_Model.pptx
+++ b/research/CORONA_Model.pptx
@@ -5467,7 +5467,7 @@
         </p:nvSpPr>
         <p:spPr>
           <a:xfrm>
-            <a:off x="339250" y="3725225"/>
+            <a:off x="379344" y="3727552"/>
             <a:ext cx="1467649" cy="951120"/>
           </a:xfrm>
           <a:prstGeom prst="roundRect">
@@ -6791,7 +6791,7 @@
         </p:nvCxnSpPr>
         <p:spPr>
           <a:xfrm flipH="1">
-            <a:off x="652696" y="2353764"/>
+            <a:off x="682083" y="2360184"/>
             <a:ext cx="407941" cy="2749282"/>
           </a:xfrm>
           <a:prstGeom prst="straightConnector1">
@@ -6873,7 +6873,7 @@
         </p:nvSpPr>
         <p:spPr>
           <a:xfrm rot="16200000">
-            <a:off x="-613685" y="4265852"/>
+            <a:off x="-584298" y="4272272"/>
             <a:ext cx="1427250" cy="369332"/>
           </a:xfrm>
           <a:prstGeom prst="rect">
@@ -7048,7 +7048,7 @@
         </p:nvSpPr>
         <p:spPr>
           <a:xfrm>
-            <a:off x="4238038" y="3171743"/>
+            <a:off x="4261302" y="3334004"/>
             <a:ext cx="293066" cy="307777"/>
           </a:xfrm>
           <a:prstGeom prst="rect">
@@ -9245,7 +9245,7 @@
         </p:nvGrpSpPr>
         <p:grpSpPr>
           <a:xfrm>
-            <a:off x="641573" y="4722230"/>
+            <a:off x="670960" y="4728650"/>
             <a:ext cx="1034845" cy="673789"/>
             <a:chOff x="4850698" y="3663378"/>
             <a:chExt cx="6800228" cy="2576640"/>
@@ -10439,7 +10439,7 @@
         </p:nvSpPr>
         <p:spPr>
           <a:xfrm>
-            <a:off x="1534958" y="5076030"/>
+            <a:off x="1564345" y="5082450"/>
             <a:ext cx="98201" cy="372209"/>
           </a:xfrm>
           <a:prstGeom prst="rect">
@@ -10514,7 +10514,7 @@
         </p:nvSpPr>
         <p:spPr>
           <a:xfrm>
-            <a:off x="652696" y="4876159"/>
+            <a:off x="682083" y="4882579"/>
             <a:ext cx="1068927" cy="453773"/>
           </a:xfrm>
           <a:prstGeom prst="rect">
@@ -12359,6 +12359,1597 @@
               <a:t>but immune</a:t>
             </a:r>
             <a:endParaRPr lang="en-US" dirty="0"/>
+          </a:p>
+        </p:txBody>
+      </p:sp>
+      <p:sp>
+        <p:nvSpPr>
+          <p:cNvPr id="388" name="Abgerundetes Rechteck 387"/>
+          <p:cNvSpPr/>
+          <p:nvPr/>
+        </p:nvSpPr>
+        <p:spPr>
+          <a:xfrm>
+            <a:off x="1858213" y="4876239"/>
+            <a:ext cx="1561242" cy="1014299"/>
+          </a:xfrm>
+          <a:prstGeom prst="roundRect">
+            <a:avLst/>
+          </a:prstGeom>
+        </p:spPr>
+        <p:style>
+          <a:lnRef idx="2">
+            <a:schemeClr val="accent1">
+              <a:shade val="50000"/>
+            </a:schemeClr>
+          </a:lnRef>
+          <a:fillRef idx="1">
+            <a:schemeClr val="accent1"/>
+          </a:fillRef>
+          <a:effectRef idx="0">
+            <a:schemeClr val="accent1"/>
+          </a:effectRef>
+          <a:fontRef idx="minor">
+            <a:schemeClr val="lt1"/>
+          </a:fontRef>
+        </p:style>
+        <p:txBody>
+          <a:bodyPr rtlCol="0" anchor="ctr"/>
+          <a:lstStyle/>
+          <a:p>
+            <a:pPr algn="ctr"/>
+            <a:r>
+              <a:rPr lang="de-DE" dirty="0" err="1" smtClean="0"/>
+              <a:t>I</a:t>
+            </a:r>
+            <a:r>
+              <a:rPr lang="de-DE" baseline="-25000" dirty="0" err="1" smtClean="0"/>
+              <a:t>q</a:t>
+            </a:r>
+            <a:endParaRPr lang="de-DE" baseline="-25000" dirty="0" smtClean="0"/>
+          </a:p>
+          <a:p>
+            <a:pPr algn="ctr"/>
+            <a:r>
+              <a:rPr lang="de-DE" dirty="0" err="1" smtClean="0"/>
+              <a:t>Infected</a:t>
+            </a:r>
+            <a:r>
+              <a:rPr lang="de-DE" dirty="0" smtClean="0"/>
+              <a:t/>
+            </a:r>
+            <a:br>
+              <a:rPr lang="de-DE" dirty="0" smtClean="0"/>
+            </a:br>
+            <a:r>
+              <a:rPr lang="de-DE" dirty="0" err="1" smtClean="0"/>
+              <a:t>quarantined</a:t>
+            </a:r>
+            <a:endParaRPr lang="en-US" dirty="0"/>
+          </a:p>
+        </p:txBody>
+      </p:sp>
+      <p:grpSp>
+        <p:nvGrpSpPr>
+          <p:cNvPr id="389" name="Gruppieren 388"/>
+          <p:cNvGrpSpPr/>
+          <p:nvPr/>
+        </p:nvGrpSpPr>
+        <p:grpSpPr>
+          <a:xfrm>
+            <a:off x="2188523" y="5883875"/>
+            <a:ext cx="1034845" cy="673789"/>
+            <a:chOff x="4850698" y="3663378"/>
+            <a:chExt cx="6800228" cy="2576640"/>
+          </a:xfrm>
+          <a:solidFill>
+            <a:schemeClr val="accent6"/>
+          </a:solidFill>
+        </p:grpSpPr>
+        <p:sp>
+          <p:nvSpPr>
+            <p:cNvPr id="390" name="Rechteck 389"/>
+            <p:cNvSpPr/>
+            <p:nvPr/>
+          </p:nvSpPr>
+          <p:spPr>
+            <a:xfrm>
+              <a:off x="4926276" y="5259947"/>
+              <a:ext cx="355600" cy="703943"/>
+            </a:xfrm>
+            <a:prstGeom prst="rect">
+              <a:avLst/>
+            </a:prstGeom>
+            <a:grpFill/>
+            <a:ln>
+              <a:noFill/>
+            </a:ln>
+          </p:spPr>
+          <p:style>
+            <a:lnRef idx="2">
+              <a:schemeClr val="accent1">
+                <a:shade val="50000"/>
+              </a:schemeClr>
+            </a:lnRef>
+            <a:fillRef idx="1">
+              <a:schemeClr val="accent1"/>
+            </a:fillRef>
+            <a:effectRef idx="0">
+              <a:schemeClr val="accent1"/>
+            </a:effectRef>
+            <a:fontRef idx="minor">
+              <a:schemeClr val="lt1"/>
+            </a:fontRef>
+          </p:style>
+          <p:txBody>
+            <a:bodyPr rtlCol="0" anchor="ctr"/>
+            <a:lstStyle/>
+            <a:p>
+              <a:pPr algn="ctr"/>
+              <a:endParaRPr lang="en-US" sz="600"/>
+            </a:p>
+          </p:txBody>
+        </p:sp>
+        <p:sp>
+          <p:nvSpPr>
+            <p:cNvPr id="391" name="Rechteck 390"/>
+            <p:cNvSpPr/>
+            <p:nvPr/>
+          </p:nvSpPr>
+          <p:spPr>
+            <a:xfrm>
+              <a:off x="5397991" y="4868064"/>
+              <a:ext cx="355600" cy="1095826"/>
+            </a:xfrm>
+            <a:prstGeom prst="rect">
+              <a:avLst/>
+            </a:prstGeom>
+            <a:grpFill/>
+            <a:ln>
+              <a:noFill/>
+            </a:ln>
+          </p:spPr>
+          <p:style>
+            <a:lnRef idx="2">
+              <a:schemeClr val="accent1">
+                <a:shade val="50000"/>
+              </a:schemeClr>
+            </a:lnRef>
+            <a:fillRef idx="1">
+              <a:schemeClr val="accent1"/>
+            </a:fillRef>
+            <a:effectRef idx="0">
+              <a:schemeClr val="accent1"/>
+            </a:effectRef>
+            <a:fontRef idx="minor">
+              <a:schemeClr val="lt1"/>
+            </a:fontRef>
+          </p:style>
+          <p:txBody>
+            <a:bodyPr rtlCol="0" anchor="ctr"/>
+            <a:lstStyle/>
+            <a:p>
+              <a:pPr algn="ctr"/>
+              <a:endParaRPr lang="en-US" sz="600"/>
+            </a:p>
+          </p:txBody>
+        </p:sp>
+        <p:sp>
+          <p:nvSpPr>
+            <p:cNvPr id="392" name="Rechteck 391"/>
+            <p:cNvSpPr/>
+            <p:nvPr/>
+          </p:nvSpPr>
+          <p:spPr>
+            <a:xfrm>
+              <a:off x="5869706" y="4077034"/>
+              <a:ext cx="355600" cy="1886856"/>
+            </a:xfrm>
+            <a:prstGeom prst="rect">
+              <a:avLst/>
+            </a:prstGeom>
+            <a:grpFill/>
+            <a:ln>
+              <a:noFill/>
+            </a:ln>
+          </p:spPr>
+          <p:style>
+            <a:lnRef idx="2">
+              <a:schemeClr val="accent1">
+                <a:shade val="50000"/>
+              </a:schemeClr>
+            </a:lnRef>
+            <a:fillRef idx="1">
+              <a:schemeClr val="accent1"/>
+            </a:fillRef>
+            <a:effectRef idx="0">
+              <a:schemeClr val="accent1"/>
+            </a:effectRef>
+            <a:fontRef idx="minor">
+              <a:schemeClr val="lt1"/>
+            </a:fontRef>
+          </p:style>
+          <p:txBody>
+            <a:bodyPr rtlCol="0" anchor="ctr"/>
+            <a:lstStyle/>
+            <a:p>
+              <a:pPr algn="ctr"/>
+              <a:endParaRPr lang="en-US" sz="600"/>
+            </a:p>
+          </p:txBody>
+        </p:sp>
+        <p:sp>
+          <p:nvSpPr>
+            <p:cNvPr id="393" name="Rechteck 392"/>
+            <p:cNvSpPr/>
+            <p:nvPr/>
+          </p:nvSpPr>
+          <p:spPr>
+            <a:xfrm>
+              <a:off x="6341421" y="4693890"/>
+              <a:ext cx="355600" cy="1269999"/>
+            </a:xfrm>
+            <a:prstGeom prst="rect">
+              <a:avLst/>
+            </a:prstGeom>
+            <a:grpFill/>
+            <a:ln>
+              <a:noFill/>
+            </a:ln>
+          </p:spPr>
+          <p:style>
+            <a:lnRef idx="2">
+              <a:schemeClr val="accent1">
+                <a:shade val="50000"/>
+              </a:schemeClr>
+            </a:lnRef>
+            <a:fillRef idx="1">
+              <a:schemeClr val="accent1"/>
+            </a:fillRef>
+            <a:effectRef idx="0">
+              <a:schemeClr val="accent1"/>
+            </a:effectRef>
+            <a:fontRef idx="minor">
+              <a:schemeClr val="lt1"/>
+            </a:fontRef>
+          </p:style>
+          <p:txBody>
+            <a:bodyPr rtlCol="0" anchor="ctr"/>
+            <a:lstStyle/>
+            <a:p>
+              <a:pPr algn="ctr"/>
+              <a:endParaRPr lang="en-US" sz="600"/>
+            </a:p>
+          </p:txBody>
+        </p:sp>
+        <p:sp>
+          <p:nvSpPr>
+            <p:cNvPr id="394" name="Rechteck 393"/>
+            <p:cNvSpPr/>
+            <p:nvPr/>
+          </p:nvSpPr>
+          <p:spPr>
+            <a:xfrm>
+              <a:off x="6813136" y="5151091"/>
+              <a:ext cx="355600" cy="812798"/>
+            </a:xfrm>
+            <a:prstGeom prst="rect">
+              <a:avLst/>
+            </a:prstGeom>
+            <a:grpFill/>
+            <a:ln>
+              <a:noFill/>
+            </a:ln>
+          </p:spPr>
+          <p:style>
+            <a:lnRef idx="2">
+              <a:schemeClr val="accent1">
+                <a:shade val="50000"/>
+              </a:schemeClr>
+            </a:lnRef>
+            <a:fillRef idx="1">
+              <a:schemeClr val="accent1"/>
+            </a:fillRef>
+            <a:effectRef idx="0">
+              <a:schemeClr val="accent1"/>
+            </a:effectRef>
+            <a:fontRef idx="minor">
+              <a:schemeClr val="lt1"/>
+            </a:fontRef>
+          </p:style>
+          <p:txBody>
+            <a:bodyPr rtlCol="0" anchor="ctr"/>
+            <a:lstStyle/>
+            <a:p>
+              <a:pPr algn="ctr"/>
+              <a:endParaRPr lang="en-US" sz="600"/>
+            </a:p>
+          </p:txBody>
+        </p:sp>
+        <p:sp>
+          <p:nvSpPr>
+            <p:cNvPr id="395" name="Rechteck 394"/>
+            <p:cNvSpPr/>
+            <p:nvPr/>
+          </p:nvSpPr>
+          <p:spPr>
+            <a:xfrm>
+              <a:off x="7284851" y="5492177"/>
+              <a:ext cx="355600" cy="471712"/>
+            </a:xfrm>
+            <a:prstGeom prst="rect">
+              <a:avLst/>
+            </a:prstGeom>
+            <a:grpFill/>
+            <a:ln>
+              <a:noFill/>
+            </a:ln>
+          </p:spPr>
+          <p:style>
+            <a:lnRef idx="2">
+              <a:schemeClr val="accent1">
+                <a:shade val="50000"/>
+              </a:schemeClr>
+            </a:lnRef>
+            <a:fillRef idx="1">
+              <a:schemeClr val="accent1"/>
+            </a:fillRef>
+            <a:effectRef idx="0">
+              <a:schemeClr val="accent1"/>
+            </a:effectRef>
+            <a:fontRef idx="minor">
+              <a:schemeClr val="lt1"/>
+            </a:fontRef>
+          </p:style>
+          <p:txBody>
+            <a:bodyPr rtlCol="0" anchor="ctr"/>
+            <a:lstStyle/>
+            <a:p>
+              <a:pPr algn="ctr"/>
+              <a:endParaRPr lang="en-US" sz="600"/>
+            </a:p>
+          </p:txBody>
+        </p:sp>
+        <p:cxnSp>
+          <p:nvCxnSpPr>
+            <p:cNvPr id="396" name="Gerade Verbindung mit Pfeil 395"/>
+            <p:cNvCxnSpPr/>
+            <p:nvPr/>
+          </p:nvCxnSpPr>
+          <p:spPr>
+            <a:xfrm flipV="1">
+              <a:off x="4850698" y="3663378"/>
+              <a:ext cx="0" cy="2316519"/>
+            </a:xfrm>
+            <a:prstGeom prst="straightConnector1">
+              <a:avLst/>
+            </a:prstGeom>
+            <a:grpFill/>
+            <a:ln w="12700">
+              <a:solidFill>
+                <a:schemeClr val="tx1"/>
+              </a:solidFill>
+              <a:tailEnd type="triangle"/>
+            </a:ln>
+          </p:spPr>
+          <p:style>
+            <a:lnRef idx="1">
+              <a:schemeClr val="accent1"/>
+            </a:lnRef>
+            <a:fillRef idx="0">
+              <a:schemeClr val="accent1"/>
+            </a:fillRef>
+            <a:effectRef idx="0">
+              <a:schemeClr val="accent1"/>
+            </a:effectRef>
+            <a:fontRef idx="minor">
+              <a:schemeClr val="tx1"/>
+            </a:fontRef>
+          </p:style>
+        </p:cxnSp>
+        <p:sp>
+          <p:nvSpPr>
+            <p:cNvPr id="397" name="Rechteck 396"/>
+            <p:cNvSpPr/>
+            <p:nvPr/>
+          </p:nvSpPr>
+          <p:spPr>
+            <a:xfrm>
+              <a:off x="7756566" y="5791199"/>
+              <a:ext cx="355600" cy="172689"/>
+            </a:xfrm>
+            <a:prstGeom prst="rect">
+              <a:avLst/>
+            </a:prstGeom>
+            <a:grpFill/>
+            <a:ln>
+              <a:noFill/>
+            </a:ln>
+          </p:spPr>
+          <p:style>
+            <a:lnRef idx="2">
+              <a:schemeClr val="accent1">
+                <a:shade val="50000"/>
+              </a:schemeClr>
+            </a:lnRef>
+            <a:fillRef idx="1">
+              <a:schemeClr val="accent1"/>
+            </a:fillRef>
+            <a:effectRef idx="0">
+              <a:schemeClr val="accent1"/>
+            </a:effectRef>
+            <a:fontRef idx="minor">
+              <a:schemeClr val="lt1"/>
+            </a:fontRef>
+          </p:style>
+          <p:txBody>
+            <a:bodyPr rtlCol="0" anchor="ctr"/>
+            <a:lstStyle/>
+            <a:p>
+              <a:pPr algn="ctr"/>
+              <a:endParaRPr lang="en-US" sz="600"/>
+            </a:p>
+          </p:txBody>
+        </p:sp>
+        <p:sp>
+          <p:nvSpPr>
+            <p:cNvPr id="398" name="Rechteck 397"/>
+            <p:cNvSpPr/>
+            <p:nvPr/>
+          </p:nvSpPr>
+          <p:spPr>
+            <a:xfrm>
+              <a:off x="8228281" y="5791199"/>
+              <a:ext cx="355600" cy="172690"/>
+            </a:xfrm>
+            <a:prstGeom prst="rect">
+              <a:avLst/>
+            </a:prstGeom>
+            <a:grpFill/>
+            <a:ln>
+              <a:noFill/>
+            </a:ln>
+          </p:spPr>
+          <p:style>
+            <a:lnRef idx="2">
+              <a:schemeClr val="accent1">
+                <a:shade val="50000"/>
+              </a:schemeClr>
+            </a:lnRef>
+            <a:fillRef idx="1">
+              <a:schemeClr val="accent1"/>
+            </a:fillRef>
+            <a:effectRef idx="0">
+              <a:schemeClr val="accent1"/>
+            </a:effectRef>
+            <a:fontRef idx="minor">
+              <a:schemeClr val="lt1"/>
+            </a:fontRef>
+          </p:style>
+          <p:txBody>
+            <a:bodyPr rtlCol="0" anchor="ctr"/>
+            <a:lstStyle/>
+            <a:p>
+              <a:pPr algn="ctr"/>
+              <a:endParaRPr lang="en-US" sz="600"/>
+            </a:p>
+          </p:txBody>
+        </p:sp>
+        <p:sp>
+          <p:nvSpPr>
+            <p:cNvPr id="399" name="Rechteck 398"/>
+            <p:cNvSpPr/>
+            <p:nvPr/>
+          </p:nvSpPr>
+          <p:spPr>
+            <a:xfrm>
+              <a:off x="8699996" y="5791199"/>
+              <a:ext cx="355600" cy="172690"/>
+            </a:xfrm>
+            <a:prstGeom prst="rect">
+              <a:avLst/>
+            </a:prstGeom>
+            <a:grpFill/>
+            <a:ln>
+              <a:noFill/>
+            </a:ln>
+          </p:spPr>
+          <p:style>
+            <a:lnRef idx="2">
+              <a:schemeClr val="accent1">
+                <a:shade val="50000"/>
+              </a:schemeClr>
+            </a:lnRef>
+            <a:fillRef idx="1">
+              <a:schemeClr val="accent1"/>
+            </a:fillRef>
+            <a:effectRef idx="0">
+              <a:schemeClr val="accent1"/>
+            </a:effectRef>
+            <a:fontRef idx="minor">
+              <a:schemeClr val="lt1"/>
+            </a:fontRef>
+          </p:style>
+          <p:txBody>
+            <a:bodyPr rtlCol="0" anchor="ctr"/>
+            <a:lstStyle/>
+            <a:p>
+              <a:pPr algn="ctr"/>
+              <a:endParaRPr lang="en-US" sz="600"/>
+            </a:p>
+          </p:txBody>
+        </p:sp>
+        <p:sp>
+          <p:nvSpPr>
+            <p:cNvPr id="400" name="Rechteck 399"/>
+            <p:cNvSpPr/>
+            <p:nvPr/>
+          </p:nvSpPr>
+          <p:spPr>
+            <a:xfrm>
+              <a:off x="9171711" y="5791199"/>
+              <a:ext cx="355600" cy="172690"/>
+            </a:xfrm>
+            <a:prstGeom prst="rect">
+              <a:avLst/>
+            </a:prstGeom>
+            <a:grpFill/>
+            <a:ln>
+              <a:noFill/>
+            </a:ln>
+          </p:spPr>
+          <p:style>
+            <a:lnRef idx="2">
+              <a:schemeClr val="accent1">
+                <a:shade val="50000"/>
+              </a:schemeClr>
+            </a:lnRef>
+            <a:fillRef idx="1">
+              <a:schemeClr val="accent1"/>
+            </a:fillRef>
+            <a:effectRef idx="0">
+              <a:schemeClr val="accent1"/>
+            </a:effectRef>
+            <a:fontRef idx="minor">
+              <a:schemeClr val="lt1"/>
+            </a:fontRef>
+          </p:style>
+          <p:txBody>
+            <a:bodyPr rtlCol="0" anchor="ctr"/>
+            <a:lstStyle/>
+            <a:p>
+              <a:pPr algn="ctr"/>
+              <a:endParaRPr lang="en-US" sz="600"/>
+            </a:p>
+          </p:txBody>
+        </p:sp>
+        <p:sp>
+          <p:nvSpPr>
+            <p:cNvPr id="401" name="Rechteck 400"/>
+            <p:cNvSpPr/>
+            <p:nvPr/>
+          </p:nvSpPr>
+          <p:spPr>
+            <a:xfrm>
+              <a:off x="9643426" y="5900057"/>
+              <a:ext cx="355600" cy="63832"/>
+            </a:xfrm>
+            <a:prstGeom prst="rect">
+              <a:avLst/>
+            </a:prstGeom>
+            <a:grpFill/>
+            <a:ln>
+              <a:noFill/>
+            </a:ln>
+          </p:spPr>
+          <p:style>
+            <a:lnRef idx="2">
+              <a:schemeClr val="accent1">
+                <a:shade val="50000"/>
+              </a:schemeClr>
+            </a:lnRef>
+            <a:fillRef idx="1">
+              <a:schemeClr val="accent1"/>
+            </a:fillRef>
+            <a:effectRef idx="0">
+              <a:schemeClr val="accent1"/>
+            </a:effectRef>
+            <a:fontRef idx="minor">
+              <a:schemeClr val="lt1"/>
+            </a:fontRef>
+          </p:style>
+          <p:txBody>
+            <a:bodyPr rtlCol="0" anchor="ctr"/>
+            <a:lstStyle/>
+            <a:p>
+              <a:pPr algn="ctr"/>
+              <a:endParaRPr lang="en-US" sz="600"/>
+            </a:p>
+          </p:txBody>
+        </p:sp>
+        <p:sp>
+          <p:nvSpPr>
+            <p:cNvPr id="402" name="Textfeld 401"/>
+            <p:cNvSpPr txBox="1"/>
+            <p:nvPr/>
+          </p:nvSpPr>
+          <p:spPr>
+            <a:xfrm>
+              <a:off x="11354050" y="6055352"/>
+              <a:ext cx="296876" cy="184666"/>
+            </a:xfrm>
+            <a:prstGeom prst="rect">
+              <a:avLst/>
+            </a:prstGeom>
+            <a:grpFill/>
+          </p:spPr>
+          <p:txBody>
+            <a:bodyPr wrap="none" rtlCol="0">
+              <a:spAutoFit/>
+            </a:bodyPr>
+            <a:lstStyle/>
+            <a:p>
+              <a:r>
+                <a:rPr lang="de-DE" sz="600" dirty="0" err="1" smtClean="0"/>
+                <a:t>day</a:t>
+              </a:r>
+              <a:endParaRPr lang="en-US" sz="600" dirty="0"/>
+            </a:p>
+          </p:txBody>
+        </p:sp>
+        <p:cxnSp>
+          <p:nvCxnSpPr>
+            <p:cNvPr id="403" name="Gerade Verbindung mit Pfeil 402"/>
+            <p:cNvCxnSpPr/>
+            <p:nvPr/>
+          </p:nvCxnSpPr>
+          <p:spPr>
+            <a:xfrm flipV="1">
+              <a:off x="4850698" y="6025615"/>
+              <a:ext cx="6673645" cy="5081"/>
+            </a:xfrm>
+            <a:prstGeom prst="straightConnector1">
+              <a:avLst/>
+            </a:prstGeom>
+            <a:grpFill/>
+            <a:ln w="12700">
+              <a:solidFill>
+                <a:schemeClr val="tx1"/>
+              </a:solidFill>
+              <a:tailEnd type="triangle"/>
+            </a:ln>
+          </p:spPr>
+          <p:style>
+            <a:lnRef idx="1">
+              <a:schemeClr val="accent1"/>
+            </a:lnRef>
+            <a:fillRef idx="0">
+              <a:schemeClr val="accent1"/>
+            </a:fillRef>
+            <a:effectRef idx="0">
+              <a:schemeClr val="accent1"/>
+            </a:effectRef>
+            <a:fontRef idx="minor">
+              <a:schemeClr val="tx1"/>
+            </a:fontRef>
+          </p:style>
+        </p:cxnSp>
+        <p:sp>
+          <p:nvSpPr>
+            <p:cNvPr id="404" name="Textfeld 403"/>
+            <p:cNvSpPr txBox="1"/>
+            <p:nvPr/>
+          </p:nvSpPr>
+          <p:spPr>
+            <a:xfrm>
+              <a:off x="4926276" y="6049578"/>
+              <a:ext cx="223138" cy="184666"/>
+            </a:xfrm>
+            <a:prstGeom prst="rect">
+              <a:avLst/>
+            </a:prstGeom>
+            <a:grpFill/>
+          </p:spPr>
+          <p:txBody>
+            <a:bodyPr wrap="none" rtlCol="0">
+              <a:spAutoFit/>
+            </a:bodyPr>
+            <a:lstStyle/>
+            <a:p>
+              <a:r>
+                <a:rPr lang="de-DE" sz="600" dirty="0" smtClean="0"/>
+                <a:t>1</a:t>
+              </a:r>
+              <a:endParaRPr lang="en-US" sz="600" dirty="0"/>
+            </a:p>
+          </p:txBody>
+        </p:sp>
+        <p:sp>
+          <p:nvSpPr>
+            <p:cNvPr id="407" name="Textfeld 406"/>
+            <p:cNvSpPr txBox="1"/>
+            <p:nvPr/>
+          </p:nvSpPr>
+          <p:spPr>
+            <a:xfrm>
+              <a:off x="5424948" y="6049578"/>
+              <a:ext cx="223138" cy="184666"/>
+            </a:xfrm>
+            <a:prstGeom prst="rect">
+              <a:avLst/>
+            </a:prstGeom>
+            <a:grpFill/>
+          </p:spPr>
+          <p:txBody>
+            <a:bodyPr wrap="none" rtlCol="0">
+              <a:spAutoFit/>
+            </a:bodyPr>
+            <a:lstStyle/>
+            <a:p>
+              <a:r>
+                <a:rPr lang="de-DE" sz="600" dirty="0" smtClean="0"/>
+                <a:t>2</a:t>
+              </a:r>
+              <a:endParaRPr lang="en-US" sz="600" dirty="0"/>
+            </a:p>
+          </p:txBody>
+        </p:sp>
+        <p:sp>
+          <p:nvSpPr>
+            <p:cNvPr id="408" name="Textfeld 407"/>
+            <p:cNvSpPr txBox="1"/>
+            <p:nvPr/>
+          </p:nvSpPr>
+          <p:spPr>
+            <a:xfrm>
+              <a:off x="5923620" y="6049578"/>
+              <a:ext cx="223138" cy="184666"/>
+            </a:xfrm>
+            <a:prstGeom prst="rect">
+              <a:avLst/>
+            </a:prstGeom>
+            <a:grpFill/>
+          </p:spPr>
+          <p:txBody>
+            <a:bodyPr wrap="none" rtlCol="0">
+              <a:spAutoFit/>
+            </a:bodyPr>
+            <a:lstStyle/>
+            <a:p>
+              <a:r>
+                <a:rPr lang="de-DE" sz="600" dirty="0" smtClean="0"/>
+                <a:t>3</a:t>
+              </a:r>
+              <a:endParaRPr lang="en-US" sz="600" dirty="0"/>
+            </a:p>
+          </p:txBody>
+        </p:sp>
+        <p:sp>
+          <p:nvSpPr>
+            <p:cNvPr id="409" name="Textfeld 408"/>
+            <p:cNvSpPr txBox="1"/>
+            <p:nvPr/>
+          </p:nvSpPr>
+          <p:spPr>
+            <a:xfrm>
+              <a:off x="6378750" y="6049578"/>
+              <a:ext cx="223138" cy="184666"/>
+            </a:xfrm>
+            <a:prstGeom prst="rect">
+              <a:avLst/>
+            </a:prstGeom>
+            <a:grpFill/>
+          </p:spPr>
+          <p:txBody>
+            <a:bodyPr wrap="none" rtlCol="0">
+              <a:spAutoFit/>
+            </a:bodyPr>
+            <a:lstStyle/>
+            <a:p>
+              <a:r>
+                <a:rPr lang="de-DE" sz="600" dirty="0" smtClean="0"/>
+                <a:t>4</a:t>
+              </a:r>
+              <a:endParaRPr lang="en-US" sz="600" dirty="0"/>
+            </a:p>
+          </p:txBody>
+        </p:sp>
+        <p:sp>
+          <p:nvSpPr>
+            <p:cNvPr id="410" name="Textfeld 409"/>
+            <p:cNvSpPr txBox="1"/>
+            <p:nvPr/>
+          </p:nvSpPr>
+          <p:spPr>
+            <a:xfrm>
+              <a:off x="6841137" y="6049578"/>
+              <a:ext cx="223138" cy="184666"/>
+            </a:xfrm>
+            <a:prstGeom prst="rect">
+              <a:avLst/>
+            </a:prstGeom>
+            <a:grpFill/>
+          </p:spPr>
+          <p:txBody>
+            <a:bodyPr wrap="none" rtlCol="0">
+              <a:spAutoFit/>
+            </a:bodyPr>
+            <a:lstStyle/>
+            <a:p>
+              <a:r>
+                <a:rPr lang="de-DE" sz="600" dirty="0" smtClean="0"/>
+                <a:t>5</a:t>
+              </a:r>
+              <a:endParaRPr lang="en-US" sz="600" dirty="0"/>
+            </a:p>
+          </p:txBody>
+        </p:sp>
+        <p:sp>
+          <p:nvSpPr>
+            <p:cNvPr id="449" name="Textfeld 448"/>
+            <p:cNvSpPr txBox="1"/>
+            <p:nvPr/>
+          </p:nvSpPr>
+          <p:spPr>
+            <a:xfrm>
+              <a:off x="7310781" y="6049578"/>
+              <a:ext cx="223138" cy="184666"/>
+            </a:xfrm>
+            <a:prstGeom prst="rect">
+              <a:avLst/>
+            </a:prstGeom>
+            <a:grpFill/>
+          </p:spPr>
+          <p:txBody>
+            <a:bodyPr wrap="none" rtlCol="0">
+              <a:spAutoFit/>
+            </a:bodyPr>
+            <a:lstStyle/>
+            <a:p>
+              <a:r>
+                <a:rPr lang="de-DE" sz="600" dirty="0" smtClean="0"/>
+                <a:t>6</a:t>
+              </a:r>
+              <a:endParaRPr lang="en-US" sz="600" dirty="0"/>
+            </a:p>
+          </p:txBody>
+        </p:sp>
+        <p:sp>
+          <p:nvSpPr>
+            <p:cNvPr id="450" name="Textfeld 449"/>
+            <p:cNvSpPr txBox="1"/>
+            <p:nvPr/>
+          </p:nvSpPr>
+          <p:spPr>
+            <a:xfrm>
+              <a:off x="7787682" y="6049578"/>
+              <a:ext cx="223138" cy="184666"/>
+            </a:xfrm>
+            <a:prstGeom prst="rect">
+              <a:avLst/>
+            </a:prstGeom>
+            <a:grpFill/>
+          </p:spPr>
+          <p:txBody>
+            <a:bodyPr wrap="none" rtlCol="0">
+              <a:spAutoFit/>
+            </a:bodyPr>
+            <a:lstStyle/>
+            <a:p>
+              <a:r>
+                <a:rPr lang="de-DE" sz="600" dirty="0" smtClean="0"/>
+                <a:t>7</a:t>
+              </a:r>
+              <a:endParaRPr lang="en-US" sz="600" dirty="0"/>
+            </a:p>
+          </p:txBody>
+        </p:sp>
+        <p:sp>
+          <p:nvSpPr>
+            <p:cNvPr id="451" name="Textfeld 450"/>
+            <p:cNvSpPr txBox="1"/>
+            <p:nvPr/>
+          </p:nvSpPr>
+          <p:spPr>
+            <a:xfrm>
+              <a:off x="8271840" y="6049578"/>
+              <a:ext cx="223138" cy="184666"/>
+            </a:xfrm>
+            <a:prstGeom prst="rect">
+              <a:avLst/>
+            </a:prstGeom>
+            <a:grpFill/>
+          </p:spPr>
+          <p:txBody>
+            <a:bodyPr wrap="none" rtlCol="0">
+              <a:spAutoFit/>
+            </a:bodyPr>
+            <a:lstStyle/>
+            <a:p>
+              <a:r>
+                <a:rPr lang="de-DE" sz="600" dirty="0" smtClean="0"/>
+                <a:t>8</a:t>
+              </a:r>
+              <a:endParaRPr lang="en-US" sz="600" dirty="0"/>
+            </a:p>
+          </p:txBody>
+        </p:sp>
+        <p:sp>
+          <p:nvSpPr>
+            <p:cNvPr id="454" name="Textfeld 453"/>
+            <p:cNvSpPr txBox="1"/>
+            <p:nvPr/>
+          </p:nvSpPr>
+          <p:spPr>
+            <a:xfrm>
+              <a:off x="8726970" y="6049578"/>
+              <a:ext cx="223138" cy="184666"/>
+            </a:xfrm>
+            <a:prstGeom prst="rect">
+              <a:avLst/>
+            </a:prstGeom>
+            <a:grpFill/>
+          </p:spPr>
+          <p:txBody>
+            <a:bodyPr wrap="none" rtlCol="0">
+              <a:spAutoFit/>
+            </a:bodyPr>
+            <a:lstStyle/>
+            <a:p>
+              <a:r>
+                <a:rPr lang="de-DE" sz="600" dirty="0" smtClean="0"/>
+                <a:t>9</a:t>
+              </a:r>
+              <a:endParaRPr lang="en-US" sz="600" dirty="0"/>
+            </a:p>
+          </p:txBody>
+        </p:sp>
+        <p:sp>
+          <p:nvSpPr>
+            <p:cNvPr id="455" name="Textfeld 454"/>
+            <p:cNvSpPr txBox="1"/>
+            <p:nvPr/>
+          </p:nvSpPr>
+          <p:spPr>
+            <a:xfrm>
+              <a:off x="9159204" y="6049578"/>
+              <a:ext cx="261610" cy="184666"/>
+            </a:xfrm>
+            <a:prstGeom prst="rect">
+              <a:avLst/>
+            </a:prstGeom>
+            <a:grpFill/>
+          </p:spPr>
+          <p:txBody>
+            <a:bodyPr wrap="none" rtlCol="0">
+              <a:spAutoFit/>
+            </a:bodyPr>
+            <a:lstStyle/>
+            <a:p>
+              <a:r>
+                <a:rPr lang="de-DE" sz="600" dirty="0" smtClean="0"/>
+                <a:t>10</a:t>
+              </a:r>
+              <a:endParaRPr lang="en-US" sz="600" dirty="0"/>
+            </a:p>
+          </p:txBody>
+        </p:sp>
+        <p:sp>
+          <p:nvSpPr>
+            <p:cNvPr id="456" name="Textfeld 455"/>
+            <p:cNvSpPr txBox="1"/>
+            <p:nvPr/>
+          </p:nvSpPr>
+          <p:spPr>
+            <a:xfrm>
+              <a:off x="9614398" y="6049578"/>
+              <a:ext cx="261610" cy="184666"/>
+            </a:xfrm>
+            <a:prstGeom prst="rect">
+              <a:avLst/>
+            </a:prstGeom>
+            <a:grpFill/>
+          </p:spPr>
+          <p:txBody>
+            <a:bodyPr wrap="none" rtlCol="0">
+              <a:spAutoFit/>
+            </a:bodyPr>
+            <a:lstStyle/>
+            <a:p>
+              <a:r>
+                <a:rPr lang="de-DE" sz="600" dirty="0" smtClean="0"/>
+                <a:t>11</a:t>
+              </a:r>
+              <a:endParaRPr lang="en-US" sz="600" dirty="0"/>
+            </a:p>
+          </p:txBody>
+        </p:sp>
+        <p:sp>
+          <p:nvSpPr>
+            <p:cNvPr id="457" name="Rechteck 456"/>
+            <p:cNvSpPr/>
+            <p:nvPr/>
+          </p:nvSpPr>
+          <p:spPr>
+            <a:xfrm>
+              <a:off x="10064343" y="5900060"/>
+              <a:ext cx="355600" cy="63832"/>
+            </a:xfrm>
+            <a:prstGeom prst="rect">
+              <a:avLst/>
+            </a:prstGeom>
+            <a:grpFill/>
+            <a:ln>
+              <a:noFill/>
+            </a:ln>
+          </p:spPr>
+          <p:style>
+            <a:lnRef idx="2">
+              <a:schemeClr val="accent1">
+                <a:shade val="50000"/>
+              </a:schemeClr>
+            </a:lnRef>
+            <a:fillRef idx="1">
+              <a:schemeClr val="accent1"/>
+            </a:fillRef>
+            <a:effectRef idx="0">
+              <a:schemeClr val="accent1"/>
+            </a:effectRef>
+            <a:fontRef idx="minor">
+              <a:schemeClr val="lt1"/>
+            </a:fontRef>
+          </p:style>
+          <p:txBody>
+            <a:bodyPr rtlCol="0" anchor="ctr"/>
+            <a:lstStyle/>
+            <a:p>
+              <a:pPr algn="ctr"/>
+              <a:endParaRPr lang="en-US" sz="600"/>
+            </a:p>
+          </p:txBody>
+        </p:sp>
+        <p:sp>
+          <p:nvSpPr>
+            <p:cNvPr id="458" name="Textfeld 457"/>
+            <p:cNvSpPr txBox="1"/>
+            <p:nvPr/>
+          </p:nvSpPr>
+          <p:spPr>
+            <a:xfrm>
+              <a:off x="10035315" y="6049581"/>
+              <a:ext cx="261610" cy="184666"/>
+            </a:xfrm>
+            <a:prstGeom prst="rect">
+              <a:avLst/>
+            </a:prstGeom>
+            <a:grpFill/>
+          </p:spPr>
+          <p:txBody>
+            <a:bodyPr wrap="none" rtlCol="0">
+              <a:spAutoFit/>
+            </a:bodyPr>
+            <a:lstStyle/>
+            <a:p>
+              <a:r>
+                <a:rPr lang="de-DE" sz="600" dirty="0" smtClean="0"/>
+                <a:t>12</a:t>
+              </a:r>
+              <a:endParaRPr lang="en-US" sz="600" dirty="0"/>
+            </a:p>
+          </p:txBody>
+        </p:sp>
+        <p:sp>
+          <p:nvSpPr>
+            <p:cNvPr id="459" name="Rechteck 458"/>
+            <p:cNvSpPr/>
+            <p:nvPr/>
+          </p:nvSpPr>
+          <p:spPr>
+            <a:xfrm>
+              <a:off x="10485260" y="5900063"/>
+              <a:ext cx="355600" cy="63832"/>
+            </a:xfrm>
+            <a:prstGeom prst="rect">
+              <a:avLst/>
+            </a:prstGeom>
+            <a:grpFill/>
+            <a:ln>
+              <a:noFill/>
+            </a:ln>
+          </p:spPr>
+          <p:style>
+            <a:lnRef idx="2">
+              <a:schemeClr val="accent1">
+                <a:shade val="50000"/>
+              </a:schemeClr>
+            </a:lnRef>
+            <a:fillRef idx="1">
+              <a:schemeClr val="accent1"/>
+            </a:fillRef>
+            <a:effectRef idx="0">
+              <a:schemeClr val="accent1"/>
+            </a:effectRef>
+            <a:fontRef idx="minor">
+              <a:schemeClr val="lt1"/>
+            </a:fontRef>
+          </p:style>
+          <p:txBody>
+            <a:bodyPr rtlCol="0" anchor="ctr"/>
+            <a:lstStyle/>
+            <a:p>
+              <a:pPr algn="ctr"/>
+              <a:endParaRPr lang="en-US" sz="600"/>
+            </a:p>
+          </p:txBody>
+        </p:sp>
+        <p:sp>
+          <p:nvSpPr>
+            <p:cNvPr id="460" name="Textfeld 459"/>
+            <p:cNvSpPr txBox="1"/>
+            <p:nvPr/>
+          </p:nvSpPr>
+          <p:spPr>
+            <a:xfrm>
+              <a:off x="10456232" y="6049584"/>
+              <a:ext cx="261610" cy="184666"/>
+            </a:xfrm>
+            <a:prstGeom prst="rect">
+              <a:avLst/>
+            </a:prstGeom>
+            <a:grpFill/>
+          </p:spPr>
+          <p:txBody>
+            <a:bodyPr wrap="none" rtlCol="0">
+              <a:spAutoFit/>
+            </a:bodyPr>
+            <a:lstStyle/>
+            <a:p>
+              <a:r>
+                <a:rPr lang="de-DE" sz="600" dirty="0" smtClean="0"/>
+                <a:t>13</a:t>
+              </a:r>
+              <a:endParaRPr lang="en-US" sz="600" dirty="0"/>
+            </a:p>
+          </p:txBody>
+        </p:sp>
+        <p:sp>
+          <p:nvSpPr>
+            <p:cNvPr id="461" name="Rechteck 460"/>
+            <p:cNvSpPr/>
+            <p:nvPr/>
+          </p:nvSpPr>
+          <p:spPr>
+            <a:xfrm>
+              <a:off x="10906177" y="5900066"/>
+              <a:ext cx="355600" cy="63832"/>
+            </a:xfrm>
+            <a:prstGeom prst="rect">
+              <a:avLst/>
+            </a:prstGeom>
+            <a:grpFill/>
+            <a:ln>
+              <a:noFill/>
+            </a:ln>
+          </p:spPr>
+          <p:style>
+            <a:lnRef idx="2">
+              <a:schemeClr val="accent1">
+                <a:shade val="50000"/>
+              </a:schemeClr>
+            </a:lnRef>
+            <a:fillRef idx="1">
+              <a:schemeClr val="accent1"/>
+            </a:fillRef>
+            <a:effectRef idx="0">
+              <a:schemeClr val="accent1"/>
+            </a:effectRef>
+            <a:fontRef idx="minor">
+              <a:schemeClr val="lt1"/>
+            </a:fontRef>
+          </p:style>
+          <p:txBody>
+            <a:bodyPr rtlCol="0" anchor="ctr"/>
+            <a:lstStyle/>
+            <a:p>
+              <a:pPr algn="ctr"/>
+              <a:endParaRPr lang="en-US" sz="600"/>
+            </a:p>
+          </p:txBody>
+        </p:sp>
+        <p:sp>
+          <p:nvSpPr>
+            <p:cNvPr id="462" name="Textfeld 461"/>
+            <p:cNvSpPr txBox="1"/>
+            <p:nvPr/>
+          </p:nvSpPr>
+          <p:spPr>
+            <a:xfrm>
+              <a:off x="10877149" y="6049587"/>
+              <a:ext cx="261610" cy="184666"/>
+            </a:xfrm>
+            <a:prstGeom prst="rect">
+              <a:avLst/>
+            </a:prstGeom>
+            <a:grpFill/>
+          </p:spPr>
+          <p:txBody>
+            <a:bodyPr wrap="none" rtlCol="0">
+              <a:spAutoFit/>
+            </a:bodyPr>
+            <a:lstStyle/>
+            <a:p>
+              <a:r>
+                <a:rPr lang="de-DE" sz="600" dirty="0" smtClean="0"/>
+                <a:t>14</a:t>
+              </a:r>
+              <a:endParaRPr lang="en-US" sz="600" dirty="0"/>
+            </a:p>
+          </p:txBody>
+        </p:sp>
+      </p:grpSp>
+      <p:sp>
+        <p:nvSpPr>
+          <p:cNvPr id="464" name="Rechteck 463"/>
+          <p:cNvSpPr/>
+          <p:nvPr/>
+        </p:nvSpPr>
+        <p:spPr>
+          <a:xfrm>
+            <a:off x="3081494" y="6178149"/>
+            <a:ext cx="98201" cy="372209"/>
+          </a:xfrm>
+          <a:prstGeom prst="rect">
+            <a:avLst/>
+          </a:prstGeom>
+          <a:noFill/>
+          <a:ln w="28575">
+            <a:solidFill>
+              <a:srgbClr val="00B050"/>
+            </a:solidFill>
+          </a:ln>
+        </p:spPr>
+        <p:style>
+          <a:lnRef idx="2">
+            <a:schemeClr val="accent1">
+              <a:shade val="50000"/>
+            </a:schemeClr>
+          </a:lnRef>
+          <a:fillRef idx="1">
+            <a:schemeClr val="accent1"/>
+          </a:fillRef>
+          <a:effectRef idx="0">
+            <a:schemeClr val="accent1"/>
+          </a:effectRef>
+          <a:fontRef idx="minor">
+            <a:schemeClr val="lt1"/>
+          </a:fontRef>
+        </p:style>
+        <p:txBody>
+          <a:bodyPr rtlCol="0" anchor="ctr"/>
+          <a:lstStyle/>
+          <a:p>
+            <a:pPr algn="ctr"/>
+            <a:endParaRPr lang="en-US"/>
+          </a:p>
+        </p:txBody>
+      </p:sp>
+      <p:cxnSp>
+        <p:nvCxnSpPr>
+          <p:cNvPr id="465" name="Gerade Verbindung mit Pfeil 464"/>
+          <p:cNvCxnSpPr>
+            <a:endCxn id="466" idx="0"/>
+          </p:cNvCxnSpPr>
+          <p:nvPr/>
+        </p:nvCxnSpPr>
+        <p:spPr>
+          <a:xfrm flipH="1">
+            <a:off x="2679162" y="2812414"/>
+            <a:ext cx="1790410" cy="3242810"/>
+          </a:xfrm>
+          <a:prstGeom prst="straightConnector1">
+            <a:avLst/>
+          </a:prstGeom>
+          <a:ln w="38100">
+            <a:solidFill>
+              <a:srgbClr val="00B050"/>
+            </a:solidFill>
+            <a:tailEnd type="triangle"/>
+          </a:ln>
+        </p:spPr>
+        <p:style>
+          <a:lnRef idx="1">
+            <a:schemeClr val="accent1"/>
+          </a:lnRef>
+          <a:fillRef idx="0">
+            <a:schemeClr val="accent1"/>
+          </a:fillRef>
+          <a:effectRef idx="0">
+            <a:schemeClr val="accent1"/>
+          </a:effectRef>
+          <a:fontRef idx="minor">
+            <a:schemeClr val="tx1"/>
+          </a:fontRef>
+        </p:style>
+      </p:cxnSp>
+      <p:sp>
+        <p:nvSpPr>
+          <p:cNvPr id="466" name="Rechteck 465"/>
+          <p:cNvSpPr/>
+          <p:nvPr/>
+        </p:nvSpPr>
+        <p:spPr>
+          <a:xfrm>
+            <a:off x="2144698" y="6055224"/>
+            <a:ext cx="1068927" cy="453773"/>
+          </a:xfrm>
+          <a:prstGeom prst="rect">
+            <a:avLst/>
+          </a:prstGeom>
+          <a:noFill/>
+          <a:ln w="28575">
+            <a:solidFill>
+              <a:srgbClr val="0070C0"/>
+            </a:solidFill>
+          </a:ln>
+        </p:spPr>
+        <p:style>
+          <a:lnRef idx="2">
+            <a:schemeClr val="accent1">
+              <a:shade val="50000"/>
+            </a:schemeClr>
+          </a:lnRef>
+          <a:fillRef idx="1">
+            <a:schemeClr val="accent1"/>
+          </a:fillRef>
+          <a:effectRef idx="0">
+            <a:schemeClr val="accent1"/>
+          </a:effectRef>
+          <a:fontRef idx="minor">
+            <a:schemeClr val="lt1"/>
+          </a:fontRef>
+        </p:style>
+        <p:txBody>
+          <a:bodyPr rtlCol="0" anchor="ctr"/>
+          <a:lstStyle/>
+          <a:p>
+            <a:pPr algn="ctr"/>
+            <a:endParaRPr lang="en-US"/>
+          </a:p>
+        </p:txBody>
+      </p:sp>
+      <p:cxnSp>
+        <p:nvCxnSpPr>
+          <p:cNvPr id="467" name="Gerade Verbindung mit Pfeil 466"/>
+          <p:cNvCxnSpPr>
+            <a:stCxn id="464" idx="0"/>
+            <a:endCxn id="150" idx="1"/>
+          </p:cNvCxnSpPr>
+          <p:nvPr/>
+        </p:nvCxnSpPr>
+        <p:spPr>
+          <a:xfrm flipV="1">
+            <a:off x="3130595" y="2574824"/>
+            <a:ext cx="7017709" cy="3603325"/>
+          </a:xfrm>
+          <a:prstGeom prst="straightConnector1">
+            <a:avLst/>
+          </a:prstGeom>
+          <a:ln w="38100">
+            <a:solidFill>
+              <a:srgbClr val="00B050"/>
+            </a:solidFill>
+            <a:tailEnd type="triangle"/>
+          </a:ln>
+        </p:spPr>
+        <p:style>
+          <a:lnRef idx="1">
+            <a:schemeClr val="accent1"/>
+          </a:lnRef>
+          <a:fillRef idx="0">
+            <a:schemeClr val="accent1"/>
+          </a:fillRef>
+          <a:effectRef idx="0">
+            <a:schemeClr val="accent1"/>
+          </a:effectRef>
+          <a:fontRef idx="minor">
+            <a:schemeClr val="tx1"/>
+          </a:fontRef>
+        </p:style>
+      </p:cxnSp>
+      <p:sp>
+        <p:nvSpPr>
+          <p:cNvPr id="468" name="Textfeld 467"/>
+          <p:cNvSpPr txBox="1"/>
+          <p:nvPr/>
+        </p:nvSpPr>
+        <p:spPr>
+          <a:xfrm>
+            <a:off x="3448469" y="4461891"/>
+            <a:ext cx="306494" cy="369332"/>
+          </a:xfrm>
+          <a:prstGeom prst="rect">
+            <a:avLst/>
+          </a:prstGeom>
+          <a:noFill/>
+        </p:spPr>
+        <p:txBody>
+          <a:bodyPr wrap="none" rtlCol="0">
+            <a:spAutoFit/>
+          </a:bodyPr>
+          <a:lstStyle/>
+          <a:p>
+            <a:r>
+              <a:rPr lang="de-DE" dirty="0" smtClean="0"/>
+              <a:t>q</a:t>
+            </a:r>
+            <a:endParaRPr lang="en-US" dirty="0"/>
+          </a:p>
+        </p:txBody>
+      </p:sp>
+      <p:sp>
+        <p:nvSpPr>
+          <p:cNvPr id="469" name="Textfeld 468"/>
+          <p:cNvSpPr txBox="1"/>
+          <p:nvPr/>
+        </p:nvSpPr>
+        <p:spPr>
+          <a:xfrm>
+            <a:off x="9658969" y="2773049"/>
+            <a:ext cx="293066" cy="307777"/>
+          </a:xfrm>
+          <a:prstGeom prst="rect">
+            <a:avLst/>
+          </a:prstGeom>
+          <a:noFill/>
+        </p:spPr>
+        <p:txBody>
+          <a:bodyPr wrap="square" rtlCol="0">
+            <a:spAutoFit/>
+          </a:bodyPr>
+          <a:lstStyle/>
+          <a:p>
+            <a:r>
+              <a:rPr lang="de-DE" sz="1400" dirty="0" smtClean="0"/>
+              <a:t>1</a:t>
+            </a:r>
+          </a:p>
+        </p:txBody>
+      </p:sp>
+      <p:cxnSp>
+        <p:nvCxnSpPr>
+          <p:cNvPr id="470" name="Gerade Verbindung mit Pfeil 469"/>
+          <p:cNvCxnSpPr>
+            <a:stCxn id="466" idx="2"/>
+            <a:endCxn id="376" idx="2"/>
+          </p:cNvCxnSpPr>
+          <p:nvPr/>
+        </p:nvCxnSpPr>
+        <p:spPr>
+          <a:xfrm flipV="1">
+            <a:off x="2679162" y="4504824"/>
+            <a:ext cx="5225162" cy="2004173"/>
+          </a:xfrm>
+          <a:prstGeom prst="straightConnector1">
+            <a:avLst/>
+          </a:prstGeom>
+          <a:ln w="38100">
+            <a:solidFill>
+              <a:srgbClr val="00B050"/>
+            </a:solidFill>
+            <a:tailEnd type="triangle"/>
+          </a:ln>
+        </p:spPr>
+        <p:style>
+          <a:lnRef idx="1">
+            <a:schemeClr val="accent1"/>
+          </a:lnRef>
+          <a:fillRef idx="0">
+            <a:schemeClr val="accent1"/>
+          </a:fillRef>
+          <a:effectRef idx="0">
+            <a:schemeClr val="accent1"/>
+          </a:effectRef>
+          <a:fontRef idx="minor">
+            <a:schemeClr val="tx1"/>
+          </a:fontRef>
+        </p:style>
+      </p:cxnSp>
+      <p:sp>
+        <p:nvSpPr>
+          <p:cNvPr id="471" name="Textfeld 470"/>
+          <p:cNvSpPr txBox="1"/>
+          <p:nvPr/>
+        </p:nvSpPr>
+        <p:spPr>
+          <a:xfrm>
+            <a:off x="6478070" y="4524899"/>
+            <a:ext cx="299066" cy="307777"/>
+          </a:xfrm>
+          <a:prstGeom prst="rect">
+            <a:avLst/>
+          </a:prstGeom>
+          <a:noFill/>
+        </p:spPr>
+        <p:txBody>
+          <a:bodyPr wrap="square" rtlCol="0">
+            <a:spAutoFit/>
+          </a:bodyPr>
+          <a:lstStyle/>
+          <a:p>
+            <a:r>
+              <a:rPr lang="de-DE" sz="1400" dirty="0" smtClean="0"/>
+              <a:t>h</a:t>
+            </a:r>
+            <a:endParaRPr lang="en-US" sz="1400" dirty="0"/>
+          </a:p>
+        </p:txBody>
+      </p:sp>
+      <p:cxnSp>
+        <p:nvCxnSpPr>
+          <p:cNvPr id="472" name="Gerade Verbindung mit Pfeil 471"/>
+          <p:cNvCxnSpPr>
+            <a:stCxn id="466" idx="0"/>
+            <a:endCxn id="279" idx="2"/>
+          </p:cNvCxnSpPr>
+          <p:nvPr/>
+        </p:nvCxnSpPr>
+        <p:spPr>
+          <a:xfrm flipV="1">
+            <a:off x="2679162" y="5325023"/>
+            <a:ext cx="2081170" cy="730201"/>
+          </a:xfrm>
+          <a:prstGeom prst="straightConnector1">
+            <a:avLst/>
+          </a:prstGeom>
+          <a:ln w="38100">
+            <a:solidFill>
+              <a:srgbClr val="00B050"/>
+            </a:solidFill>
+            <a:tailEnd type="triangle"/>
+          </a:ln>
+        </p:spPr>
+        <p:style>
+          <a:lnRef idx="1">
+            <a:schemeClr val="accent1"/>
+          </a:lnRef>
+          <a:fillRef idx="0">
+            <a:schemeClr val="accent1"/>
+          </a:fillRef>
+          <a:effectRef idx="0">
+            <a:schemeClr val="accent1"/>
+          </a:effectRef>
+          <a:fontRef idx="minor">
+            <a:schemeClr val="tx1"/>
+          </a:fontRef>
+        </p:style>
+      </p:cxnSp>
+      <p:sp>
+        <p:nvSpPr>
+          <p:cNvPr id="473" name="Textfeld 472"/>
+          <p:cNvSpPr txBox="1"/>
+          <p:nvPr/>
+        </p:nvSpPr>
+        <p:spPr>
+          <a:xfrm>
+            <a:off x="3759813" y="5369806"/>
+            <a:ext cx="293066" cy="307777"/>
+          </a:xfrm>
+          <a:prstGeom prst="rect">
+            <a:avLst/>
+          </a:prstGeom>
+          <a:noFill/>
+        </p:spPr>
+        <p:txBody>
+          <a:bodyPr wrap="square" rtlCol="0">
+            <a:spAutoFit/>
+          </a:bodyPr>
+          <a:lstStyle/>
+          <a:p>
+            <a:r>
+              <a:rPr lang="de-DE" sz="1400" dirty="0" smtClean="0"/>
+              <a:t>d</a:t>
+            </a:r>
+            <a:endParaRPr lang="en-US" sz="1400" dirty="0"/>
           </a:p>
         </p:txBody>
       </p:sp>
@@ -15178,6 +16769,13 @@
   <p:clrMapOvr>
     <a:masterClrMapping/>
   </p:clrMapOvr>
+  <p:timing>
+    <p:tnLst>
+      <p:par>
+        <p:cTn id="1" dur="indefinite" restart="never" nodeType="tmRoot"/>
+      </p:par>
+    </p:tnLst>
+  </p:timing>
 </p:sld>
 </file>
 

</xml_diff>